<commit_message>
Modif de la presentation
</commit_message>
<xml_diff>
--- a/Redaction/pres.pptx
+++ b/Redaction/pres.pptx
@@ -5,10 +5,10 @@
     <p:sldMasterId id="2147483648" r:id="rId1"/>
   </p:sldMasterIdLst>
   <p:notesMasterIdLst>
-    <p:notesMasterId r:id="rId18"/>
+    <p:notesMasterId r:id="rId20"/>
   </p:notesMasterIdLst>
   <p:handoutMasterIdLst>
-    <p:handoutMasterId r:id="rId19"/>
+    <p:handoutMasterId r:id="rId21"/>
   </p:handoutMasterIdLst>
   <p:sldIdLst>
     <p:sldId id="256" r:id="rId2"/>
@@ -27,6 +27,8 @@
     <p:sldId id="273" r:id="rId15"/>
     <p:sldId id="274" r:id="rId16"/>
     <p:sldId id="275" r:id="rId17"/>
+    <p:sldId id="276" r:id="rId18"/>
+    <p:sldId id="277" r:id="rId19"/>
   </p:sldIdLst>
   <p:sldSz cx="9144000" cy="6858000" type="screen4x3"/>
   <p:notesSz cx="6858000" cy="9144000"/>
@@ -158,6 +160,8 @@
             <p14:sldId id="273"/>
             <p14:sldId id="274"/>
             <p14:sldId id="275"/>
+            <p14:sldId id="276"/>
+            <p14:sldId id="277"/>
           </p14:sldIdLst>
         </p14:section>
       </p14:sectionLst>
@@ -1097,13 +1101,8 @@
         <a:p>
           <a:r>
             <a:rPr lang="fr-FR"/>
-            <a:t>Co</a:t>
+            <a:t>Coûts de transmission physique</a:t>
           </a:r>
-          <a:r>
-            <a:rPr lang="fr-FR"/>
-            <a:t>ûts de transmission physique</a:t>
-          </a:r>
-          <a:endParaRPr lang="fr-FR"/>
         </a:p>
       </dgm:t>
     </dgm:pt>
@@ -1139,6 +1138,13 @@
         </dgm:presLayoutVars>
       </dgm:prSet>
       <dgm:spPr/>
+      <dgm:t>
+        <a:bodyPr/>
+        <a:lstStyle/>
+        <a:p>
+          <a:endParaRPr lang="fr-FR"/>
+        </a:p>
+      </dgm:t>
     </dgm:pt>
     <dgm:pt modelId="{5DD8E76F-190F-AE4D-8F4D-4BB2AADB5179}" type="pres">
       <dgm:prSet presAssocID="{B7BB0103-7E47-DD47-A685-FB155C9A07EE}" presName="centerShape" presStyleLbl="node0" presStyleIdx="0" presStyleCnt="1"/>
@@ -1154,10 +1160,24 @@
     <dgm:pt modelId="{28E9526E-7B0C-9143-A850-585B8E0E2207}" type="pres">
       <dgm:prSet presAssocID="{5304632D-3534-014E-A773-191A91505663}" presName="parTrans" presStyleLbl="sibTrans2D1" presStyleIdx="0" presStyleCnt="3"/>
       <dgm:spPr/>
+      <dgm:t>
+        <a:bodyPr/>
+        <a:lstStyle/>
+        <a:p>
+          <a:endParaRPr lang="fr-FR"/>
+        </a:p>
+      </dgm:t>
     </dgm:pt>
     <dgm:pt modelId="{F6EB97ED-B6B4-4241-B774-3B7059FCFB8A}" type="pres">
       <dgm:prSet presAssocID="{5304632D-3534-014E-A773-191A91505663}" presName="connectorText" presStyleLbl="sibTrans2D1" presStyleIdx="0" presStyleCnt="3"/>
       <dgm:spPr/>
+      <dgm:t>
+        <a:bodyPr/>
+        <a:lstStyle/>
+        <a:p>
+          <a:endParaRPr lang="fr-FR"/>
+        </a:p>
+      </dgm:t>
     </dgm:pt>
     <dgm:pt modelId="{EFF2F8AC-1F1B-6D4D-8C29-AE41441F26F7}" type="pres">
       <dgm:prSet presAssocID="{1A6F2230-7FF1-784D-8943-FAFBB5BD867E}" presName="node" presStyleLbl="node1" presStyleIdx="0" presStyleCnt="3">
@@ -1177,10 +1197,24 @@
     <dgm:pt modelId="{54DC7B13-44EC-FF49-A46D-55A02B76FE87}" type="pres">
       <dgm:prSet presAssocID="{EE98EBD2-B01C-AC47-87D6-306A993857F7}" presName="parTrans" presStyleLbl="sibTrans2D1" presStyleIdx="1" presStyleCnt="3"/>
       <dgm:spPr/>
+      <dgm:t>
+        <a:bodyPr/>
+        <a:lstStyle/>
+        <a:p>
+          <a:endParaRPr lang="fr-FR"/>
+        </a:p>
+      </dgm:t>
     </dgm:pt>
     <dgm:pt modelId="{F9C9631B-0A4E-8840-BB52-87B441B80EB5}" type="pres">
       <dgm:prSet presAssocID="{EE98EBD2-B01C-AC47-87D6-306A993857F7}" presName="connectorText" presStyleLbl="sibTrans2D1" presStyleIdx="1" presStyleCnt="3"/>
       <dgm:spPr/>
+      <dgm:t>
+        <a:bodyPr/>
+        <a:lstStyle/>
+        <a:p>
+          <a:endParaRPr lang="fr-FR"/>
+        </a:p>
+      </dgm:t>
     </dgm:pt>
     <dgm:pt modelId="{9AF44D55-8614-3B46-93BF-F278C02874B0}" type="pres">
       <dgm:prSet presAssocID="{7DA216F7-B61A-644F-9E41-4844BDF2E1EB}" presName="node" presStyleLbl="node1" presStyleIdx="1" presStyleCnt="3">
@@ -1200,10 +1234,24 @@
     <dgm:pt modelId="{443AD5A5-74EA-D84C-A21D-7D9663E3D147}" type="pres">
       <dgm:prSet presAssocID="{EBD4001C-B961-5540-8C87-277869C67930}" presName="parTrans" presStyleLbl="sibTrans2D1" presStyleIdx="2" presStyleCnt="3"/>
       <dgm:spPr/>
+      <dgm:t>
+        <a:bodyPr/>
+        <a:lstStyle/>
+        <a:p>
+          <a:endParaRPr lang="fr-FR"/>
+        </a:p>
+      </dgm:t>
     </dgm:pt>
     <dgm:pt modelId="{D2B7ABDE-DC5D-CC43-A304-27801E8F3934}" type="pres">
       <dgm:prSet presAssocID="{EBD4001C-B961-5540-8C87-277869C67930}" presName="connectorText" presStyleLbl="sibTrans2D1" presStyleIdx="2" presStyleCnt="3"/>
       <dgm:spPr/>
+      <dgm:t>
+        <a:bodyPr/>
+        <a:lstStyle/>
+        <a:p>
+          <a:endParaRPr lang="fr-FR"/>
+        </a:p>
+      </dgm:t>
     </dgm:pt>
     <dgm:pt modelId="{E6336081-3369-9448-A37D-3542AC02AA41}" type="pres">
       <dgm:prSet presAssocID="{80CDC2A9-E114-4E4E-97DA-E5A6E9106C0D}" presName="node" presStyleLbl="node1" presStyleIdx="2" presStyleCnt="3">
@@ -1222,21 +1270,21 @@
     </dgm:pt>
   </dgm:ptLst>
   <dgm:cxnLst>
+    <dgm:cxn modelId="{BD289E23-9AEB-1545-8121-FFED29DF8A76}" type="presOf" srcId="{EBD4001C-B961-5540-8C87-277869C67930}" destId="{D2B7ABDE-DC5D-CC43-A304-27801E8F3934}" srcOrd="1" destOrd="0" presId="urn:microsoft.com/office/officeart/2005/8/layout/radial5"/>
+    <dgm:cxn modelId="{5EF9709A-DAC0-EE4B-8557-4C53B4B56380}" type="presOf" srcId="{7DA216F7-B61A-644F-9E41-4844BDF2E1EB}" destId="{9AF44D55-8614-3B46-93BF-F278C02874B0}" srcOrd="0" destOrd="0" presId="urn:microsoft.com/office/officeart/2005/8/layout/radial5"/>
+    <dgm:cxn modelId="{20D7BF27-E99E-774C-A330-14F0528895CF}" type="presOf" srcId="{EC3D84DF-2E4A-914D-8008-A16D5583089F}" destId="{2D39C667-17DD-D243-BBEF-E694A5E11B6F}" srcOrd="0" destOrd="0" presId="urn:microsoft.com/office/officeart/2005/8/layout/radial5"/>
+    <dgm:cxn modelId="{3CF9BB7A-5A06-2847-8A99-D91FA18D9AFA}" type="presOf" srcId="{5304632D-3534-014E-A773-191A91505663}" destId="{28E9526E-7B0C-9143-A850-585B8E0E2207}" srcOrd="0" destOrd="0" presId="urn:microsoft.com/office/officeart/2005/8/layout/radial5"/>
+    <dgm:cxn modelId="{981409B1-430A-F64D-A631-F9C5F731F273}" type="presOf" srcId="{EBD4001C-B961-5540-8C87-277869C67930}" destId="{443AD5A5-74EA-D84C-A21D-7D9663E3D147}" srcOrd="0" destOrd="0" presId="urn:microsoft.com/office/officeart/2005/8/layout/radial5"/>
+    <dgm:cxn modelId="{88714B9B-4491-1648-BFA5-9908FC612FF9}" type="presOf" srcId="{1A6F2230-7FF1-784D-8943-FAFBB5BD867E}" destId="{EFF2F8AC-1F1B-6D4D-8C29-AE41441F26F7}" srcOrd="0" destOrd="0" presId="urn:microsoft.com/office/officeart/2005/8/layout/radial5"/>
+    <dgm:cxn modelId="{1F426276-401F-6548-A04B-6E549D314F44}" srcId="{EC3D84DF-2E4A-914D-8008-A16D5583089F}" destId="{B7BB0103-7E47-DD47-A685-FB155C9A07EE}" srcOrd="0" destOrd="0" parTransId="{187E3820-FDBD-A14B-8D53-13DEEA190D85}" sibTransId="{07DE391C-36DC-2347-ACDE-6F70ECD1194A}"/>
+    <dgm:cxn modelId="{DA6D3E26-D7CA-AD40-9EAA-FB53CCDC295A}" srcId="{B7BB0103-7E47-DD47-A685-FB155C9A07EE}" destId="{7DA216F7-B61A-644F-9E41-4844BDF2E1EB}" srcOrd="1" destOrd="0" parTransId="{EE98EBD2-B01C-AC47-87D6-306A993857F7}" sibTransId="{40828377-F63C-7147-AD5C-8E259A94515F}"/>
+    <dgm:cxn modelId="{D1A37C89-99F7-8646-9954-2A9040E91DE6}" type="presOf" srcId="{B7BB0103-7E47-DD47-A685-FB155C9A07EE}" destId="{5DD8E76F-190F-AE4D-8F4D-4BB2AADB5179}" srcOrd="0" destOrd="0" presId="urn:microsoft.com/office/officeart/2005/8/layout/radial5"/>
+    <dgm:cxn modelId="{182F8A36-DF71-514D-A4DB-02C0E52C9E27}" srcId="{B7BB0103-7E47-DD47-A685-FB155C9A07EE}" destId="{80CDC2A9-E114-4E4E-97DA-E5A6E9106C0D}" srcOrd="2" destOrd="0" parTransId="{EBD4001C-B961-5540-8C87-277869C67930}" sibTransId="{23331D01-66FE-2F4E-9D58-79CD274B6161}"/>
+    <dgm:cxn modelId="{06BD377A-1813-9A43-8E47-E01E784BE70D}" type="presOf" srcId="{80CDC2A9-E114-4E4E-97DA-E5A6E9106C0D}" destId="{E6336081-3369-9448-A37D-3542AC02AA41}" srcOrd="0" destOrd="0" presId="urn:microsoft.com/office/officeart/2005/8/layout/radial5"/>
+    <dgm:cxn modelId="{41055DA1-11F4-F44D-8A2D-65078C273C86}" srcId="{B7BB0103-7E47-DD47-A685-FB155C9A07EE}" destId="{1A6F2230-7FF1-784D-8943-FAFBB5BD867E}" srcOrd="0" destOrd="0" parTransId="{5304632D-3534-014E-A773-191A91505663}" sibTransId="{18929EFA-1674-8D49-BFC2-4A2E5D4308B5}"/>
+    <dgm:cxn modelId="{21A54FB8-9CA2-2343-945D-5B2902E5F5E8}" type="presOf" srcId="{5304632D-3534-014E-A773-191A91505663}" destId="{F6EB97ED-B6B4-4241-B774-3B7059FCFB8A}" srcOrd="1" destOrd="0" presId="urn:microsoft.com/office/officeart/2005/8/layout/radial5"/>
     <dgm:cxn modelId="{B42444B2-648E-4449-96AD-FC3B788CF0E4}" type="presOf" srcId="{EE98EBD2-B01C-AC47-87D6-306A993857F7}" destId="{54DC7B13-44EC-FF49-A46D-55A02B76FE87}" srcOrd="0" destOrd="0" presId="urn:microsoft.com/office/officeart/2005/8/layout/radial5"/>
-    <dgm:cxn modelId="{5EF9709A-DAC0-EE4B-8557-4C53B4B56380}" type="presOf" srcId="{7DA216F7-B61A-644F-9E41-4844BDF2E1EB}" destId="{9AF44D55-8614-3B46-93BF-F278C02874B0}" srcOrd="0" destOrd="0" presId="urn:microsoft.com/office/officeart/2005/8/layout/radial5"/>
-    <dgm:cxn modelId="{1F426276-401F-6548-A04B-6E549D314F44}" srcId="{EC3D84DF-2E4A-914D-8008-A16D5583089F}" destId="{B7BB0103-7E47-DD47-A685-FB155C9A07EE}" srcOrd="0" destOrd="0" parTransId="{187E3820-FDBD-A14B-8D53-13DEEA190D85}" sibTransId="{07DE391C-36DC-2347-ACDE-6F70ECD1194A}"/>
-    <dgm:cxn modelId="{981409B1-430A-F64D-A631-F9C5F731F273}" type="presOf" srcId="{EBD4001C-B961-5540-8C87-277869C67930}" destId="{443AD5A5-74EA-D84C-A21D-7D9663E3D147}" srcOrd="0" destOrd="0" presId="urn:microsoft.com/office/officeart/2005/8/layout/radial5"/>
-    <dgm:cxn modelId="{D1A37C89-99F7-8646-9954-2A9040E91DE6}" type="presOf" srcId="{B7BB0103-7E47-DD47-A685-FB155C9A07EE}" destId="{5DD8E76F-190F-AE4D-8F4D-4BB2AADB5179}" srcOrd="0" destOrd="0" presId="urn:microsoft.com/office/officeart/2005/8/layout/radial5"/>
-    <dgm:cxn modelId="{20D7BF27-E99E-774C-A330-14F0528895CF}" type="presOf" srcId="{EC3D84DF-2E4A-914D-8008-A16D5583089F}" destId="{2D39C667-17DD-D243-BBEF-E694A5E11B6F}" srcOrd="0" destOrd="0" presId="urn:microsoft.com/office/officeart/2005/8/layout/radial5"/>
-    <dgm:cxn modelId="{DA6D3E26-D7CA-AD40-9EAA-FB53CCDC295A}" srcId="{B7BB0103-7E47-DD47-A685-FB155C9A07EE}" destId="{7DA216F7-B61A-644F-9E41-4844BDF2E1EB}" srcOrd="1" destOrd="0" parTransId="{EE98EBD2-B01C-AC47-87D6-306A993857F7}" sibTransId="{40828377-F63C-7147-AD5C-8E259A94515F}"/>
-    <dgm:cxn modelId="{88714B9B-4491-1648-BFA5-9908FC612FF9}" type="presOf" srcId="{1A6F2230-7FF1-784D-8943-FAFBB5BD867E}" destId="{EFF2F8AC-1F1B-6D4D-8C29-AE41441F26F7}" srcOrd="0" destOrd="0" presId="urn:microsoft.com/office/officeart/2005/8/layout/radial5"/>
-    <dgm:cxn modelId="{41055DA1-11F4-F44D-8A2D-65078C273C86}" srcId="{B7BB0103-7E47-DD47-A685-FB155C9A07EE}" destId="{1A6F2230-7FF1-784D-8943-FAFBB5BD867E}" srcOrd="0" destOrd="0" parTransId="{5304632D-3534-014E-A773-191A91505663}" sibTransId="{18929EFA-1674-8D49-BFC2-4A2E5D4308B5}"/>
-    <dgm:cxn modelId="{06BD377A-1813-9A43-8E47-E01E784BE70D}" type="presOf" srcId="{80CDC2A9-E114-4E4E-97DA-E5A6E9106C0D}" destId="{E6336081-3369-9448-A37D-3542AC02AA41}" srcOrd="0" destOrd="0" presId="urn:microsoft.com/office/officeart/2005/8/layout/radial5"/>
-    <dgm:cxn modelId="{3CF9BB7A-5A06-2847-8A99-D91FA18D9AFA}" type="presOf" srcId="{5304632D-3534-014E-A773-191A91505663}" destId="{28E9526E-7B0C-9143-A850-585B8E0E2207}" srcOrd="0" destOrd="0" presId="urn:microsoft.com/office/officeart/2005/8/layout/radial5"/>
-    <dgm:cxn modelId="{21A54FB8-9CA2-2343-945D-5B2902E5F5E8}" type="presOf" srcId="{5304632D-3534-014E-A773-191A91505663}" destId="{F6EB97ED-B6B4-4241-B774-3B7059FCFB8A}" srcOrd="1" destOrd="0" presId="urn:microsoft.com/office/officeart/2005/8/layout/radial5"/>
-    <dgm:cxn modelId="{BD289E23-9AEB-1545-8121-FFED29DF8A76}" type="presOf" srcId="{EBD4001C-B961-5540-8C87-277869C67930}" destId="{D2B7ABDE-DC5D-CC43-A304-27801E8F3934}" srcOrd="1" destOrd="0" presId="urn:microsoft.com/office/officeart/2005/8/layout/radial5"/>
     <dgm:cxn modelId="{7ED21C30-811C-3644-A272-51AA029DED4E}" type="presOf" srcId="{EE98EBD2-B01C-AC47-87D6-306A993857F7}" destId="{F9C9631B-0A4E-8840-BB52-87B441B80EB5}" srcOrd="1" destOrd="0" presId="urn:microsoft.com/office/officeart/2005/8/layout/radial5"/>
-    <dgm:cxn modelId="{182F8A36-DF71-514D-A4DB-02C0E52C9E27}" srcId="{B7BB0103-7E47-DD47-A685-FB155C9A07EE}" destId="{80CDC2A9-E114-4E4E-97DA-E5A6E9106C0D}" srcOrd="2" destOrd="0" parTransId="{EBD4001C-B961-5540-8C87-277869C67930}" sibTransId="{23331D01-66FE-2F4E-9D58-79CD274B6161}"/>
     <dgm:cxn modelId="{D454D5EA-D415-0940-841D-9AF66E1C32C1}" type="presParOf" srcId="{2D39C667-17DD-D243-BBEF-E694A5E11B6F}" destId="{5DD8E76F-190F-AE4D-8F4D-4BB2AADB5179}" srcOrd="0" destOrd="0" presId="urn:microsoft.com/office/officeart/2005/8/layout/radial5"/>
     <dgm:cxn modelId="{758DD4F6-D5C5-1B47-AEAA-8A9B5ED271C1}" type="presParOf" srcId="{2D39C667-17DD-D243-BBEF-E694A5E11B6F}" destId="{28E9526E-7B0C-9143-A850-585B8E0E2207}" srcOrd="1" destOrd="0" presId="urn:microsoft.com/office/officeart/2005/8/layout/radial5"/>
     <dgm:cxn modelId="{0E9F40F2-2A10-F442-B672-458B50589287}" type="presParOf" srcId="{28E9526E-7B0C-9143-A850-585B8E0E2207}" destId="{F6EB97ED-B6B4-4241-B774-3B7059FCFB8A}" srcOrd="0" destOrd="0" presId="urn:microsoft.com/office/officeart/2005/8/layout/radial5"/>
@@ -1291,6 +1339,10 @@
           <a:noFill/>
         </a:ln>
         <a:effectLst/>
+        <a:scene3d>
+          <a:camera prst="orthographicFront"/>
+          <a:lightRig rig="chilly" dir="t"/>
+        </a:scene3d>
         <a:sp3d prstMaterial="translucentPowder">
           <a:bevelT w="127000" h="25400" prst="softRound"/>
         </a:sp3d>
@@ -1527,6 +1579,10 @@
           <a:noFill/>
         </a:ln>
         <a:effectLst/>
+        <a:scene3d>
+          <a:camera prst="orthographicFront"/>
+          <a:lightRig rig="chilly" dir="t"/>
+        </a:scene3d>
         <a:sp3d z="-70000" extrusionH="1700" prstMaterial="translucentPowder">
           <a:bevelT w="25400" h="6350" prst="softRound"/>
           <a:bevelB w="0" h="0" prst="convex"/>
@@ -1596,6 +1652,10 @@
           <a:noFill/>
         </a:ln>
         <a:effectLst/>
+        <a:scene3d>
+          <a:camera prst="orthographicFront"/>
+          <a:lightRig rig="chilly" dir="t"/>
+        </a:scene3d>
         <a:sp3d prstMaterial="translucentPowder">
           <a:bevelT w="127000" h="25400" prst="softRound"/>
         </a:sp3d>
@@ -1670,6 +1730,10 @@
           <a:noFill/>
         </a:ln>
         <a:effectLst/>
+        <a:scene3d>
+          <a:camera prst="orthographicFront"/>
+          <a:lightRig rig="chilly" dir="t"/>
+        </a:scene3d>
         <a:sp3d z="-70000" extrusionH="1700" prstMaterial="translucentPowder">
           <a:bevelT w="25400" h="6350" prst="softRound"/>
           <a:bevelB w="0" h="0" prst="convex"/>
@@ -1739,6 +1803,10 @@
           <a:noFill/>
         </a:ln>
         <a:effectLst/>
+        <a:scene3d>
+          <a:camera prst="orthographicFront"/>
+          <a:lightRig rig="chilly" dir="t"/>
+        </a:scene3d>
         <a:sp3d prstMaterial="translucentPowder">
           <a:bevelT w="127000" h="25400" prst="softRound"/>
         </a:sp3d>
@@ -1776,13 +1844,8 @@
           </a:pPr>
           <a:r>
             <a:rPr lang="fr-FR" sz="1600" kern="1200"/>
-            <a:t>Co</a:t>
+            <a:t>Coûts de transmission physique</a:t>
           </a:r>
-          <a:r>
-            <a:rPr lang="fr-FR" sz="1600" kern="1200"/>
-            <a:t>ûts de transmission physique</a:t>
-          </a:r>
-          <a:endParaRPr lang="fr-FR" sz="1600" kern="1200"/>
         </a:p>
       </dsp:txBody>
       <dsp:txXfrm>
@@ -3830,11 +3893,11 @@
   <p:clrMapOvr>
     <a:masterClrMapping/>
   </p:clrMapOvr>
-  <mc:AlternateContent xmlns:mc="http://schemas.openxmlformats.org/markup-compatibility/2006">
-    <mc:Choice xmlns:p14="http://schemas.microsoft.com/office/powerpoint/2010/main" Requires="p14">
+  <mc:AlternateContent xmlns:mc="http://schemas.openxmlformats.org/markup-compatibility/2006" xmlns:p14="http://schemas.microsoft.com/office/powerpoint/2010/main">
+    <mc:Choice Requires="p14">
       <p:transition p14:dur="0"/>
     </mc:Choice>
-    <mc:Fallback>
+    <mc:Fallback xmlns="">
       <p:transition xmlns:p14="http://schemas.microsoft.com/office/powerpoint/2010/main"/>
     </mc:Fallback>
   </mc:AlternateContent>
@@ -5325,13 +5388,13 @@
   <p:clrMapOvr>
     <a:masterClrMapping/>
   </p:clrMapOvr>
-  <mc:AlternateContent xmlns:mc="http://schemas.openxmlformats.org/markup-compatibility/2006">
-    <mc:Choice xmlns:p14="http://schemas.microsoft.com/office/powerpoint/2010/main" Requires="p14">
+  <mc:AlternateContent xmlns:mc="http://schemas.openxmlformats.org/markup-compatibility/2006" xmlns:p14="http://schemas.microsoft.com/office/powerpoint/2010/main">
+    <mc:Choice Requires="p14">
       <p:transition spd="slow" p14:dur="1500">
         <p:split orient="vert"/>
       </p:transition>
     </mc:Choice>
-    <mc:Fallback>
+    <mc:Fallback xmlns="">
       <p:transition xmlns:p14="http://schemas.microsoft.com/office/powerpoint/2010/main" spd="slow">
         <p:split orient="vert"/>
       </p:transition>
@@ -7597,11 +7660,11 @@
   <p:clrMapOvr>
     <a:masterClrMapping/>
   </p:clrMapOvr>
-  <mc:AlternateContent xmlns:mc="http://schemas.openxmlformats.org/markup-compatibility/2006">
-    <mc:Choice xmlns:p14="http://schemas.microsoft.com/office/powerpoint/2010/main" Requires="p14">
+  <mc:AlternateContent xmlns:mc="http://schemas.openxmlformats.org/markup-compatibility/2006" xmlns:p14="http://schemas.microsoft.com/office/powerpoint/2010/main">
+    <mc:Choice Requires="p14">
       <p:transition p14:dur="0"/>
     </mc:Choice>
-    <mc:Fallback>
+    <mc:Fallback xmlns="">
       <p:transition xmlns:p14="http://schemas.microsoft.com/office/powerpoint/2010/main"/>
     </mc:Fallback>
   </mc:AlternateContent>
@@ -7874,7 +7937,6 @@
               <a:rPr lang="fr-FR"/>
               <a:t>état de l’art</a:t>
             </a:r>
-            <a:endParaRPr lang="fr-FR"/>
           </a:p>
         </p:txBody>
       </p:sp>
@@ -8022,7 +8084,6 @@
               <a:rPr lang="fr-FR"/>
               <a:t> le rayon d’émission maximum</a:t>
             </a:r>
-            <a:endParaRPr lang="fr-FR"/>
           </a:p>
           <a:p>
             <a:pPr>
@@ -8109,7 +8170,6 @@
               <a:rPr lang="fr-FR"/>
               <a:t>état de l’art</a:t>
             </a:r>
-            <a:endParaRPr lang="fr-FR"/>
           </a:p>
         </p:txBody>
       </p:sp>
@@ -8959,7 +9019,7 @@
         </p:nvSpPr>
         <p:spPr>
           <a:xfrm>
-            <a:off x="1623964" y="2699756"/>
+            <a:off x="1658469" y="2772576"/>
             <a:ext cx="2880321" cy="2880321"/>
           </a:xfrm>
           <a:prstGeom prst="ellipse">
@@ -9089,7 +9149,7 @@
         </p:nvSpPr>
         <p:spPr>
           <a:xfrm>
-            <a:off x="2966193" y="3144460"/>
+            <a:off x="2843807" y="3084775"/>
             <a:ext cx="2880321" cy="2880321"/>
           </a:xfrm>
           <a:prstGeom prst="ellipse">
@@ -9371,7 +9431,7 @@
         </p:nvSpPr>
         <p:spPr>
           <a:xfrm>
-            <a:off x="2849978" y="3869254"/>
+            <a:off x="2915816" y="4005064"/>
             <a:ext cx="428293" cy="407558"/>
           </a:xfrm>
           <a:prstGeom prst="ellipse">
@@ -9414,7 +9474,7 @@
         </p:nvSpPr>
         <p:spPr>
           <a:xfrm>
-            <a:off x="4219469" y="4352080"/>
+            <a:off x="4005322" y="4299744"/>
             <a:ext cx="428293" cy="407558"/>
           </a:xfrm>
           <a:prstGeom prst="ellipse">
@@ -9532,7 +9592,7 @@
         <p:spPr>
           <a:xfrm>
             <a:off x="2966193" y="3587328"/>
-            <a:ext cx="97932" cy="281926"/>
+            <a:ext cx="163770" cy="417736"/>
           </a:xfrm>
           <a:prstGeom prst="line">
             <a:avLst/>
@@ -9597,8 +9657,8 @@
         </p:nvCxnSpPr>
         <p:spPr>
           <a:xfrm flipV="1">
-            <a:off x="2540828" y="4217127"/>
-            <a:ext cx="371872" cy="418811"/>
+            <a:off x="2540828" y="4352937"/>
+            <a:ext cx="437710" cy="283001"/>
           </a:xfrm>
           <a:prstGeom prst="line">
             <a:avLst/>
@@ -9630,8 +9690,8 @@
         </p:nvCxnSpPr>
         <p:spPr>
           <a:xfrm>
-            <a:off x="3278271" y="4073033"/>
-            <a:ext cx="941198" cy="482826"/>
+            <a:off x="3344109" y="4208843"/>
+            <a:ext cx="661213" cy="294680"/>
           </a:xfrm>
           <a:prstGeom prst="line">
             <a:avLst/>
@@ -9685,6 +9745,65 @@
           </a:fontRef>
         </p:style>
       </p:cxnSp>
+      <p:sp>
+        <p:nvSpPr>
+          <p:cNvPr id="24" name="Espace réservé du contenu 6"/>
+          <p:cNvSpPr>
+            <a:spLocks noGrp="1"/>
+          </p:cNvSpPr>
+          <p:nvPr>
+            <p:ph idx="1"/>
+          </p:nvPr>
+        </p:nvSpPr>
+        <p:spPr>
+          <a:xfrm>
+            <a:off x="457200" y="1600201"/>
+            <a:ext cx="8229600" cy="4525963"/>
+          </a:xfrm>
+        </p:spPr>
+        <p:txBody>
+          <a:bodyPr>
+            <a:normAutofit/>
+          </a:bodyPr>
+          <a:lstStyle/>
+          <a:p>
+            <a:pPr algn="r"/>
+            <a:r>
+              <a:rPr lang="fr-FR"/>
+              <a:t>4 transmissions </a:t>
+            </a:r>
+          </a:p>
+          <a:p>
+            <a:pPr marL="0" indent="0" algn="r">
+              <a:buNone/>
+            </a:pPr>
+            <a:r>
+              <a:rPr lang="fr-FR"/>
+              <a:t>superflues</a:t>
+            </a:r>
+          </a:p>
+          <a:p>
+            <a:pPr algn="r"/>
+            <a:endParaRPr lang="fr-FR"/>
+          </a:p>
+          <a:p>
+            <a:pPr algn="r"/>
+            <a:r>
+              <a:rPr lang="fr-FR"/>
+              <a:t>Tous les nœuds</a:t>
+            </a:r>
+          </a:p>
+          <a:p>
+            <a:pPr marL="0" indent="0" algn="r">
+              <a:buNone/>
+            </a:pPr>
+            <a:r>
+              <a:rPr lang="fr-FR"/>
+              <a:t>couverts</a:t>
+            </a:r>
+          </a:p>
+        </p:txBody>
+      </p:sp>
     </p:spTree>
     <p:extLst>
       <p:ext uri="{BB962C8B-B14F-4D97-AF65-F5344CB8AC3E}">
@@ -9919,6 +10038,2256 @@
 </p:sld>
 </file>
 
+<file path=ppt/slides/slide17.xml><?xml version="1.0" encoding="utf-8"?>
+<p:sld xmlns:a="http://schemas.openxmlformats.org/drawingml/2006/main" xmlns:r="http://schemas.openxmlformats.org/officeDocument/2006/relationships" xmlns:p="http://schemas.openxmlformats.org/presentationml/2006/main">
+  <p:cSld>
+    <p:spTree>
+      <p:nvGrpSpPr>
+        <p:cNvPr id="1" name=""/>
+        <p:cNvGrpSpPr/>
+        <p:nvPr/>
+      </p:nvGrpSpPr>
+      <p:grpSpPr>
+        <a:xfrm>
+          <a:off x="0" y="0"/>
+          <a:ext cx="0" cy="0"/>
+          <a:chOff x="0" y="0"/>
+          <a:chExt cx="0" cy="0"/>
+        </a:xfrm>
+      </p:grpSpPr>
+      <p:sp>
+        <p:nvSpPr>
+          <p:cNvPr id="2" name="Titre 1"/>
+          <p:cNvSpPr>
+            <a:spLocks noGrp="1"/>
+          </p:cNvSpPr>
+          <p:nvPr>
+            <p:ph type="title"/>
+          </p:nvPr>
+        </p:nvSpPr>
+        <p:spPr/>
+        <p:txBody>
+          <a:bodyPr/>
+          <a:lstStyle/>
+          <a:p>
+            <a:r>
+              <a:rPr lang="fr-FR"/>
+              <a:t>Probabilistic flooding</a:t>
+            </a:r>
+          </a:p>
+        </p:txBody>
+      </p:sp>
+      <p:sp>
+        <p:nvSpPr>
+          <p:cNvPr id="45" name="Ellipse 44"/>
+          <p:cNvSpPr/>
+          <p:nvPr/>
+        </p:nvSpPr>
+        <p:spPr>
+          <a:xfrm>
+            <a:off x="1403647" y="1988839"/>
+            <a:ext cx="2880321" cy="2880321"/>
+          </a:xfrm>
+          <a:prstGeom prst="ellipse">
+            <a:avLst/>
+          </a:prstGeom>
+          <a:gradFill flip="none" rotWithShape="1">
+            <a:gsLst>
+              <a:gs pos="0">
+                <a:schemeClr val="accent5">
+                  <a:tint val="50000"/>
+                  <a:satMod val="300000"/>
+                  <a:alpha val="66000"/>
+                </a:schemeClr>
+              </a:gs>
+              <a:gs pos="35000">
+                <a:schemeClr val="accent5">
+                  <a:tint val="37000"/>
+                  <a:satMod val="300000"/>
+                  <a:alpha val="66000"/>
+                </a:schemeClr>
+              </a:gs>
+              <a:gs pos="100000">
+                <a:schemeClr val="accent5">
+                  <a:tint val="15000"/>
+                  <a:satMod val="350000"/>
+                  <a:alpha val="66000"/>
+                </a:schemeClr>
+              </a:gs>
+            </a:gsLst>
+            <a:lin ang="16200000" scaled="1"/>
+            <a:tileRect/>
+          </a:gradFill>
+        </p:spPr>
+        <p:style>
+          <a:lnRef idx="1">
+            <a:schemeClr val="accent5"/>
+          </a:lnRef>
+          <a:fillRef idx="2">
+            <a:schemeClr val="accent5"/>
+          </a:fillRef>
+          <a:effectRef idx="1">
+            <a:schemeClr val="accent5"/>
+          </a:effectRef>
+          <a:fontRef idx="minor">
+            <a:schemeClr val="dk1"/>
+          </a:fontRef>
+        </p:style>
+        <p:txBody>
+          <a:bodyPr rtlCol="0" anchor="ctr"/>
+          <a:lstStyle/>
+          <a:p>
+            <a:pPr algn="ctr"/>
+            <a:endParaRPr lang="fr-FR"/>
+          </a:p>
+        </p:txBody>
+      </p:sp>
+      <p:sp>
+        <p:nvSpPr>
+          <p:cNvPr id="87" name="Ellipse 86"/>
+          <p:cNvSpPr/>
+          <p:nvPr/>
+        </p:nvSpPr>
+        <p:spPr>
+          <a:xfrm>
+            <a:off x="1853237" y="1471759"/>
+            <a:ext cx="2880321" cy="2880321"/>
+          </a:xfrm>
+          <a:prstGeom prst="ellipse">
+            <a:avLst/>
+          </a:prstGeom>
+          <a:gradFill flip="none" rotWithShape="1">
+            <a:gsLst>
+              <a:gs pos="0">
+                <a:schemeClr val="accent5">
+                  <a:tint val="50000"/>
+                  <a:satMod val="300000"/>
+                  <a:alpha val="51000"/>
+                </a:schemeClr>
+              </a:gs>
+              <a:gs pos="35000">
+                <a:schemeClr val="accent5">
+                  <a:tint val="37000"/>
+                  <a:satMod val="300000"/>
+                  <a:alpha val="51000"/>
+                </a:schemeClr>
+              </a:gs>
+              <a:gs pos="100000">
+                <a:schemeClr val="accent5">
+                  <a:tint val="15000"/>
+                  <a:satMod val="350000"/>
+                  <a:alpha val="51000"/>
+                </a:schemeClr>
+              </a:gs>
+            </a:gsLst>
+            <a:lin ang="16200000" scaled="1"/>
+            <a:tileRect/>
+          </a:gradFill>
+        </p:spPr>
+        <p:style>
+          <a:lnRef idx="1">
+            <a:schemeClr val="accent5"/>
+          </a:lnRef>
+          <a:fillRef idx="2">
+            <a:schemeClr val="accent5"/>
+          </a:fillRef>
+          <a:effectRef idx="1">
+            <a:schemeClr val="accent5"/>
+          </a:effectRef>
+          <a:fontRef idx="minor">
+            <a:schemeClr val="dk1"/>
+          </a:fontRef>
+        </p:style>
+        <p:txBody>
+          <a:bodyPr rtlCol="0" anchor="ctr"/>
+          <a:lstStyle/>
+          <a:p>
+            <a:pPr algn="ctr"/>
+            <a:endParaRPr lang="fr-FR"/>
+          </a:p>
+        </p:txBody>
+      </p:sp>
+      <p:sp>
+        <p:nvSpPr>
+          <p:cNvPr id="86" name="Ellipse 85"/>
+          <p:cNvSpPr/>
+          <p:nvPr/>
+        </p:nvSpPr>
+        <p:spPr>
+          <a:xfrm>
+            <a:off x="949243" y="3319477"/>
+            <a:ext cx="2880321" cy="2880321"/>
+          </a:xfrm>
+          <a:prstGeom prst="ellipse">
+            <a:avLst/>
+          </a:prstGeom>
+          <a:gradFill flip="none" rotWithShape="1">
+            <a:gsLst>
+              <a:gs pos="0">
+                <a:schemeClr val="accent5">
+                  <a:tint val="50000"/>
+                  <a:satMod val="300000"/>
+                  <a:alpha val="48000"/>
+                </a:schemeClr>
+              </a:gs>
+              <a:gs pos="35000">
+                <a:schemeClr val="accent5">
+                  <a:tint val="37000"/>
+                  <a:satMod val="300000"/>
+                  <a:alpha val="48000"/>
+                </a:schemeClr>
+              </a:gs>
+              <a:gs pos="100000">
+                <a:schemeClr val="accent5">
+                  <a:tint val="15000"/>
+                  <a:satMod val="350000"/>
+                  <a:alpha val="48000"/>
+                </a:schemeClr>
+              </a:gs>
+            </a:gsLst>
+            <a:lin ang="16200000" scaled="1"/>
+            <a:tileRect/>
+          </a:gradFill>
+        </p:spPr>
+        <p:style>
+          <a:lnRef idx="1">
+            <a:schemeClr val="accent5"/>
+          </a:lnRef>
+          <a:fillRef idx="2">
+            <a:schemeClr val="accent5"/>
+          </a:fillRef>
+          <a:effectRef idx="1">
+            <a:schemeClr val="accent5"/>
+          </a:effectRef>
+          <a:fontRef idx="minor">
+            <a:schemeClr val="dk1"/>
+          </a:fontRef>
+        </p:style>
+        <p:txBody>
+          <a:bodyPr rtlCol="0" anchor="ctr"/>
+          <a:lstStyle/>
+          <a:p>
+            <a:pPr algn="ctr"/>
+            <a:endParaRPr lang="fr-FR"/>
+          </a:p>
+        </p:txBody>
+      </p:sp>
+      <p:sp>
+        <p:nvSpPr>
+          <p:cNvPr id="4" name="Espace réservé du numéro de diapositive 3"/>
+          <p:cNvSpPr>
+            <a:spLocks noGrp="1"/>
+          </p:cNvSpPr>
+          <p:nvPr>
+            <p:ph type="sldNum" sz="quarter" idx="12"/>
+          </p:nvPr>
+        </p:nvSpPr>
+        <p:spPr/>
+        <p:txBody>
+          <a:bodyPr/>
+          <a:lstStyle/>
+          <a:p>
+            <a:fld id="{632DADDA-56E0-0F4D-8444-EEC8234C8BEB}" type="slidenum">
+              <a:rPr lang="fr-FR"/>
+              <a:t>17</a:t>
+            </a:fld>
+            <a:endParaRPr lang="fr-FR"/>
+          </a:p>
+        </p:txBody>
+      </p:sp>
+      <p:sp>
+        <p:nvSpPr>
+          <p:cNvPr id="5" name="Espace réservé du texte 4"/>
+          <p:cNvSpPr>
+            <a:spLocks noGrp="1"/>
+          </p:cNvSpPr>
+          <p:nvPr>
+            <p:ph type="body" sz="quarter" idx="13"/>
+          </p:nvPr>
+        </p:nvSpPr>
+        <p:spPr/>
+        <p:txBody>
+          <a:bodyPr/>
+          <a:lstStyle/>
+          <a:p>
+            <a:r>
+              <a:rPr lang="fr-FR"/>
+              <a:t>état de l’art</a:t>
+            </a:r>
+          </a:p>
+        </p:txBody>
+      </p:sp>
+      <p:sp>
+        <p:nvSpPr>
+          <p:cNvPr id="7" name="Ellipse 6"/>
+          <p:cNvSpPr/>
+          <p:nvPr/>
+        </p:nvSpPr>
+        <p:spPr>
+          <a:xfrm>
+            <a:off x="2600622" y="3239455"/>
+            <a:ext cx="428293" cy="407558"/>
+          </a:xfrm>
+          <a:prstGeom prst="ellipse">
+            <a:avLst/>
+          </a:prstGeom>
+        </p:spPr>
+        <p:style>
+          <a:lnRef idx="1">
+            <a:schemeClr val="dk1"/>
+          </a:lnRef>
+          <a:fillRef idx="3">
+            <a:schemeClr val="dk1"/>
+          </a:fillRef>
+          <a:effectRef idx="2">
+            <a:schemeClr val="dk1"/>
+          </a:effectRef>
+          <a:fontRef idx="minor">
+            <a:schemeClr val="lt1"/>
+          </a:fontRef>
+        </p:style>
+        <p:txBody>
+          <a:bodyPr rtlCol="0" anchor="ctr">
+            <a:normAutofit fontScale="85000" lnSpcReduction="20000"/>
+          </a:bodyPr>
+          <a:lstStyle/>
+          <a:p>
+            <a:pPr algn="ctr"/>
+            <a:r>
+              <a:rPr lang="fr-FR"/>
+              <a:t>A</a:t>
+            </a:r>
+          </a:p>
+        </p:txBody>
+      </p:sp>
+      <p:sp>
+        <p:nvSpPr>
+          <p:cNvPr id="8" name="Ellipse 7"/>
+          <p:cNvSpPr/>
+          <p:nvPr/>
+        </p:nvSpPr>
+        <p:spPr>
+          <a:xfrm>
+            <a:off x="3064125" y="2736902"/>
+            <a:ext cx="428293" cy="407558"/>
+          </a:xfrm>
+          <a:prstGeom prst="ellipse">
+            <a:avLst/>
+          </a:prstGeom>
+        </p:spPr>
+        <p:style>
+          <a:lnRef idx="1">
+            <a:schemeClr val="dk1"/>
+          </a:lnRef>
+          <a:fillRef idx="3">
+            <a:schemeClr val="dk1"/>
+          </a:fillRef>
+          <a:effectRef idx="2">
+            <a:schemeClr val="dk1"/>
+          </a:effectRef>
+          <a:fontRef idx="minor">
+            <a:schemeClr val="lt1"/>
+          </a:fontRef>
+        </p:style>
+        <p:txBody>
+          <a:bodyPr rtlCol="0" anchor="ctr">
+            <a:normAutofit fontScale="85000" lnSpcReduction="20000"/>
+          </a:bodyPr>
+          <a:lstStyle/>
+          <a:p>
+            <a:pPr algn="ctr"/>
+            <a:r>
+              <a:rPr lang="fr-FR"/>
+              <a:t>B</a:t>
+            </a:r>
+          </a:p>
+        </p:txBody>
+      </p:sp>
+      <p:sp>
+        <p:nvSpPr>
+          <p:cNvPr id="10" name="Ellipse 9"/>
+          <p:cNvSpPr/>
+          <p:nvPr/>
+        </p:nvSpPr>
+        <p:spPr>
+          <a:xfrm>
+            <a:off x="1853237" y="2495977"/>
+            <a:ext cx="428293" cy="407558"/>
+          </a:xfrm>
+          <a:prstGeom prst="ellipse">
+            <a:avLst/>
+          </a:prstGeom>
+        </p:spPr>
+        <p:style>
+          <a:lnRef idx="1">
+            <a:schemeClr val="dk1"/>
+          </a:lnRef>
+          <a:fillRef idx="3">
+            <a:schemeClr val="dk1"/>
+          </a:fillRef>
+          <a:effectRef idx="2">
+            <a:schemeClr val="dk1"/>
+          </a:effectRef>
+          <a:fontRef idx="minor">
+            <a:schemeClr val="lt1"/>
+          </a:fontRef>
+        </p:style>
+        <p:txBody>
+          <a:bodyPr rtlCol="0" anchor="ctr">
+            <a:normAutofit fontScale="85000" lnSpcReduction="20000"/>
+          </a:bodyPr>
+          <a:lstStyle/>
+          <a:p>
+            <a:pPr algn="ctr"/>
+            <a:r>
+              <a:rPr lang="fr-FR"/>
+              <a:t>C</a:t>
+            </a:r>
+          </a:p>
+        </p:txBody>
+      </p:sp>
+      <p:sp>
+        <p:nvSpPr>
+          <p:cNvPr id="11" name="Ellipse 10"/>
+          <p:cNvSpPr/>
+          <p:nvPr/>
+        </p:nvSpPr>
+        <p:spPr>
+          <a:xfrm>
+            <a:off x="2175257" y="4576253"/>
+            <a:ext cx="428293" cy="407558"/>
+          </a:xfrm>
+          <a:prstGeom prst="ellipse">
+            <a:avLst/>
+          </a:prstGeom>
+        </p:spPr>
+        <p:style>
+          <a:lnRef idx="1">
+            <a:schemeClr val="dk1"/>
+          </a:lnRef>
+          <a:fillRef idx="3">
+            <a:schemeClr val="dk1"/>
+          </a:fillRef>
+          <a:effectRef idx="2">
+            <a:schemeClr val="dk1"/>
+          </a:effectRef>
+          <a:fontRef idx="minor">
+            <a:schemeClr val="lt1"/>
+          </a:fontRef>
+        </p:style>
+        <p:txBody>
+          <a:bodyPr rtlCol="0" anchor="ctr">
+            <a:normAutofit fontScale="85000" lnSpcReduction="20000"/>
+          </a:bodyPr>
+          <a:lstStyle/>
+          <a:p>
+            <a:pPr algn="ctr"/>
+            <a:r>
+              <a:rPr lang="fr-FR"/>
+              <a:t>D</a:t>
+            </a:r>
+          </a:p>
+        </p:txBody>
+      </p:sp>
+      <p:sp>
+        <p:nvSpPr>
+          <p:cNvPr id="12" name="Ellipse 11"/>
+          <p:cNvSpPr/>
+          <p:nvPr/>
+        </p:nvSpPr>
+        <p:spPr>
+          <a:xfrm>
+            <a:off x="2915816" y="4005064"/>
+            <a:ext cx="428293" cy="407558"/>
+          </a:xfrm>
+          <a:prstGeom prst="ellipse">
+            <a:avLst/>
+          </a:prstGeom>
+        </p:spPr>
+        <p:style>
+          <a:lnRef idx="1">
+            <a:schemeClr val="dk1"/>
+          </a:lnRef>
+          <a:fillRef idx="3">
+            <a:schemeClr val="dk1"/>
+          </a:fillRef>
+          <a:effectRef idx="2">
+            <a:schemeClr val="dk1"/>
+          </a:effectRef>
+          <a:fontRef idx="minor">
+            <a:schemeClr val="lt1"/>
+          </a:fontRef>
+        </p:style>
+        <p:txBody>
+          <a:bodyPr rtlCol="0" anchor="ctr">
+            <a:normAutofit fontScale="85000" lnSpcReduction="20000"/>
+          </a:bodyPr>
+          <a:lstStyle/>
+          <a:p>
+            <a:pPr algn="ctr"/>
+            <a:r>
+              <a:rPr lang="fr-FR"/>
+              <a:t>E</a:t>
+            </a:r>
+          </a:p>
+        </p:txBody>
+      </p:sp>
+      <p:sp>
+        <p:nvSpPr>
+          <p:cNvPr id="13" name="Ellipse 12"/>
+          <p:cNvSpPr/>
+          <p:nvPr/>
+        </p:nvSpPr>
+        <p:spPr>
+          <a:xfrm>
+            <a:off x="3995936" y="4312290"/>
+            <a:ext cx="428293" cy="407558"/>
+          </a:xfrm>
+          <a:prstGeom prst="ellipse">
+            <a:avLst/>
+          </a:prstGeom>
+        </p:spPr>
+        <p:style>
+          <a:lnRef idx="1">
+            <a:schemeClr val="dk1"/>
+          </a:lnRef>
+          <a:fillRef idx="3">
+            <a:schemeClr val="dk1"/>
+          </a:fillRef>
+          <a:effectRef idx="2">
+            <a:schemeClr val="dk1"/>
+          </a:effectRef>
+          <a:fontRef idx="minor">
+            <a:schemeClr val="lt1"/>
+          </a:fontRef>
+        </p:style>
+        <p:txBody>
+          <a:bodyPr rtlCol="0" anchor="ctr">
+            <a:normAutofit fontScale="85000" lnSpcReduction="20000"/>
+          </a:bodyPr>
+          <a:lstStyle/>
+          <a:p>
+            <a:pPr algn="ctr"/>
+            <a:r>
+              <a:rPr lang="fr-FR"/>
+              <a:t>F</a:t>
+            </a:r>
+          </a:p>
+        </p:txBody>
+      </p:sp>
+      <p:cxnSp>
+        <p:nvCxnSpPr>
+          <p:cNvPr id="15" name="Connecteur droit 14"/>
+          <p:cNvCxnSpPr>
+            <a:stCxn id="10" idx="5"/>
+            <a:endCxn id="7" idx="1"/>
+          </p:cNvCxnSpPr>
+          <p:nvPr/>
+        </p:nvCxnSpPr>
+        <p:spPr>
+          <a:xfrm>
+            <a:off x="2218808" y="2843850"/>
+            <a:ext cx="444536" cy="455290"/>
+          </a:xfrm>
+          <a:prstGeom prst="line">
+            <a:avLst/>
+          </a:prstGeom>
+          <a:ln>
+            <a:solidFill>
+              <a:srgbClr val="800A07"/>
+            </a:solidFill>
+          </a:ln>
+        </p:spPr>
+        <p:style>
+          <a:lnRef idx="2">
+            <a:schemeClr val="accent1"/>
+          </a:lnRef>
+          <a:fillRef idx="0">
+            <a:schemeClr val="accent1"/>
+          </a:fillRef>
+          <a:effectRef idx="1">
+            <a:schemeClr val="accent1"/>
+          </a:effectRef>
+          <a:fontRef idx="minor">
+            <a:schemeClr val="tx1"/>
+          </a:fontRef>
+        </p:style>
+      </p:cxnSp>
+      <p:cxnSp>
+        <p:nvCxnSpPr>
+          <p:cNvPr id="19" name="Connecteur droit 18"/>
+          <p:cNvCxnSpPr>
+            <a:stCxn id="7" idx="7"/>
+            <a:endCxn id="8" idx="3"/>
+          </p:cNvCxnSpPr>
+          <p:nvPr/>
+        </p:nvCxnSpPr>
+        <p:spPr>
+          <a:xfrm flipV="1">
+            <a:off x="2966193" y="3084775"/>
+            <a:ext cx="160654" cy="214365"/>
+          </a:xfrm>
+          <a:prstGeom prst="line">
+            <a:avLst/>
+          </a:prstGeom>
+        </p:spPr>
+        <p:style>
+          <a:lnRef idx="2">
+            <a:schemeClr val="accent1"/>
+          </a:lnRef>
+          <a:fillRef idx="0">
+            <a:schemeClr val="accent1"/>
+          </a:fillRef>
+          <a:effectRef idx="1">
+            <a:schemeClr val="accent1"/>
+          </a:effectRef>
+          <a:fontRef idx="minor">
+            <a:schemeClr val="tx1"/>
+          </a:fontRef>
+        </p:style>
+      </p:cxnSp>
+      <p:cxnSp>
+        <p:nvCxnSpPr>
+          <p:cNvPr id="21" name="Connecteur droit 20"/>
+          <p:cNvCxnSpPr>
+            <a:stCxn id="7" idx="5"/>
+            <a:endCxn id="12" idx="0"/>
+          </p:cNvCxnSpPr>
+          <p:nvPr/>
+        </p:nvCxnSpPr>
+        <p:spPr>
+          <a:xfrm>
+            <a:off x="2966193" y="3587328"/>
+            <a:ext cx="163770" cy="417736"/>
+          </a:xfrm>
+          <a:prstGeom prst="line">
+            <a:avLst/>
+          </a:prstGeom>
+        </p:spPr>
+        <p:style>
+          <a:lnRef idx="2">
+            <a:schemeClr val="accent1"/>
+          </a:lnRef>
+          <a:fillRef idx="0">
+            <a:schemeClr val="accent1"/>
+          </a:fillRef>
+          <a:effectRef idx="1">
+            <a:schemeClr val="accent1"/>
+          </a:effectRef>
+          <a:fontRef idx="minor">
+            <a:schemeClr val="tx1"/>
+          </a:fontRef>
+        </p:style>
+      </p:cxnSp>
+      <p:cxnSp>
+        <p:nvCxnSpPr>
+          <p:cNvPr id="30" name="Connecteur droit 29"/>
+          <p:cNvCxnSpPr>
+            <a:stCxn id="7" idx="3"/>
+            <a:endCxn id="11" idx="0"/>
+          </p:cNvCxnSpPr>
+          <p:nvPr/>
+        </p:nvCxnSpPr>
+        <p:spPr>
+          <a:xfrm flipH="1">
+            <a:off x="2389404" y="3587328"/>
+            <a:ext cx="273940" cy="988925"/>
+          </a:xfrm>
+          <a:prstGeom prst="line">
+            <a:avLst/>
+          </a:prstGeom>
+        </p:spPr>
+        <p:style>
+          <a:lnRef idx="2">
+            <a:schemeClr val="accent1"/>
+          </a:lnRef>
+          <a:fillRef idx="0">
+            <a:schemeClr val="accent1"/>
+          </a:fillRef>
+          <a:effectRef idx="1">
+            <a:schemeClr val="accent1"/>
+          </a:effectRef>
+          <a:fontRef idx="minor">
+            <a:schemeClr val="tx1"/>
+          </a:fontRef>
+        </p:style>
+      </p:cxnSp>
+      <p:cxnSp>
+        <p:nvCxnSpPr>
+          <p:cNvPr id="32" name="Connecteur droit 31"/>
+          <p:cNvCxnSpPr>
+            <a:stCxn id="11" idx="7"/>
+            <a:endCxn id="12" idx="3"/>
+          </p:cNvCxnSpPr>
+          <p:nvPr/>
+        </p:nvCxnSpPr>
+        <p:spPr>
+          <a:xfrm flipV="1">
+            <a:off x="2540828" y="4352937"/>
+            <a:ext cx="437710" cy="283001"/>
+          </a:xfrm>
+          <a:prstGeom prst="line">
+            <a:avLst/>
+          </a:prstGeom>
+        </p:spPr>
+        <p:style>
+          <a:lnRef idx="2">
+            <a:schemeClr val="accent1"/>
+          </a:lnRef>
+          <a:fillRef idx="0">
+            <a:schemeClr val="accent1"/>
+          </a:fillRef>
+          <a:effectRef idx="1">
+            <a:schemeClr val="accent1"/>
+          </a:effectRef>
+          <a:fontRef idx="minor">
+            <a:schemeClr val="tx1"/>
+          </a:fontRef>
+        </p:style>
+      </p:cxnSp>
+      <p:cxnSp>
+        <p:nvCxnSpPr>
+          <p:cNvPr id="34" name="Connecteur droit 33"/>
+          <p:cNvCxnSpPr>
+            <a:stCxn id="12" idx="6"/>
+            <a:endCxn id="13" idx="2"/>
+          </p:cNvCxnSpPr>
+          <p:nvPr/>
+        </p:nvCxnSpPr>
+        <p:spPr>
+          <a:xfrm>
+            <a:off x="3344109" y="4208843"/>
+            <a:ext cx="651827" cy="307226"/>
+          </a:xfrm>
+          <a:prstGeom prst="line">
+            <a:avLst/>
+          </a:prstGeom>
+        </p:spPr>
+        <p:style>
+          <a:lnRef idx="2">
+            <a:schemeClr val="accent1"/>
+          </a:lnRef>
+          <a:fillRef idx="0">
+            <a:schemeClr val="accent1"/>
+          </a:fillRef>
+          <a:effectRef idx="1">
+            <a:schemeClr val="accent1"/>
+          </a:effectRef>
+          <a:fontRef idx="minor">
+            <a:schemeClr val="tx1"/>
+          </a:fontRef>
+        </p:style>
+      </p:cxnSp>
+      <p:cxnSp>
+        <p:nvCxnSpPr>
+          <p:cNvPr id="38" name="Connecteur droit 37"/>
+          <p:cNvCxnSpPr>
+            <a:stCxn id="8" idx="2"/>
+            <a:endCxn id="10" idx="6"/>
+          </p:cNvCxnSpPr>
+          <p:nvPr/>
+        </p:nvCxnSpPr>
+        <p:spPr>
+          <a:xfrm flipH="1" flipV="1">
+            <a:off x="2281530" y="2699756"/>
+            <a:ext cx="782595" cy="240925"/>
+          </a:xfrm>
+          <a:prstGeom prst="line">
+            <a:avLst/>
+          </a:prstGeom>
+        </p:spPr>
+        <p:style>
+          <a:lnRef idx="2">
+            <a:schemeClr val="accent1"/>
+          </a:lnRef>
+          <a:fillRef idx="0">
+            <a:schemeClr val="accent1"/>
+          </a:fillRef>
+          <a:effectRef idx="1">
+            <a:schemeClr val="accent1"/>
+          </a:effectRef>
+          <a:fontRef idx="minor">
+            <a:schemeClr val="tx1"/>
+          </a:fontRef>
+        </p:style>
+      </p:cxnSp>
+      <p:sp>
+        <p:nvSpPr>
+          <p:cNvPr id="24" name="Espace réservé du contenu 6"/>
+          <p:cNvSpPr>
+            <a:spLocks noGrp="1"/>
+          </p:cNvSpPr>
+          <p:nvPr>
+            <p:ph idx="1"/>
+          </p:nvPr>
+        </p:nvSpPr>
+        <p:spPr>
+          <a:xfrm>
+            <a:off x="457200" y="1600201"/>
+            <a:ext cx="8229600" cy="4525963"/>
+          </a:xfrm>
+        </p:spPr>
+        <p:txBody>
+          <a:bodyPr>
+            <a:normAutofit/>
+          </a:bodyPr>
+          <a:lstStyle/>
+          <a:p>
+            <a:pPr algn="r"/>
+            <a:r>
+              <a:rPr lang="fr-FR"/>
+              <a:t>exemple : P = 0.5</a:t>
+            </a:r>
+          </a:p>
+          <a:p>
+            <a:pPr algn="r"/>
+            <a:endParaRPr lang="fr-FR"/>
+          </a:p>
+          <a:p>
+            <a:pPr algn="r"/>
+            <a:r>
+              <a:rPr lang="fr-FR"/>
+              <a:t>2 transmissions </a:t>
+            </a:r>
+          </a:p>
+          <a:p>
+            <a:pPr marL="0" indent="0" algn="r">
+              <a:buNone/>
+            </a:pPr>
+            <a:r>
+              <a:rPr lang="fr-FR"/>
+              <a:t>superflues</a:t>
+            </a:r>
+          </a:p>
+          <a:p>
+            <a:pPr algn="r"/>
+            <a:endParaRPr lang="fr-FR"/>
+          </a:p>
+          <a:p>
+            <a:pPr algn="r"/>
+            <a:r>
+              <a:rPr lang="fr-FR"/>
+              <a:t>1 nœud non </a:t>
+            </a:r>
+          </a:p>
+          <a:p>
+            <a:pPr marL="0" indent="0" algn="r">
+              <a:buNone/>
+            </a:pPr>
+            <a:r>
+              <a:rPr lang="fr-FR"/>
+              <a:t>couvert</a:t>
+            </a:r>
+          </a:p>
+        </p:txBody>
+      </p:sp>
+    </p:spTree>
+    <p:extLst>
+      <p:ext uri="{BB962C8B-B14F-4D97-AF65-F5344CB8AC3E}">
+        <p14:creationId xmlns:p14="http://schemas.microsoft.com/office/powerpoint/2010/main" val="471546121"/>
+      </p:ext>
+    </p:extLst>
+  </p:cSld>
+  <p:clrMapOvr>
+    <a:masterClrMapping/>
+  </p:clrMapOvr>
+  <p:timing>
+    <p:tnLst>
+      <p:par>
+        <p:cTn xmlns:p14="http://schemas.microsoft.com/office/powerpoint/2010/main" id="1" dur="indefinite" restart="never" nodeType="tmRoot">
+          <p:childTnLst>
+            <p:seq concurrent="1" nextAc="seek">
+              <p:cTn id="2" dur="indefinite" nodeType="mainSeq">
+                <p:childTnLst>
+                  <p:par>
+                    <p:cTn id="3" fill="hold">
+                      <p:stCondLst>
+                        <p:cond delay="indefinite"/>
+                        <p:cond evt="onBegin" delay="0">
+                          <p:tn val="2"/>
+                        </p:cond>
+                      </p:stCondLst>
+                      <p:childTnLst>
+                        <p:par>
+                          <p:cTn id="4" fill="hold">
+                            <p:stCondLst>
+                              <p:cond delay="0"/>
+                            </p:stCondLst>
+                            <p:childTnLst>
+                              <p:par>
+                                <p:cTn id="5" presetID="1" presetClass="entr" presetSubtype="0" fill="hold" grpId="0" nodeType="withEffect">
+                                  <p:stCondLst>
+                                    <p:cond delay="500"/>
+                                  </p:stCondLst>
+                                  <p:childTnLst>
+                                    <p:set>
+                                      <p:cBhvr>
+                                        <p:cTn id="6" dur="1" fill="hold">
+                                          <p:stCondLst>
+                                            <p:cond delay="0"/>
+                                          </p:stCondLst>
+                                        </p:cTn>
+                                        <p:tgtEl>
+                                          <p:spTgt spid="45"/>
+                                        </p:tgtEl>
+                                        <p:attrNameLst>
+                                          <p:attrName>style.visibility</p:attrName>
+                                        </p:attrNameLst>
+                                      </p:cBhvr>
+                                      <p:to>
+                                        <p:strVal val="visible"/>
+                                      </p:to>
+                                    </p:set>
+                                  </p:childTnLst>
+                                </p:cTn>
+                              </p:par>
+                              <p:par>
+                                <p:cTn id="7" presetID="1" presetClass="entr" presetSubtype="0" fill="hold" grpId="0" nodeType="withEffect">
+                                  <p:stCondLst>
+                                    <p:cond delay="1000"/>
+                                  </p:stCondLst>
+                                  <p:childTnLst>
+                                    <p:set>
+                                      <p:cBhvr>
+                                        <p:cTn id="8" dur="1" fill="hold">
+                                          <p:stCondLst>
+                                            <p:cond delay="0"/>
+                                          </p:stCondLst>
+                                        </p:cTn>
+                                        <p:tgtEl>
+                                          <p:spTgt spid="87"/>
+                                        </p:tgtEl>
+                                        <p:attrNameLst>
+                                          <p:attrName>style.visibility</p:attrName>
+                                        </p:attrNameLst>
+                                      </p:cBhvr>
+                                      <p:to>
+                                        <p:strVal val="visible"/>
+                                      </p:to>
+                                    </p:set>
+                                  </p:childTnLst>
+                                </p:cTn>
+                              </p:par>
+                              <p:par>
+                                <p:cTn id="9" presetID="1" presetClass="entr" presetSubtype="0" fill="hold" grpId="0" nodeType="withEffect">
+                                  <p:stCondLst>
+                                    <p:cond delay="1500"/>
+                                  </p:stCondLst>
+                                  <p:childTnLst>
+                                    <p:set>
+                                      <p:cBhvr>
+                                        <p:cTn id="10" dur="1" fill="hold">
+                                          <p:stCondLst>
+                                            <p:cond delay="0"/>
+                                          </p:stCondLst>
+                                        </p:cTn>
+                                        <p:tgtEl>
+                                          <p:spTgt spid="86"/>
+                                        </p:tgtEl>
+                                        <p:attrNameLst>
+                                          <p:attrName>style.visibility</p:attrName>
+                                        </p:attrNameLst>
+                                      </p:cBhvr>
+                                      <p:to>
+                                        <p:strVal val="visible"/>
+                                      </p:to>
+                                    </p:set>
+                                  </p:childTnLst>
+                                </p:cTn>
+                              </p:par>
+                            </p:childTnLst>
+                          </p:cTn>
+                        </p:par>
+                      </p:childTnLst>
+                    </p:cTn>
+                  </p:par>
+                </p:childTnLst>
+              </p:cTn>
+              <p:prevCondLst>
+                <p:cond evt="onPrev" delay="0">
+                  <p:tgtEl>
+                    <p:sldTgt/>
+                  </p:tgtEl>
+                </p:cond>
+              </p:prevCondLst>
+              <p:nextCondLst>
+                <p:cond evt="onNext" delay="0">
+                  <p:tgtEl>
+                    <p:sldTgt/>
+                  </p:tgtEl>
+                </p:cond>
+              </p:nextCondLst>
+            </p:seq>
+          </p:childTnLst>
+        </p:cTn>
+      </p:par>
+    </p:tnLst>
+    <p:bldLst>
+      <p:bldP spid="45" grpId="0" animBg="1"/>
+      <p:bldP spid="87" grpId="0" animBg="1"/>
+      <p:bldP spid="86" grpId="0" animBg="1"/>
+    </p:bldLst>
+  </p:timing>
+</p:sld>
+</file>
+
+<file path=ppt/slides/slide18.xml><?xml version="1.0" encoding="utf-8"?>
+<p:sld xmlns:a="http://schemas.openxmlformats.org/drawingml/2006/main" xmlns:r="http://schemas.openxmlformats.org/officeDocument/2006/relationships" xmlns:p="http://schemas.openxmlformats.org/presentationml/2006/main">
+  <p:cSld>
+    <p:spTree>
+      <p:nvGrpSpPr>
+        <p:cNvPr id="1" name=""/>
+        <p:cNvGrpSpPr/>
+        <p:nvPr/>
+      </p:nvGrpSpPr>
+      <p:grpSpPr>
+        <a:xfrm>
+          <a:off x="0" y="0"/>
+          <a:ext cx="0" cy="0"/>
+          <a:chOff x="0" y="0"/>
+          <a:chExt cx="0" cy="0"/>
+        </a:xfrm>
+      </p:grpSpPr>
+      <p:sp>
+        <p:nvSpPr>
+          <p:cNvPr id="2" name="Titre 1"/>
+          <p:cNvSpPr>
+            <a:spLocks noGrp="1"/>
+          </p:cNvSpPr>
+          <p:nvPr>
+            <p:ph type="title"/>
+          </p:nvPr>
+        </p:nvSpPr>
+        <p:spPr/>
+        <p:txBody>
+          <a:bodyPr/>
+          <a:lstStyle/>
+          <a:p>
+            <a:r>
+              <a:rPr lang="fr-FR"/>
+              <a:t>Broadcast Incremental-power Protocol</a:t>
+            </a:r>
+          </a:p>
+        </p:txBody>
+      </p:sp>
+      <p:sp>
+        <p:nvSpPr>
+          <p:cNvPr id="45" name="Ellipse 44"/>
+          <p:cNvSpPr/>
+          <p:nvPr/>
+        </p:nvSpPr>
+        <p:spPr>
+          <a:xfrm>
+            <a:off x="1743919" y="2407650"/>
+            <a:ext cx="2108001" cy="2101470"/>
+          </a:xfrm>
+          <a:prstGeom prst="ellipse">
+            <a:avLst/>
+          </a:prstGeom>
+          <a:gradFill flip="none" rotWithShape="1">
+            <a:gsLst>
+              <a:gs pos="0">
+                <a:schemeClr val="accent5">
+                  <a:tint val="50000"/>
+                  <a:satMod val="300000"/>
+                  <a:alpha val="66000"/>
+                </a:schemeClr>
+              </a:gs>
+              <a:gs pos="35000">
+                <a:schemeClr val="accent5">
+                  <a:tint val="37000"/>
+                  <a:satMod val="300000"/>
+                  <a:alpha val="66000"/>
+                </a:schemeClr>
+              </a:gs>
+              <a:gs pos="100000">
+                <a:schemeClr val="accent5">
+                  <a:tint val="15000"/>
+                  <a:satMod val="350000"/>
+                  <a:alpha val="66000"/>
+                </a:schemeClr>
+              </a:gs>
+            </a:gsLst>
+            <a:lin ang="16200000" scaled="1"/>
+            <a:tileRect/>
+          </a:gradFill>
+        </p:spPr>
+        <p:style>
+          <a:lnRef idx="1">
+            <a:schemeClr val="accent5"/>
+          </a:lnRef>
+          <a:fillRef idx="2">
+            <a:schemeClr val="accent5"/>
+          </a:fillRef>
+          <a:effectRef idx="1">
+            <a:schemeClr val="accent5"/>
+          </a:effectRef>
+          <a:fontRef idx="minor">
+            <a:schemeClr val="dk1"/>
+          </a:fontRef>
+        </p:style>
+        <p:txBody>
+          <a:bodyPr rtlCol="0" anchor="ctr"/>
+          <a:lstStyle/>
+          <a:p>
+            <a:pPr algn="ctr"/>
+            <a:endParaRPr lang="fr-FR"/>
+          </a:p>
+        </p:txBody>
+      </p:sp>
+      <p:sp>
+        <p:nvSpPr>
+          <p:cNvPr id="87" name="Ellipse 86"/>
+          <p:cNvSpPr/>
+          <p:nvPr/>
+        </p:nvSpPr>
+        <p:spPr>
+          <a:xfrm>
+            <a:off x="2040530" y="3137998"/>
+            <a:ext cx="2202764" cy="2210944"/>
+          </a:xfrm>
+          <a:prstGeom prst="ellipse">
+            <a:avLst/>
+          </a:prstGeom>
+          <a:gradFill flip="none" rotWithShape="1">
+            <a:gsLst>
+              <a:gs pos="0">
+                <a:schemeClr val="accent5">
+                  <a:tint val="50000"/>
+                  <a:satMod val="300000"/>
+                  <a:alpha val="51000"/>
+                </a:schemeClr>
+              </a:gs>
+              <a:gs pos="35000">
+                <a:schemeClr val="accent5">
+                  <a:tint val="37000"/>
+                  <a:satMod val="300000"/>
+                  <a:alpha val="51000"/>
+                </a:schemeClr>
+              </a:gs>
+              <a:gs pos="100000">
+                <a:schemeClr val="accent5">
+                  <a:tint val="15000"/>
+                  <a:satMod val="350000"/>
+                  <a:alpha val="51000"/>
+                </a:schemeClr>
+              </a:gs>
+            </a:gsLst>
+            <a:lin ang="16200000" scaled="1"/>
+            <a:tileRect/>
+          </a:gradFill>
+        </p:spPr>
+        <p:style>
+          <a:lnRef idx="1">
+            <a:schemeClr val="accent5"/>
+          </a:lnRef>
+          <a:fillRef idx="2">
+            <a:schemeClr val="accent5"/>
+          </a:fillRef>
+          <a:effectRef idx="1">
+            <a:schemeClr val="accent5"/>
+          </a:effectRef>
+          <a:fontRef idx="minor">
+            <a:schemeClr val="dk1"/>
+          </a:fontRef>
+        </p:style>
+        <p:txBody>
+          <a:bodyPr rtlCol="0" anchor="ctr"/>
+          <a:lstStyle/>
+          <a:p>
+            <a:pPr algn="ctr"/>
+            <a:endParaRPr lang="fr-FR"/>
+          </a:p>
+        </p:txBody>
+      </p:sp>
+      <p:sp>
+        <p:nvSpPr>
+          <p:cNvPr id="4" name="Espace réservé du numéro de diapositive 3"/>
+          <p:cNvSpPr>
+            <a:spLocks noGrp="1"/>
+          </p:cNvSpPr>
+          <p:nvPr>
+            <p:ph type="sldNum" sz="quarter" idx="12"/>
+          </p:nvPr>
+        </p:nvSpPr>
+        <p:spPr/>
+        <p:txBody>
+          <a:bodyPr/>
+          <a:lstStyle/>
+          <a:p>
+            <a:fld id="{632DADDA-56E0-0F4D-8444-EEC8234C8BEB}" type="slidenum">
+              <a:rPr lang="fr-FR"/>
+              <a:t>18</a:t>
+            </a:fld>
+            <a:endParaRPr lang="fr-FR"/>
+          </a:p>
+        </p:txBody>
+      </p:sp>
+      <p:sp>
+        <p:nvSpPr>
+          <p:cNvPr id="5" name="Espace réservé du texte 4"/>
+          <p:cNvSpPr>
+            <a:spLocks noGrp="1"/>
+          </p:cNvSpPr>
+          <p:nvPr>
+            <p:ph type="body" sz="quarter" idx="13"/>
+          </p:nvPr>
+        </p:nvSpPr>
+        <p:spPr/>
+        <p:txBody>
+          <a:bodyPr/>
+          <a:lstStyle/>
+          <a:p>
+            <a:r>
+              <a:rPr lang="fr-FR"/>
+              <a:t>état de l’art</a:t>
+            </a:r>
+          </a:p>
+        </p:txBody>
+      </p:sp>
+      <p:sp>
+        <p:nvSpPr>
+          <p:cNvPr id="7" name="Ellipse 6"/>
+          <p:cNvSpPr/>
+          <p:nvPr/>
+        </p:nvSpPr>
+        <p:spPr>
+          <a:xfrm>
+            <a:off x="2600622" y="3239455"/>
+            <a:ext cx="428293" cy="407558"/>
+          </a:xfrm>
+          <a:prstGeom prst="ellipse">
+            <a:avLst/>
+          </a:prstGeom>
+        </p:spPr>
+        <p:style>
+          <a:lnRef idx="1">
+            <a:schemeClr val="dk1"/>
+          </a:lnRef>
+          <a:fillRef idx="3">
+            <a:schemeClr val="dk1"/>
+          </a:fillRef>
+          <a:effectRef idx="2">
+            <a:schemeClr val="dk1"/>
+          </a:effectRef>
+          <a:fontRef idx="minor">
+            <a:schemeClr val="lt1"/>
+          </a:fontRef>
+        </p:style>
+        <p:txBody>
+          <a:bodyPr rtlCol="0" anchor="ctr">
+            <a:normAutofit fontScale="85000" lnSpcReduction="20000"/>
+          </a:bodyPr>
+          <a:lstStyle/>
+          <a:p>
+            <a:pPr algn="ctr"/>
+            <a:r>
+              <a:rPr lang="fr-FR"/>
+              <a:t>A</a:t>
+            </a:r>
+          </a:p>
+        </p:txBody>
+      </p:sp>
+      <p:sp>
+        <p:nvSpPr>
+          <p:cNvPr id="8" name="Ellipse 7"/>
+          <p:cNvSpPr/>
+          <p:nvPr/>
+        </p:nvSpPr>
+        <p:spPr>
+          <a:xfrm>
+            <a:off x="3064125" y="2736902"/>
+            <a:ext cx="428293" cy="407558"/>
+          </a:xfrm>
+          <a:prstGeom prst="ellipse">
+            <a:avLst/>
+          </a:prstGeom>
+        </p:spPr>
+        <p:style>
+          <a:lnRef idx="1">
+            <a:schemeClr val="dk1"/>
+          </a:lnRef>
+          <a:fillRef idx="3">
+            <a:schemeClr val="dk1"/>
+          </a:fillRef>
+          <a:effectRef idx="2">
+            <a:schemeClr val="dk1"/>
+          </a:effectRef>
+          <a:fontRef idx="minor">
+            <a:schemeClr val="lt1"/>
+          </a:fontRef>
+        </p:style>
+        <p:txBody>
+          <a:bodyPr rtlCol="0" anchor="ctr">
+            <a:normAutofit fontScale="85000" lnSpcReduction="20000"/>
+          </a:bodyPr>
+          <a:lstStyle/>
+          <a:p>
+            <a:pPr algn="ctr"/>
+            <a:r>
+              <a:rPr lang="fr-FR"/>
+              <a:t>B</a:t>
+            </a:r>
+          </a:p>
+        </p:txBody>
+      </p:sp>
+      <p:sp>
+        <p:nvSpPr>
+          <p:cNvPr id="10" name="Ellipse 9"/>
+          <p:cNvSpPr/>
+          <p:nvPr/>
+        </p:nvSpPr>
+        <p:spPr>
+          <a:xfrm>
+            <a:off x="1853237" y="2495977"/>
+            <a:ext cx="428293" cy="407558"/>
+          </a:xfrm>
+          <a:prstGeom prst="ellipse">
+            <a:avLst/>
+          </a:prstGeom>
+        </p:spPr>
+        <p:style>
+          <a:lnRef idx="1">
+            <a:schemeClr val="dk1"/>
+          </a:lnRef>
+          <a:fillRef idx="3">
+            <a:schemeClr val="dk1"/>
+          </a:fillRef>
+          <a:effectRef idx="2">
+            <a:schemeClr val="dk1"/>
+          </a:effectRef>
+          <a:fontRef idx="minor">
+            <a:schemeClr val="lt1"/>
+          </a:fontRef>
+        </p:style>
+        <p:txBody>
+          <a:bodyPr rtlCol="0" anchor="ctr">
+            <a:normAutofit fontScale="85000" lnSpcReduction="20000"/>
+          </a:bodyPr>
+          <a:lstStyle/>
+          <a:p>
+            <a:pPr algn="ctr"/>
+            <a:r>
+              <a:rPr lang="fr-FR"/>
+              <a:t>C</a:t>
+            </a:r>
+          </a:p>
+        </p:txBody>
+      </p:sp>
+      <p:sp>
+        <p:nvSpPr>
+          <p:cNvPr id="11" name="Ellipse 10"/>
+          <p:cNvSpPr/>
+          <p:nvPr/>
+        </p:nvSpPr>
+        <p:spPr>
+          <a:xfrm>
+            <a:off x="2175257" y="4576253"/>
+            <a:ext cx="428293" cy="407558"/>
+          </a:xfrm>
+          <a:prstGeom prst="ellipse">
+            <a:avLst/>
+          </a:prstGeom>
+        </p:spPr>
+        <p:style>
+          <a:lnRef idx="1">
+            <a:schemeClr val="dk1"/>
+          </a:lnRef>
+          <a:fillRef idx="3">
+            <a:schemeClr val="dk1"/>
+          </a:fillRef>
+          <a:effectRef idx="2">
+            <a:schemeClr val="dk1"/>
+          </a:effectRef>
+          <a:fontRef idx="minor">
+            <a:schemeClr val="lt1"/>
+          </a:fontRef>
+        </p:style>
+        <p:txBody>
+          <a:bodyPr rtlCol="0" anchor="ctr">
+            <a:normAutofit fontScale="85000" lnSpcReduction="20000"/>
+          </a:bodyPr>
+          <a:lstStyle/>
+          <a:p>
+            <a:pPr algn="ctr"/>
+            <a:r>
+              <a:rPr lang="fr-FR"/>
+              <a:t>D</a:t>
+            </a:r>
+          </a:p>
+        </p:txBody>
+      </p:sp>
+      <p:sp>
+        <p:nvSpPr>
+          <p:cNvPr id="12" name="Ellipse 11"/>
+          <p:cNvSpPr/>
+          <p:nvPr/>
+        </p:nvSpPr>
+        <p:spPr>
+          <a:xfrm>
+            <a:off x="2912700" y="3998941"/>
+            <a:ext cx="428293" cy="407558"/>
+          </a:xfrm>
+          <a:prstGeom prst="ellipse">
+            <a:avLst/>
+          </a:prstGeom>
+        </p:spPr>
+        <p:style>
+          <a:lnRef idx="1">
+            <a:schemeClr val="dk1"/>
+          </a:lnRef>
+          <a:fillRef idx="3">
+            <a:schemeClr val="dk1"/>
+          </a:fillRef>
+          <a:effectRef idx="2">
+            <a:schemeClr val="dk1"/>
+          </a:effectRef>
+          <a:fontRef idx="minor">
+            <a:schemeClr val="lt1"/>
+          </a:fontRef>
+        </p:style>
+        <p:txBody>
+          <a:bodyPr rtlCol="0" anchor="ctr">
+            <a:normAutofit fontScale="85000" lnSpcReduction="20000"/>
+          </a:bodyPr>
+          <a:lstStyle/>
+          <a:p>
+            <a:pPr algn="ctr"/>
+            <a:r>
+              <a:rPr lang="fr-FR"/>
+              <a:t>E</a:t>
+            </a:r>
+          </a:p>
+        </p:txBody>
+      </p:sp>
+      <p:sp>
+        <p:nvSpPr>
+          <p:cNvPr id="13" name="Ellipse 12"/>
+          <p:cNvSpPr/>
+          <p:nvPr/>
+        </p:nvSpPr>
+        <p:spPr>
+          <a:xfrm>
+            <a:off x="4005322" y="4305341"/>
+            <a:ext cx="428293" cy="407558"/>
+          </a:xfrm>
+          <a:prstGeom prst="ellipse">
+            <a:avLst/>
+          </a:prstGeom>
+        </p:spPr>
+        <p:style>
+          <a:lnRef idx="1">
+            <a:schemeClr val="dk1"/>
+          </a:lnRef>
+          <a:fillRef idx="3">
+            <a:schemeClr val="dk1"/>
+          </a:fillRef>
+          <a:effectRef idx="2">
+            <a:schemeClr val="dk1"/>
+          </a:effectRef>
+          <a:fontRef idx="minor">
+            <a:schemeClr val="lt1"/>
+          </a:fontRef>
+        </p:style>
+        <p:txBody>
+          <a:bodyPr rtlCol="0" anchor="ctr">
+            <a:normAutofit fontScale="85000" lnSpcReduction="20000"/>
+          </a:bodyPr>
+          <a:lstStyle/>
+          <a:p>
+            <a:pPr algn="ctr"/>
+            <a:r>
+              <a:rPr lang="fr-FR"/>
+              <a:t>F</a:t>
+            </a:r>
+          </a:p>
+        </p:txBody>
+      </p:sp>
+      <p:cxnSp>
+        <p:nvCxnSpPr>
+          <p:cNvPr id="15" name="Connecteur droit 14"/>
+          <p:cNvCxnSpPr>
+            <a:stCxn id="10" idx="5"/>
+            <a:endCxn id="7" idx="1"/>
+          </p:cNvCxnSpPr>
+          <p:nvPr/>
+        </p:nvCxnSpPr>
+        <p:spPr>
+          <a:xfrm>
+            <a:off x="2218808" y="2843850"/>
+            <a:ext cx="444536" cy="455290"/>
+          </a:xfrm>
+          <a:prstGeom prst="line">
+            <a:avLst/>
+          </a:prstGeom>
+          <a:ln>
+            <a:solidFill>
+              <a:srgbClr val="800A07"/>
+            </a:solidFill>
+          </a:ln>
+        </p:spPr>
+        <p:style>
+          <a:lnRef idx="2">
+            <a:schemeClr val="accent1"/>
+          </a:lnRef>
+          <a:fillRef idx="0">
+            <a:schemeClr val="accent1"/>
+          </a:fillRef>
+          <a:effectRef idx="1">
+            <a:schemeClr val="accent1"/>
+          </a:effectRef>
+          <a:fontRef idx="minor">
+            <a:schemeClr val="tx1"/>
+          </a:fontRef>
+        </p:style>
+      </p:cxnSp>
+      <p:cxnSp>
+        <p:nvCxnSpPr>
+          <p:cNvPr id="19" name="Connecteur droit 18"/>
+          <p:cNvCxnSpPr>
+            <a:stCxn id="7" idx="7"/>
+            <a:endCxn id="8" idx="3"/>
+          </p:cNvCxnSpPr>
+          <p:nvPr/>
+        </p:nvCxnSpPr>
+        <p:spPr>
+          <a:xfrm flipV="1">
+            <a:off x="2966193" y="3084775"/>
+            <a:ext cx="160654" cy="214365"/>
+          </a:xfrm>
+          <a:prstGeom prst="line">
+            <a:avLst/>
+          </a:prstGeom>
+        </p:spPr>
+        <p:style>
+          <a:lnRef idx="2">
+            <a:schemeClr val="accent1"/>
+          </a:lnRef>
+          <a:fillRef idx="0">
+            <a:schemeClr val="accent1"/>
+          </a:fillRef>
+          <a:effectRef idx="1">
+            <a:schemeClr val="accent1"/>
+          </a:effectRef>
+          <a:fontRef idx="minor">
+            <a:schemeClr val="tx1"/>
+          </a:fontRef>
+        </p:style>
+      </p:cxnSp>
+      <p:cxnSp>
+        <p:nvCxnSpPr>
+          <p:cNvPr id="21" name="Connecteur droit 20"/>
+          <p:cNvCxnSpPr>
+            <a:stCxn id="7" idx="5"/>
+            <a:endCxn id="12" idx="0"/>
+          </p:cNvCxnSpPr>
+          <p:nvPr/>
+        </p:nvCxnSpPr>
+        <p:spPr>
+          <a:xfrm>
+            <a:off x="2966193" y="3587328"/>
+            <a:ext cx="160654" cy="411613"/>
+          </a:xfrm>
+          <a:prstGeom prst="line">
+            <a:avLst/>
+          </a:prstGeom>
+        </p:spPr>
+        <p:style>
+          <a:lnRef idx="2">
+            <a:schemeClr val="accent1"/>
+          </a:lnRef>
+          <a:fillRef idx="0">
+            <a:schemeClr val="accent1"/>
+          </a:fillRef>
+          <a:effectRef idx="1">
+            <a:schemeClr val="accent1"/>
+          </a:effectRef>
+          <a:fontRef idx="minor">
+            <a:schemeClr val="tx1"/>
+          </a:fontRef>
+        </p:style>
+      </p:cxnSp>
+      <p:cxnSp>
+        <p:nvCxnSpPr>
+          <p:cNvPr id="30" name="Connecteur droit 29"/>
+          <p:cNvCxnSpPr>
+            <a:stCxn id="7" idx="3"/>
+            <a:endCxn id="11" idx="0"/>
+          </p:cNvCxnSpPr>
+          <p:nvPr/>
+        </p:nvCxnSpPr>
+        <p:spPr>
+          <a:xfrm flipH="1">
+            <a:off x="2389404" y="3587328"/>
+            <a:ext cx="273940" cy="988925"/>
+          </a:xfrm>
+          <a:prstGeom prst="line">
+            <a:avLst/>
+          </a:prstGeom>
+        </p:spPr>
+        <p:style>
+          <a:lnRef idx="2">
+            <a:schemeClr val="accent1"/>
+          </a:lnRef>
+          <a:fillRef idx="0">
+            <a:schemeClr val="accent1"/>
+          </a:fillRef>
+          <a:effectRef idx="1">
+            <a:schemeClr val="accent1"/>
+          </a:effectRef>
+          <a:fontRef idx="minor">
+            <a:schemeClr val="tx1"/>
+          </a:fontRef>
+        </p:style>
+      </p:cxnSp>
+      <p:cxnSp>
+        <p:nvCxnSpPr>
+          <p:cNvPr id="32" name="Connecteur droit 31"/>
+          <p:cNvCxnSpPr>
+            <a:stCxn id="11" idx="7"/>
+            <a:endCxn id="12" idx="3"/>
+          </p:cNvCxnSpPr>
+          <p:nvPr/>
+        </p:nvCxnSpPr>
+        <p:spPr>
+          <a:xfrm flipV="1">
+            <a:off x="2540828" y="4346814"/>
+            <a:ext cx="434594" cy="289124"/>
+          </a:xfrm>
+          <a:prstGeom prst="line">
+            <a:avLst/>
+          </a:prstGeom>
+        </p:spPr>
+        <p:style>
+          <a:lnRef idx="2">
+            <a:schemeClr val="accent1"/>
+          </a:lnRef>
+          <a:fillRef idx="0">
+            <a:schemeClr val="accent1"/>
+          </a:fillRef>
+          <a:effectRef idx="1">
+            <a:schemeClr val="accent1"/>
+          </a:effectRef>
+          <a:fontRef idx="minor">
+            <a:schemeClr val="tx1"/>
+          </a:fontRef>
+        </p:style>
+      </p:cxnSp>
+      <p:cxnSp>
+        <p:nvCxnSpPr>
+          <p:cNvPr id="34" name="Connecteur droit 33"/>
+          <p:cNvCxnSpPr>
+            <a:stCxn id="12" idx="6"/>
+            <a:endCxn id="13" idx="2"/>
+          </p:cNvCxnSpPr>
+          <p:nvPr/>
+        </p:nvCxnSpPr>
+        <p:spPr>
+          <a:xfrm>
+            <a:off x="3340993" y="4202720"/>
+            <a:ext cx="664329" cy="306400"/>
+          </a:xfrm>
+          <a:prstGeom prst="line">
+            <a:avLst/>
+          </a:prstGeom>
+        </p:spPr>
+        <p:style>
+          <a:lnRef idx="2">
+            <a:schemeClr val="accent1"/>
+          </a:lnRef>
+          <a:fillRef idx="0">
+            <a:schemeClr val="accent1"/>
+          </a:fillRef>
+          <a:effectRef idx="1">
+            <a:schemeClr val="accent1"/>
+          </a:effectRef>
+          <a:fontRef idx="minor">
+            <a:schemeClr val="tx1"/>
+          </a:fontRef>
+        </p:style>
+      </p:cxnSp>
+      <p:cxnSp>
+        <p:nvCxnSpPr>
+          <p:cNvPr id="38" name="Connecteur droit 37"/>
+          <p:cNvCxnSpPr>
+            <a:stCxn id="8" idx="2"/>
+            <a:endCxn id="10" idx="6"/>
+          </p:cNvCxnSpPr>
+          <p:nvPr/>
+        </p:nvCxnSpPr>
+        <p:spPr>
+          <a:xfrm flipH="1" flipV="1">
+            <a:off x="2281530" y="2699756"/>
+            <a:ext cx="782595" cy="240925"/>
+          </a:xfrm>
+          <a:prstGeom prst="line">
+            <a:avLst/>
+          </a:prstGeom>
+        </p:spPr>
+        <p:style>
+          <a:lnRef idx="2">
+            <a:schemeClr val="accent1"/>
+          </a:lnRef>
+          <a:fillRef idx="0">
+            <a:schemeClr val="accent1"/>
+          </a:fillRef>
+          <a:effectRef idx="1">
+            <a:schemeClr val="accent1"/>
+          </a:effectRef>
+          <a:fontRef idx="minor">
+            <a:schemeClr val="tx1"/>
+          </a:fontRef>
+        </p:style>
+      </p:cxnSp>
+      <p:sp>
+        <p:nvSpPr>
+          <p:cNvPr id="24" name="Espace réservé du contenu 6"/>
+          <p:cNvSpPr>
+            <a:spLocks noGrp="1"/>
+          </p:cNvSpPr>
+          <p:nvPr>
+            <p:ph idx="1"/>
+          </p:nvPr>
+        </p:nvSpPr>
+        <p:spPr>
+          <a:xfrm>
+            <a:off x="457200" y="1600201"/>
+            <a:ext cx="8229600" cy="4525963"/>
+          </a:xfrm>
+        </p:spPr>
+        <p:txBody>
+          <a:bodyPr>
+            <a:normAutofit/>
+          </a:bodyPr>
+          <a:lstStyle/>
+          <a:p>
+            <a:pPr algn="r"/>
+            <a:r>
+              <a:rPr lang="fr-FR"/>
+              <a:t>Pas de</a:t>
+            </a:r>
+            <a:r>
+              <a:rPr lang="fr-FR"/>
+              <a:t> transmission </a:t>
+            </a:r>
+          </a:p>
+          <a:p>
+            <a:pPr marL="0" indent="0" algn="r">
+              <a:buNone/>
+            </a:pPr>
+            <a:r>
+              <a:rPr lang="fr-FR"/>
+              <a:t>superflue</a:t>
+            </a:r>
+          </a:p>
+          <a:p>
+            <a:pPr algn="r"/>
+            <a:endParaRPr lang="fr-FR"/>
+          </a:p>
+          <a:p>
+            <a:pPr algn="r"/>
+            <a:r>
+              <a:rPr lang="fr-FR"/>
+              <a:t>Tous les nœuds </a:t>
+            </a:r>
+          </a:p>
+          <a:p>
+            <a:pPr marL="0" indent="0" algn="r">
+              <a:buNone/>
+            </a:pPr>
+            <a:r>
+              <a:rPr lang="fr-FR"/>
+              <a:t>couverts</a:t>
+            </a:r>
+          </a:p>
+        </p:txBody>
+      </p:sp>
+    </p:spTree>
+    <p:extLst>
+      <p:ext uri="{BB962C8B-B14F-4D97-AF65-F5344CB8AC3E}">
+        <p14:creationId xmlns:p14="http://schemas.microsoft.com/office/powerpoint/2010/main" val="973094"/>
+      </p:ext>
+    </p:extLst>
+  </p:cSld>
+  <p:clrMapOvr>
+    <a:masterClrMapping/>
+  </p:clrMapOvr>
+  <p:timing>
+    <p:tnLst>
+      <p:par>
+        <p:cTn xmlns:p14="http://schemas.microsoft.com/office/powerpoint/2010/main" id="1" dur="indefinite" restart="never" nodeType="tmRoot">
+          <p:childTnLst>
+            <p:seq concurrent="1" nextAc="seek">
+              <p:cTn id="2" dur="indefinite" nodeType="mainSeq">
+                <p:childTnLst>
+                  <p:par>
+                    <p:cTn id="3" fill="hold">
+                      <p:stCondLst>
+                        <p:cond delay="indefinite"/>
+                      </p:stCondLst>
+                      <p:childTnLst>
+                        <p:par>
+                          <p:cTn id="4" fill="hold">
+                            <p:stCondLst>
+                              <p:cond delay="0"/>
+                            </p:stCondLst>
+                            <p:childTnLst>
+                              <p:par>
+                                <p:cTn id="5" presetID="7" presetClass="emph" presetSubtype="2" fill="hold" nodeType="clickEffect">
+                                  <p:stCondLst>
+                                    <p:cond delay="0"/>
+                                  </p:stCondLst>
+                                  <p:childTnLst>
+                                    <p:animClr clrSpc="rgb" dir="cw">
+                                      <p:cBhvr>
+                                        <p:cTn id="6" dur="500" fill="hold"/>
+                                        <p:tgtEl>
+                                          <p:spTgt spid="19"/>
+                                        </p:tgtEl>
+                                        <p:attrNameLst>
+                                          <p:attrName>stroke.color</p:attrName>
+                                        </p:attrNameLst>
+                                      </p:cBhvr>
+                                      <p:to>
+                                        <a:schemeClr val="tx2"/>
+                                      </p:to>
+                                    </p:animClr>
+                                    <p:set>
+                                      <p:cBhvr>
+                                        <p:cTn id="7" dur="500" fill="hold"/>
+                                        <p:tgtEl>
+                                          <p:spTgt spid="19"/>
+                                        </p:tgtEl>
+                                        <p:attrNameLst>
+                                          <p:attrName>stroke.on</p:attrName>
+                                        </p:attrNameLst>
+                                      </p:cBhvr>
+                                      <p:to>
+                                        <p:strVal val="true"/>
+                                      </p:to>
+                                    </p:set>
+                                  </p:childTnLst>
+                                </p:cTn>
+                              </p:par>
+                            </p:childTnLst>
+                          </p:cTn>
+                        </p:par>
+                      </p:childTnLst>
+                    </p:cTn>
+                  </p:par>
+                  <p:par>
+                    <p:cTn id="8" fill="hold">
+                      <p:stCondLst>
+                        <p:cond delay="indefinite"/>
+                      </p:stCondLst>
+                      <p:childTnLst>
+                        <p:par>
+                          <p:cTn id="9" fill="hold">
+                            <p:stCondLst>
+                              <p:cond delay="0"/>
+                            </p:stCondLst>
+                            <p:childTnLst>
+                              <p:par>
+                                <p:cTn id="10" presetID="7" presetClass="emph" presetSubtype="2" fill="hold" nodeType="clickEffect">
+                                  <p:stCondLst>
+                                    <p:cond delay="0"/>
+                                  </p:stCondLst>
+                                  <p:childTnLst>
+                                    <p:animClr clrSpc="rgb" dir="cw">
+                                      <p:cBhvr>
+                                        <p:cTn id="11" dur="500" fill="hold"/>
+                                        <p:tgtEl>
+                                          <p:spTgt spid="21"/>
+                                        </p:tgtEl>
+                                        <p:attrNameLst>
+                                          <p:attrName>stroke.color</p:attrName>
+                                        </p:attrNameLst>
+                                      </p:cBhvr>
+                                      <p:to>
+                                        <a:schemeClr val="tx2"/>
+                                      </p:to>
+                                    </p:animClr>
+                                    <p:set>
+                                      <p:cBhvr>
+                                        <p:cTn id="12" dur="500" fill="hold"/>
+                                        <p:tgtEl>
+                                          <p:spTgt spid="21"/>
+                                        </p:tgtEl>
+                                        <p:attrNameLst>
+                                          <p:attrName>stroke.on</p:attrName>
+                                        </p:attrNameLst>
+                                      </p:cBhvr>
+                                      <p:to>
+                                        <p:strVal val="true"/>
+                                      </p:to>
+                                    </p:set>
+                                  </p:childTnLst>
+                                </p:cTn>
+                              </p:par>
+                            </p:childTnLst>
+                          </p:cTn>
+                        </p:par>
+                      </p:childTnLst>
+                    </p:cTn>
+                  </p:par>
+                  <p:par>
+                    <p:cTn id="13" fill="hold">
+                      <p:stCondLst>
+                        <p:cond delay="indefinite"/>
+                      </p:stCondLst>
+                      <p:childTnLst>
+                        <p:par>
+                          <p:cTn id="14" fill="hold">
+                            <p:stCondLst>
+                              <p:cond delay="0"/>
+                            </p:stCondLst>
+                            <p:childTnLst>
+                              <p:par>
+                                <p:cTn id="15" presetID="7" presetClass="emph" presetSubtype="2" fill="hold" nodeType="clickEffect">
+                                  <p:stCondLst>
+                                    <p:cond delay="0"/>
+                                  </p:stCondLst>
+                                  <p:childTnLst>
+                                    <p:animClr clrSpc="rgb" dir="cw">
+                                      <p:cBhvr>
+                                        <p:cTn id="16" dur="500" fill="hold"/>
+                                        <p:tgtEl>
+                                          <p:spTgt spid="15"/>
+                                        </p:tgtEl>
+                                        <p:attrNameLst>
+                                          <p:attrName>stroke.color</p:attrName>
+                                        </p:attrNameLst>
+                                      </p:cBhvr>
+                                      <p:to>
+                                        <a:schemeClr val="tx2"/>
+                                      </p:to>
+                                    </p:animClr>
+                                    <p:set>
+                                      <p:cBhvr>
+                                        <p:cTn id="17" dur="500" fill="hold"/>
+                                        <p:tgtEl>
+                                          <p:spTgt spid="15"/>
+                                        </p:tgtEl>
+                                        <p:attrNameLst>
+                                          <p:attrName>stroke.on</p:attrName>
+                                        </p:attrNameLst>
+                                      </p:cBhvr>
+                                      <p:to>
+                                        <p:strVal val="true"/>
+                                      </p:to>
+                                    </p:set>
+                                  </p:childTnLst>
+                                </p:cTn>
+                              </p:par>
+                            </p:childTnLst>
+                          </p:cTn>
+                        </p:par>
+                      </p:childTnLst>
+                    </p:cTn>
+                  </p:par>
+                  <p:par>
+                    <p:cTn id="18" fill="hold">
+                      <p:stCondLst>
+                        <p:cond delay="indefinite"/>
+                      </p:stCondLst>
+                      <p:childTnLst>
+                        <p:par>
+                          <p:cTn id="19" fill="hold">
+                            <p:stCondLst>
+                              <p:cond delay="0"/>
+                            </p:stCondLst>
+                            <p:childTnLst>
+                              <p:par>
+                                <p:cTn id="20" presetID="7" presetClass="emph" presetSubtype="2" fill="hold" nodeType="clickEffect">
+                                  <p:stCondLst>
+                                    <p:cond delay="0"/>
+                                  </p:stCondLst>
+                                  <p:childTnLst>
+                                    <p:animClr clrSpc="rgb" dir="cw">
+                                      <p:cBhvr>
+                                        <p:cTn id="21" dur="500" fill="hold"/>
+                                        <p:tgtEl>
+                                          <p:spTgt spid="30"/>
+                                        </p:tgtEl>
+                                        <p:attrNameLst>
+                                          <p:attrName>stroke.color</p:attrName>
+                                        </p:attrNameLst>
+                                      </p:cBhvr>
+                                      <p:to>
+                                        <a:schemeClr val="tx2"/>
+                                      </p:to>
+                                    </p:animClr>
+                                    <p:set>
+                                      <p:cBhvr>
+                                        <p:cTn id="22" dur="500" fill="hold"/>
+                                        <p:tgtEl>
+                                          <p:spTgt spid="30"/>
+                                        </p:tgtEl>
+                                        <p:attrNameLst>
+                                          <p:attrName>stroke.on</p:attrName>
+                                        </p:attrNameLst>
+                                      </p:cBhvr>
+                                      <p:to>
+                                        <p:strVal val="true"/>
+                                      </p:to>
+                                    </p:set>
+                                  </p:childTnLst>
+                                </p:cTn>
+                              </p:par>
+                            </p:childTnLst>
+                          </p:cTn>
+                        </p:par>
+                      </p:childTnLst>
+                    </p:cTn>
+                  </p:par>
+                  <p:par>
+                    <p:cTn id="23" fill="hold">
+                      <p:stCondLst>
+                        <p:cond delay="indefinite"/>
+                      </p:stCondLst>
+                      <p:childTnLst>
+                        <p:par>
+                          <p:cTn id="24" fill="hold">
+                            <p:stCondLst>
+                              <p:cond delay="0"/>
+                            </p:stCondLst>
+                            <p:childTnLst>
+                              <p:par>
+                                <p:cTn id="25" presetID="7" presetClass="emph" presetSubtype="2" fill="hold" nodeType="clickEffect">
+                                  <p:stCondLst>
+                                    <p:cond delay="0"/>
+                                  </p:stCondLst>
+                                  <p:childTnLst>
+                                    <p:animClr clrSpc="rgb" dir="cw">
+                                      <p:cBhvr>
+                                        <p:cTn id="26" dur="500" fill="hold"/>
+                                        <p:tgtEl>
+                                          <p:spTgt spid="32"/>
+                                        </p:tgtEl>
+                                        <p:attrNameLst>
+                                          <p:attrName>stroke.color</p:attrName>
+                                        </p:attrNameLst>
+                                      </p:cBhvr>
+                                      <p:to>
+                                        <a:schemeClr val="tx2"/>
+                                      </p:to>
+                                    </p:animClr>
+                                    <p:set>
+                                      <p:cBhvr>
+                                        <p:cTn id="27" dur="500" fill="hold"/>
+                                        <p:tgtEl>
+                                          <p:spTgt spid="32"/>
+                                        </p:tgtEl>
+                                        <p:attrNameLst>
+                                          <p:attrName>stroke.on</p:attrName>
+                                        </p:attrNameLst>
+                                      </p:cBhvr>
+                                      <p:to>
+                                        <p:strVal val="true"/>
+                                      </p:to>
+                                    </p:set>
+                                  </p:childTnLst>
+                                </p:cTn>
+                              </p:par>
+                              <p:par>
+                                <p:cTn id="28" presetID="7" presetClass="emph" presetSubtype="2" fill="hold" nodeType="withEffect">
+                                  <p:stCondLst>
+                                    <p:cond delay="0"/>
+                                  </p:stCondLst>
+                                  <p:childTnLst>
+                                    <p:animClr clrSpc="rgb" dir="cw">
+                                      <p:cBhvr>
+                                        <p:cTn id="29" dur="500" fill="hold"/>
+                                        <p:tgtEl>
+                                          <p:spTgt spid="30"/>
+                                        </p:tgtEl>
+                                        <p:attrNameLst>
+                                          <p:attrName>stroke.color</p:attrName>
+                                        </p:attrNameLst>
+                                      </p:cBhvr>
+                                      <p:to>
+                                        <a:schemeClr val="accent1"/>
+                                      </p:to>
+                                    </p:animClr>
+                                    <p:set>
+                                      <p:cBhvr>
+                                        <p:cTn id="30" dur="500" fill="hold"/>
+                                        <p:tgtEl>
+                                          <p:spTgt spid="30"/>
+                                        </p:tgtEl>
+                                        <p:attrNameLst>
+                                          <p:attrName>stroke.on</p:attrName>
+                                        </p:attrNameLst>
+                                      </p:cBhvr>
+                                      <p:to>
+                                        <p:strVal val="true"/>
+                                      </p:to>
+                                    </p:set>
+                                  </p:childTnLst>
+                                </p:cTn>
+                              </p:par>
+                            </p:childTnLst>
+                          </p:cTn>
+                        </p:par>
+                      </p:childTnLst>
+                    </p:cTn>
+                  </p:par>
+                  <p:par>
+                    <p:cTn id="31" fill="hold">
+                      <p:stCondLst>
+                        <p:cond delay="indefinite"/>
+                      </p:stCondLst>
+                      <p:childTnLst>
+                        <p:par>
+                          <p:cTn id="32" fill="hold">
+                            <p:stCondLst>
+                              <p:cond delay="0"/>
+                            </p:stCondLst>
+                            <p:childTnLst>
+                              <p:par>
+                                <p:cTn id="33" presetID="7" presetClass="emph" presetSubtype="2" fill="hold" nodeType="clickEffect">
+                                  <p:stCondLst>
+                                    <p:cond delay="0"/>
+                                  </p:stCondLst>
+                                  <p:childTnLst>
+                                    <p:animClr clrSpc="rgb" dir="cw">
+                                      <p:cBhvr>
+                                        <p:cTn id="34" dur="500" fill="hold"/>
+                                        <p:tgtEl>
+                                          <p:spTgt spid="34"/>
+                                        </p:tgtEl>
+                                        <p:attrNameLst>
+                                          <p:attrName>stroke.color</p:attrName>
+                                        </p:attrNameLst>
+                                      </p:cBhvr>
+                                      <p:to>
+                                        <a:schemeClr val="tx2"/>
+                                      </p:to>
+                                    </p:animClr>
+                                    <p:set>
+                                      <p:cBhvr>
+                                        <p:cTn id="35" dur="500" fill="hold"/>
+                                        <p:tgtEl>
+                                          <p:spTgt spid="34"/>
+                                        </p:tgtEl>
+                                        <p:attrNameLst>
+                                          <p:attrName>stroke.on</p:attrName>
+                                        </p:attrNameLst>
+                                      </p:cBhvr>
+                                      <p:to>
+                                        <p:strVal val="true"/>
+                                      </p:to>
+                                    </p:set>
+                                  </p:childTnLst>
+                                </p:cTn>
+                              </p:par>
+                            </p:childTnLst>
+                          </p:cTn>
+                        </p:par>
+                      </p:childTnLst>
+                    </p:cTn>
+                  </p:par>
+                  <p:par>
+                    <p:cTn id="36" fill="hold">
+                      <p:stCondLst>
+                        <p:cond delay="indefinite"/>
+                      </p:stCondLst>
+                      <p:childTnLst>
+                        <p:par>
+                          <p:cTn id="37" fill="hold">
+                            <p:stCondLst>
+                              <p:cond delay="0"/>
+                            </p:stCondLst>
+                            <p:childTnLst>
+                              <p:par>
+                                <p:cTn id="38" presetID="1" presetClass="entr" presetSubtype="0" fill="hold" grpId="0" nodeType="clickEffect">
+                                  <p:stCondLst>
+                                    <p:cond delay="0"/>
+                                  </p:stCondLst>
+                                  <p:childTnLst>
+                                    <p:set>
+                                      <p:cBhvr>
+                                        <p:cTn id="39" dur="1" fill="hold">
+                                          <p:stCondLst>
+                                            <p:cond delay="0"/>
+                                          </p:stCondLst>
+                                        </p:cTn>
+                                        <p:tgtEl>
+                                          <p:spTgt spid="45"/>
+                                        </p:tgtEl>
+                                        <p:attrNameLst>
+                                          <p:attrName>style.visibility</p:attrName>
+                                        </p:attrNameLst>
+                                      </p:cBhvr>
+                                      <p:to>
+                                        <p:strVal val="visible"/>
+                                      </p:to>
+                                    </p:set>
+                                  </p:childTnLst>
+                                </p:cTn>
+                              </p:par>
+                              <p:par>
+                                <p:cTn id="40" presetID="1" presetClass="entr" presetSubtype="0" fill="hold" grpId="0" nodeType="withEffect">
+                                  <p:stCondLst>
+                                    <p:cond delay="1000"/>
+                                  </p:stCondLst>
+                                  <p:childTnLst>
+                                    <p:set>
+                                      <p:cBhvr>
+                                        <p:cTn id="41" dur="1" fill="hold">
+                                          <p:stCondLst>
+                                            <p:cond delay="0"/>
+                                          </p:stCondLst>
+                                        </p:cTn>
+                                        <p:tgtEl>
+                                          <p:spTgt spid="87"/>
+                                        </p:tgtEl>
+                                        <p:attrNameLst>
+                                          <p:attrName>style.visibility</p:attrName>
+                                        </p:attrNameLst>
+                                      </p:cBhvr>
+                                      <p:to>
+                                        <p:strVal val="visible"/>
+                                      </p:to>
+                                    </p:set>
+                                  </p:childTnLst>
+                                </p:cTn>
+                              </p:par>
+                            </p:childTnLst>
+                          </p:cTn>
+                        </p:par>
+                      </p:childTnLst>
+                    </p:cTn>
+                  </p:par>
+                </p:childTnLst>
+              </p:cTn>
+              <p:prevCondLst>
+                <p:cond evt="onPrev" delay="0">
+                  <p:tgtEl>
+                    <p:sldTgt/>
+                  </p:tgtEl>
+                </p:cond>
+              </p:prevCondLst>
+              <p:nextCondLst>
+                <p:cond evt="onNext" delay="0">
+                  <p:tgtEl>
+                    <p:sldTgt/>
+                  </p:tgtEl>
+                </p:cond>
+              </p:nextCondLst>
+            </p:seq>
+          </p:childTnLst>
+        </p:cTn>
+      </p:par>
+    </p:tnLst>
+    <p:bldLst>
+      <p:bldP spid="45" grpId="0" animBg="1"/>
+      <p:bldP spid="87" grpId="0" animBg="1"/>
+    </p:bldLst>
+  </p:timing>
+</p:sld>
+</file>
+
 <file path=ppt/slides/slide2.xml><?xml version="1.0" encoding="utf-8"?>
 <p:sld xmlns:a="http://schemas.openxmlformats.org/drawingml/2006/main" xmlns:r="http://schemas.openxmlformats.org/officeDocument/2006/relationships" xmlns:p="http://schemas.openxmlformats.org/presentationml/2006/main">
   <p:cSld>
@@ -9979,7 +12348,6 @@
               <a:rPr lang="fr-FR" u="sng"/>
               <a:t>Analyse et conception d’algorithmes économes en énergie dans les réseaux de capteurs</a:t>
             </a:r>
-            <a:endParaRPr lang="fr-FR" u="sng"/>
           </a:p>
         </p:txBody>
       </p:sp>
@@ -10284,13 +12652,13 @@
   <p:clrMapOvr>
     <a:masterClrMapping/>
   </p:clrMapOvr>
-  <mc:AlternateContent xmlns:mc="http://schemas.openxmlformats.org/markup-compatibility/2006">
-    <mc:Choice xmlns:p14="http://schemas.microsoft.com/office/powerpoint/2010/main" Requires="p14">
+  <mc:AlternateContent xmlns:mc="http://schemas.openxmlformats.org/markup-compatibility/2006" xmlns:p14="http://schemas.microsoft.com/office/powerpoint/2010/main">
+    <mc:Choice Requires="p14">
       <p:transition spd="slow" p14:dur="1500">
         <p:split orient="vert"/>
       </p:transition>
     </mc:Choice>
-    <mc:Fallback>
+    <mc:Fallback xmlns="">
       <p:transition xmlns:p14="http://schemas.microsoft.com/office/powerpoint/2010/main" spd="slow">
         <p:split orient="vert"/>
       </p:transition>
@@ -10997,7 +13365,6 @@
               <a:rPr lang="fr-FR"/>
               <a:t>Introduction aux réseaux de capteurs</a:t>
             </a:r>
-            <a:endParaRPr lang="fr-FR"/>
           </a:p>
         </p:txBody>
       </p:sp>
@@ -11445,7 +13812,6 @@
               <a:rPr lang="fr-FR"/>
               <a:t>Réserve d’énergie réduite</a:t>
             </a:r>
-            <a:endParaRPr lang="fr-FR"/>
           </a:p>
           <a:p>
             <a:pPr>

</xml_diff>

<commit_message>
Suite de la présentation
</commit_message>
<xml_diff>
--- a/Redaction/pres.pptx
+++ b/Redaction/pres.pptx
@@ -1302,21 +1302,21 @@
     </dgm:pt>
   </dgm:ptLst>
   <dgm:cxnLst>
+    <dgm:cxn modelId="{BD289E23-9AEB-1545-8121-FFED29DF8A76}" type="presOf" srcId="{EBD4001C-B961-5540-8C87-277869C67930}" destId="{D2B7ABDE-DC5D-CC43-A304-27801E8F3934}" srcOrd="1" destOrd="0" presId="urn:microsoft.com/office/officeart/2005/8/layout/radial5"/>
+    <dgm:cxn modelId="{5EF9709A-DAC0-EE4B-8557-4C53B4B56380}" type="presOf" srcId="{7DA216F7-B61A-644F-9E41-4844BDF2E1EB}" destId="{9AF44D55-8614-3B46-93BF-F278C02874B0}" srcOrd="0" destOrd="0" presId="urn:microsoft.com/office/officeart/2005/8/layout/radial5"/>
+    <dgm:cxn modelId="{20D7BF27-E99E-774C-A330-14F0528895CF}" type="presOf" srcId="{EC3D84DF-2E4A-914D-8008-A16D5583089F}" destId="{2D39C667-17DD-D243-BBEF-E694A5E11B6F}" srcOrd="0" destOrd="0" presId="urn:microsoft.com/office/officeart/2005/8/layout/radial5"/>
     <dgm:cxn modelId="{3CF9BB7A-5A06-2847-8A99-D91FA18D9AFA}" type="presOf" srcId="{5304632D-3534-014E-A773-191A91505663}" destId="{28E9526E-7B0C-9143-A850-585B8E0E2207}" srcOrd="0" destOrd="0" presId="urn:microsoft.com/office/officeart/2005/8/layout/radial5"/>
+    <dgm:cxn modelId="{981409B1-430A-F64D-A631-F9C5F731F273}" type="presOf" srcId="{EBD4001C-B961-5540-8C87-277869C67930}" destId="{443AD5A5-74EA-D84C-A21D-7D9663E3D147}" srcOrd="0" destOrd="0" presId="urn:microsoft.com/office/officeart/2005/8/layout/radial5"/>
+    <dgm:cxn modelId="{88714B9B-4491-1648-BFA5-9908FC612FF9}" type="presOf" srcId="{1A6F2230-7FF1-784D-8943-FAFBB5BD867E}" destId="{EFF2F8AC-1F1B-6D4D-8C29-AE41441F26F7}" srcOrd="0" destOrd="0" presId="urn:microsoft.com/office/officeart/2005/8/layout/radial5"/>
+    <dgm:cxn modelId="{1F426276-401F-6548-A04B-6E549D314F44}" srcId="{EC3D84DF-2E4A-914D-8008-A16D5583089F}" destId="{B7BB0103-7E47-DD47-A685-FB155C9A07EE}" srcOrd="0" destOrd="0" parTransId="{187E3820-FDBD-A14B-8D53-13DEEA190D85}" sibTransId="{07DE391C-36DC-2347-ACDE-6F70ECD1194A}"/>
+    <dgm:cxn modelId="{DA6D3E26-D7CA-AD40-9EAA-FB53CCDC295A}" srcId="{B7BB0103-7E47-DD47-A685-FB155C9A07EE}" destId="{7DA216F7-B61A-644F-9E41-4844BDF2E1EB}" srcOrd="1" destOrd="0" parTransId="{EE98EBD2-B01C-AC47-87D6-306A993857F7}" sibTransId="{40828377-F63C-7147-AD5C-8E259A94515F}"/>
     <dgm:cxn modelId="{D1A37C89-99F7-8646-9954-2A9040E91DE6}" type="presOf" srcId="{B7BB0103-7E47-DD47-A685-FB155C9A07EE}" destId="{5DD8E76F-190F-AE4D-8F4D-4BB2AADB5179}" srcOrd="0" destOrd="0" presId="urn:microsoft.com/office/officeart/2005/8/layout/radial5"/>
     <dgm:cxn modelId="{182F8A36-DF71-514D-A4DB-02C0E52C9E27}" srcId="{B7BB0103-7E47-DD47-A685-FB155C9A07EE}" destId="{80CDC2A9-E114-4E4E-97DA-E5A6E9106C0D}" srcOrd="2" destOrd="0" parTransId="{EBD4001C-B961-5540-8C87-277869C67930}" sibTransId="{23331D01-66FE-2F4E-9D58-79CD274B6161}"/>
-    <dgm:cxn modelId="{1F426276-401F-6548-A04B-6E549D314F44}" srcId="{EC3D84DF-2E4A-914D-8008-A16D5583089F}" destId="{B7BB0103-7E47-DD47-A685-FB155C9A07EE}" srcOrd="0" destOrd="0" parTransId="{187E3820-FDBD-A14B-8D53-13DEEA190D85}" sibTransId="{07DE391C-36DC-2347-ACDE-6F70ECD1194A}"/>
-    <dgm:cxn modelId="{5EF9709A-DAC0-EE4B-8557-4C53B4B56380}" type="presOf" srcId="{7DA216F7-B61A-644F-9E41-4844BDF2E1EB}" destId="{9AF44D55-8614-3B46-93BF-F278C02874B0}" srcOrd="0" destOrd="0" presId="urn:microsoft.com/office/officeart/2005/8/layout/radial5"/>
-    <dgm:cxn modelId="{B42444B2-648E-4449-96AD-FC3B788CF0E4}" type="presOf" srcId="{EE98EBD2-B01C-AC47-87D6-306A993857F7}" destId="{54DC7B13-44EC-FF49-A46D-55A02B76FE87}" srcOrd="0" destOrd="0" presId="urn:microsoft.com/office/officeart/2005/8/layout/radial5"/>
-    <dgm:cxn modelId="{88714B9B-4491-1648-BFA5-9908FC612FF9}" type="presOf" srcId="{1A6F2230-7FF1-784D-8943-FAFBB5BD867E}" destId="{EFF2F8AC-1F1B-6D4D-8C29-AE41441F26F7}" srcOrd="0" destOrd="0" presId="urn:microsoft.com/office/officeart/2005/8/layout/radial5"/>
-    <dgm:cxn modelId="{981409B1-430A-F64D-A631-F9C5F731F273}" type="presOf" srcId="{EBD4001C-B961-5540-8C87-277869C67930}" destId="{443AD5A5-74EA-D84C-A21D-7D9663E3D147}" srcOrd="0" destOrd="0" presId="urn:microsoft.com/office/officeart/2005/8/layout/radial5"/>
+    <dgm:cxn modelId="{06BD377A-1813-9A43-8E47-E01E784BE70D}" type="presOf" srcId="{80CDC2A9-E114-4E4E-97DA-E5A6E9106C0D}" destId="{E6336081-3369-9448-A37D-3542AC02AA41}" srcOrd="0" destOrd="0" presId="urn:microsoft.com/office/officeart/2005/8/layout/radial5"/>
     <dgm:cxn modelId="{41055DA1-11F4-F44D-8A2D-65078C273C86}" srcId="{B7BB0103-7E47-DD47-A685-FB155C9A07EE}" destId="{1A6F2230-7FF1-784D-8943-FAFBB5BD867E}" srcOrd="0" destOrd="0" parTransId="{5304632D-3534-014E-A773-191A91505663}" sibTransId="{18929EFA-1674-8D49-BFC2-4A2E5D4308B5}"/>
     <dgm:cxn modelId="{21A54FB8-9CA2-2343-945D-5B2902E5F5E8}" type="presOf" srcId="{5304632D-3534-014E-A773-191A91505663}" destId="{F6EB97ED-B6B4-4241-B774-3B7059FCFB8A}" srcOrd="1" destOrd="0" presId="urn:microsoft.com/office/officeart/2005/8/layout/radial5"/>
+    <dgm:cxn modelId="{B42444B2-648E-4449-96AD-FC3B788CF0E4}" type="presOf" srcId="{EE98EBD2-B01C-AC47-87D6-306A993857F7}" destId="{54DC7B13-44EC-FF49-A46D-55A02B76FE87}" srcOrd="0" destOrd="0" presId="urn:microsoft.com/office/officeart/2005/8/layout/radial5"/>
     <dgm:cxn modelId="{7ED21C30-811C-3644-A272-51AA029DED4E}" type="presOf" srcId="{EE98EBD2-B01C-AC47-87D6-306A993857F7}" destId="{F9C9631B-0A4E-8840-BB52-87B441B80EB5}" srcOrd="1" destOrd="0" presId="urn:microsoft.com/office/officeart/2005/8/layout/radial5"/>
-    <dgm:cxn modelId="{BD289E23-9AEB-1545-8121-FFED29DF8A76}" type="presOf" srcId="{EBD4001C-B961-5540-8C87-277869C67930}" destId="{D2B7ABDE-DC5D-CC43-A304-27801E8F3934}" srcOrd="1" destOrd="0" presId="urn:microsoft.com/office/officeart/2005/8/layout/radial5"/>
-    <dgm:cxn modelId="{06BD377A-1813-9A43-8E47-E01E784BE70D}" type="presOf" srcId="{80CDC2A9-E114-4E4E-97DA-E5A6E9106C0D}" destId="{E6336081-3369-9448-A37D-3542AC02AA41}" srcOrd="0" destOrd="0" presId="urn:microsoft.com/office/officeart/2005/8/layout/radial5"/>
-    <dgm:cxn modelId="{20D7BF27-E99E-774C-A330-14F0528895CF}" type="presOf" srcId="{EC3D84DF-2E4A-914D-8008-A16D5583089F}" destId="{2D39C667-17DD-D243-BBEF-E694A5E11B6F}" srcOrd="0" destOrd="0" presId="urn:microsoft.com/office/officeart/2005/8/layout/radial5"/>
-    <dgm:cxn modelId="{DA6D3E26-D7CA-AD40-9EAA-FB53CCDC295A}" srcId="{B7BB0103-7E47-DD47-A685-FB155C9A07EE}" destId="{7DA216F7-B61A-644F-9E41-4844BDF2E1EB}" srcOrd="1" destOrd="0" parTransId="{EE98EBD2-B01C-AC47-87D6-306A993857F7}" sibTransId="{40828377-F63C-7147-AD5C-8E259A94515F}"/>
     <dgm:cxn modelId="{D454D5EA-D415-0940-841D-9AF66E1C32C1}" type="presParOf" srcId="{2D39C667-17DD-D243-BBEF-E694A5E11B6F}" destId="{5DD8E76F-190F-AE4D-8F4D-4BB2AADB5179}" srcOrd="0" destOrd="0" presId="urn:microsoft.com/office/officeart/2005/8/layout/radial5"/>
     <dgm:cxn modelId="{758DD4F6-D5C5-1B47-AEAA-8A9B5ED271C1}" type="presParOf" srcId="{2D39C667-17DD-D243-BBEF-E694A5E11B6F}" destId="{28E9526E-7B0C-9143-A850-585B8E0E2207}" srcOrd="1" destOrd="0" presId="urn:microsoft.com/office/officeart/2005/8/layout/radial5"/>
     <dgm:cxn modelId="{0E9F40F2-2A10-F442-B672-458B50589287}" type="presParOf" srcId="{28E9526E-7B0C-9143-A850-585B8E0E2207}" destId="{F6EB97ED-B6B4-4241-B774-3B7059FCFB8A}" srcOrd="0" destOrd="0" presId="urn:microsoft.com/office/officeart/2005/8/layout/radial5"/>
@@ -7801,13 +7801,13 @@
   <p:clrMapOvr>
     <a:masterClrMapping/>
   </p:clrMapOvr>
-  <mc:AlternateContent xmlns:mc="http://schemas.openxmlformats.org/markup-compatibility/2006">
-    <mc:Choice xmlns:p14="http://schemas.microsoft.com/office/powerpoint/2010/main" Requires="p14">
+  <mc:AlternateContent xmlns:mc="http://schemas.openxmlformats.org/markup-compatibility/2006" xmlns:p14="http://schemas.microsoft.com/office/powerpoint/2010/main">
+    <mc:Choice Requires="p14">
       <p:transition spd="med" p14:dur="700">
         <p:fade/>
       </p:transition>
     </mc:Choice>
-    <mc:Fallback>
+    <mc:Fallback xmlns="">
       <p:transition xmlns:p14="http://schemas.microsoft.com/office/powerpoint/2010/main" spd="med">
         <p:fade/>
       </p:transition>
@@ -8001,11 +8001,11 @@
   <p:clrMapOvr>
     <a:masterClrMapping/>
   </p:clrMapOvr>
-  <mc:AlternateContent xmlns:mc="http://schemas.openxmlformats.org/markup-compatibility/2006">
-    <mc:Choice xmlns:p14="http://schemas.microsoft.com/office/powerpoint/2010/main" Requires="p14">
+  <mc:AlternateContent xmlns:mc="http://schemas.openxmlformats.org/markup-compatibility/2006" xmlns:p14="http://schemas.microsoft.com/office/powerpoint/2010/main">
+    <mc:Choice Requires="p14">
       <p:transition p14:dur="0"/>
     </mc:Choice>
-    <mc:Fallback>
+    <mc:Fallback xmlns="">
       <p:transition xmlns:p14="http://schemas.microsoft.com/office/powerpoint/2010/main"/>
     </mc:Fallback>
   </mc:AlternateContent>
@@ -8249,11 +8249,11 @@
   <p:clrMapOvr>
     <a:masterClrMapping/>
   </p:clrMapOvr>
-  <mc:AlternateContent xmlns:mc="http://schemas.openxmlformats.org/markup-compatibility/2006">
-    <mc:Choice xmlns:p14="http://schemas.microsoft.com/office/powerpoint/2010/main" Requires="p14">
+  <mc:AlternateContent xmlns:mc="http://schemas.openxmlformats.org/markup-compatibility/2006" xmlns:p14="http://schemas.microsoft.com/office/powerpoint/2010/main">
+    <mc:Choice Requires="p14">
       <p:transition p14:dur="0"/>
     </mc:Choice>
-    <mc:Fallback>
+    <mc:Fallback xmlns="">
       <p:transition xmlns:p14="http://schemas.microsoft.com/office/powerpoint/2010/main"/>
     </mc:Fallback>
   </mc:AlternateContent>
@@ -8497,11 +8497,11 @@
   <p:clrMapOvr>
     <a:masterClrMapping/>
   </p:clrMapOvr>
-  <mc:AlternateContent xmlns:mc="http://schemas.openxmlformats.org/markup-compatibility/2006">
-    <mc:Choice xmlns:p14="http://schemas.microsoft.com/office/powerpoint/2010/main" Requires="p14">
+  <mc:AlternateContent xmlns:mc="http://schemas.openxmlformats.org/markup-compatibility/2006" xmlns:p14="http://schemas.microsoft.com/office/powerpoint/2010/main">
+    <mc:Choice Requires="p14">
       <p:transition p14:dur="0"/>
     </mc:Choice>
-    <mc:Fallback>
+    <mc:Fallback xmlns="">
       <p:transition xmlns:p14="http://schemas.microsoft.com/office/powerpoint/2010/main"/>
     </mc:Fallback>
   </mc:AlternateContent>
@@ -8680,11 +8680,11 @@
   <p:clrMapOvr>
     <a:masterClrMapping/>
   </p:clrMapOvr>
-  <mc:AlternateContent xmlns:mc="http://schemas.openxmlformats.org/markup-compatibility/2006">
-    <mc:Choice xmlns:p14="http://schemas.microsoft.com/office/powerpoint/2010/main" Requires="p14">
+  <mc:AlternateContent xmlns:mc="http://schemas.openxmlformats.org/markup-compatibility/2006" xmlns:p14="http://schemas.microsoft.com/office/powerpoint/2010/main">
+    <mc:Choice Requires="p14">
       <p:transition p14:dur="0"/>
     </mc:Choice>
-    <mc:Fallback>
+    <mc:Fallback xmlns="">
       <p:transition xmlns:p14="http://schemas.microsoft.com/office/powerpoint/2010/main"/>
     </mc:Fallback>
   </mc:AlternateContent>
@@ -8795,7 +8795,7 @@
         <p:spPr/>
         <p:txBody>
           <a:bodyPr>
-            <a:normAutofit lnSpcReduction="10000"/>
+            <a:normAutofit/>
           </a:bodyPr>
           <a:lstStyle/>
           <a:p>
@@ -8843,13 +8843,6 @@
             <a:r>
               <a:rPr lang="fr-FR"/>
               <a:t>BIP, LBIP, DLBIP</a:t>
-            </a:r>
-          </a:p>
-          <a:p>
-            <a:pPr lvl="1"/>
-            <a:r>
-              <a:rPr lang="fr-FR"/>
-              <a:t>RRS</a:t>
             </a:r>
           </a:p>
           <a:p>
@@ -8871,11 +8864,11 @@
   <p:clrMapOvr>
     <a:masterClrMapping/>
   </p:clrMapOvr>
-  <mc:AlternateContent xmlns:mc="http://schemas.openxmlformats.org/markup-compatibility/2006">
-    <mc:Choice xmlns:p14="http://schemas.microsoft.com/office/powerpoint/2010/main" Requires="p14">
+  <mc:AlternateContent xmlns:mc="http://schemas.openxmlformats.org/markup-compatibility/2006" xmlns:p14="http://schemas.microsoft.com/office/powerpoint/2010/main">
+    <mc:Choice Requires="p14">
       <p:transition p14:dur="0"/>
     </mc:Choice>
-    <mc:Fallback>
+    <mc:Fallback xmlns="">
       <p:transition xmlns:p14="http://schemas.microsoft.com/office/powerpoint/2010/main"/>
     </mc:Fallback>
   </mc:AlternateContent>
@@ -9999,11 +9992,11 @@
   <p:clrMapOvr>
     <a:masterClrMapping/>
   </p:clrMapOvr>
-  <mc:AlternateContent xmlns:mc="http://schemas.openxmlformats.org/markup-compatibility/2006">
-    <mc:Choice xmlns:p14="http://schemas.microsoft.com/office/powerpoint/2010/main" Requires="p14">
+  <mc:AlternateContent xmlns:mc="http://schemas.openxmlformats.org/markup-compatibility/2006" xmlns:p14="http://schemas.microsoft.com/office/powerpoint/2010/main">
+    <mc:Choice Requires="p14">
       <p:transition p14:dur="0"/>
     </mc:Choice>
-    <mc:Fallback>
+    <mc:Fallback xmlns="">
       <p:transition xmlns:p14="http://schemas.microsoft.com/office/powerpoint/2010/main"/>
     </mc:Fallback>
   </mc:AlternateContent>
@@ -11142,11 +11135,7 @@
           <a:p>
             <a:r>
               <a:rPr lang="fr-FR"/>
-              <a:t>2</a:t>
-            </a:r>
-            <a:r>
-              <a:rPr lang="fr-FR"/>
-              <a:t> nœuds non </a:t>
+              <a:t>2 nœuds non </a:t>
             </a:r>
           </a:p>
           <a:p>
@@ -11245,11 +11234,11 @@
   <p:clrMapOvr>
     <a:masterClrMapping/>
   </p:clrMapOvr>
-  <mc:AlternateContent xmlns:mc="http://schemas.openxmlformats.org/markup-compatibility/2006">
-    <mc:Choice xmlns:p14="http://schemas.microsoft.com/office/powerpoint/2010/main" Requires="p14">
+  <mc:AlternateContent xmlns:mc="http://schemas.openxmlformats.org/markup-compatibility/2006" xmlns:p14="http://schemas.microsoft.com/office/powerpoint/2010/main">
+    <mc:Choice Requires="p14">
       <p:transition p14:dur="0"/>
     </mc:Choice>
-    <mc:Fallback>
+    <mc:Fallback xmlns="">
       <p:transition xmlns:p14="http://schemas.microsoft.com/office/powerpoint/2010/main"/>
     </mc:Fallback>
   </mc:AlternateContent>
@@ -12307,22 +12296,13 @@
             </a:pPr>
             <a:r>
               <a:rPr lang="fr-FR"/>
-              <a:t>de </a:t>
-            </a:r>
-            <a:r>
-              <a:rPr lang="fr-FR"/>
-              <a:t>Prim</a:t>
-            </a:r>
-            <a:endParaRPr lang="fr-FR"/>
-          </a:p>
-          <a:p>
-            <a:r>
-              <a:rPr lang="fr-FR"/>
-              <a:t>Co</a:t>
-            </a:r>
-            <a:r>
-              <a:rPr lang="fr-FR"/>
-              <a:t>ût d’une arête : </a:t>
+              <a:t>de Prim</a:t>
+            </a:r>
+          </a:p>
+          <a:p>
+            <a:r>
+              <a:rPr lang="fr-FR"/>
+              <a:t>Coût d’une arête : </a:t>
             </a:r>
           </a:p>
           <a:p>
@@ -12333,7 +12313,6 @@
               <a:rPr lang="fr-FR"/>
               <a:t>coût énergétique</a:t>
             </a:r>
-            <a:endParaRPr lang="fr-FR"/>
           </a:p>
           <a:p>
             <a:r>
@@ -12377,11 +12356,11 @@
   <p:clrMapOvr>
     <a:masterClrMapping/>
   </p:clrMapOvr>
-  <mc:AlternateContent xmlns:mc="http://schemas.openxmlformats.org/markup-compatibility/2006">
-    <mc:Choice xmlns:p14="http://schemas.microsoft.com/office/powerpoint/2010/main" Requires="p14">
+  <mc:AlternateContent xmlns:mc="http://schemas.openxmlformats.org/markup-compatibility/2006" xmlns:p14="http://schemas.microsoft.com/office/powerpoint/2010/main">
+    <mc:Choice Requires="p14">
       <p:transition p14:dur="0"/>
     </mc:Choice>
-    <mc:Fallback>
+    <mc:Fallback xmlns="">
       <p:transition xmlns:p14="http://schemas.microsoft.com/office/powerpoint/2010/main"/>
     </mc:Fallback>
   </mc:AlternateContent>
@@ -13854,14 +13833,12 @@
               <a:rPr lang="fr-FR"/>
               <a:t>Similaire à BIP</a:t>
             </a:r>
-            <a:endParaRPr lang="fr-FR"/>
           </a:p>
           <a:p>
             <a:r>
               <a:rPr lang="fr-FR"/>
               <a:t>Connaissance locale</a:t>
             </a:r>
-            <a:endParaRPr lang="fr-FR"/>
           </a:p>
           <a:p>
             <a:r>
@@ -13886,7 +13863,6 @@
               <a:rPr lang="fr-FR"/>
               <a:t>le paquet </a:t>
             </a:r>
-            <a:endParaRPr lang="fr-FR"/>
           </a:p>
           <a:p>
             <a:r>
@@ -13915,11 +13891,11 @@
   <p:clrMapOvr>
     <a:masterClrMapping/>
   </p:clrMapOvr>
-  <mc:AlternateContent xmlns:mc="http://schemas.openxmlformats.org/markup-compatibility/2006">
-    <mc:Choice xmlns:p14="http://schemas.microsoft.com/office/powerpoint/2010/main" Requires="p14">
+  <mc:AlternateContent xmlns:mc="http://schemas.openxmlformats.org/markup-compatibility/2006" xmlns:p14="http://schemas.microsoft.com/office/powerpoint/2010/main">
+    <mc:Choice Requires="p14">
       <p:transition p14:dur="0"/>
     </mc:Choice>
-    <mc:Fallback>
+    <mc:Fallback xmlns="">
       <p:transition xmlns:p14="http://schemas.microsoft.com/office/powerpoint/2010/main"/>
     </mc:Fallback>
   </mc:AlternateContent>
@@ -15616,11 +15592,11 @@
   <p:clrMapOvr>
     <a:masterClrMapping/>
   </p:clrMapOvr>
-  <mc:AlternateContent xmlns:mc="http://schemas.openxmlformats.org/markup-compatibility/2006">
-    <mc:Choice xmlns:p14="http://schemas.microsoft.com/office/powerpoint/2010/main" Requires="p14">
+  <mc:AlternateContent xmlns:mc="http://schemas.openxmlformats.org/markup-compatibility/2006" xmlns:p14="http://schemas.microsoft.com/office/powerpoint/2010/main">
+    <mc:Choice Requires="p14">
       <p:transition p14:dur="0"/>
     </mc:Choice>
-    <mc:Fallback>
+    <mc:Fallback xmlns="">
       <p:transition xmlns:p14="http://schemas.microsoft.com/office/powerpoint/2010/main"/>
     </mc:Fallback>
   </mc:AlternateContent>
@@ -16052,14 +16028,14 @@
             <p:ph idx="1"/>
             <p:extLst>
               <p:ext uri="{D42A27DB-BD31-4B8C-83A1-F6EECF244321}">
-                <p14:modId xmlns:p14="http://schemas.microsoft.com/office/powerpoint/2010/main" val="1873135661"/>
+                <p14:modId xmlns:p14="http://schemas.microsoft.com/office/powerpoint/2010/main" val="2433151585"/>
               </p:ext>
             </p:extLst>
           </p:nvPr>
         </p:nvGraphicFramePr>
         <p:xfrm>
           <a:off x="457200" y="1417635"/>
-          <a:ext cx="8229595" cy="4938720"/>
+          <a:ext cx="8229595" cy="4609472"/>
         </p:xfrm>
         <a:graphic>
           <a:graphicData uri="http://schemas.openxmlformats.org/drawingml/2006/table">
@@ -18075,7 +18051,7 @@
                       <a:r>
                         <a:rPr lang="fr-FR" sz="1200">
                           <a:solidFill>
-                            <a:srgbClr val="C0504D"/>
+                            <a:schemeClr val="accent2"/>
                           </a:solidFill>
                           <a:latin typeface="Zapf Dingbats"/>
                           <a:ea typeface="Zapf Dingbats"/>
@@ -18084,7 +18060,11 @@
                         </a:rPr>
                         <a:t>✗</a:t>
                       </a:r>
-                      <a:endParaRPr lang="fr-FR" sz="1200"/>
+                      <a:endParaRPr lang="fr-FR" sz="1200">
+                        <a:solidFill>
+                          <a:schemeClr val="accent2"/>
+                        </a:solidFill>
+                      </a:endParaRPr>
                     </a:p>
                   </a:txBody>
                   <a:tcPr marL="0" marR="0" marT="0" marB="0" anchor="ctr"/>
@@ -18353,13 +18333,8 @@
                       <a:pPr algn="ctr"/>
                       <a:r>
                         <a:rPr lang="fr-FR" sz="1200"/>
-                        <a:t>LBI</a:t>
+                        <a:t>LBIP</a:t>
                       </a:r>
-                      <a:r>
-                        <a:rPr lang="fr-FR" sz="1200"/>
-                        <a:t>P</a:t>
-                      </a:r>
-                      <a:endParaRPr lang="fr-FR" sz="1200"/>
                     </a:p>
                   </a:txBody>
                   <a:tcPr marL="0" marR="0" marT="0" marB="0" anchor="ctr"/>
@@ -18866,164 +18841,6 @@
                       <a:pPr algn="ctr"/>
                       <a:r>
                         <a:rPr lang="fr-FR" sz="1200"/>
-                        <a:t>RRS</a:t>
-                      </a:r>
-                    </a:p>
-                  </a:txBody>
-                  <a:tcPr marL="0" marR="0" marT="0" marB="0" anchor="ctr"/>
-                </a:tc>
-                <a:tc>
-                  <a:txBody>
-                    <a:bodyPr/>
-                    <a:lstStyle/>
-                    <a:p>
-                      <a:pPr algn="ctr"/>
-                      <a:r>
-                        <a:rPr lang="fr-FR" sz="1200">
-                          <a:solidFill>
-                            <a:srgbClr val="4A8B37"/>
-                          </a:solidFill>
-                          <a:latin typeface="Zapf Dingbats"/>
-                          <a:ea typeface="Zapf Dingbats"/>
-                          <a:cs typeface="Zapf Dingbats"/>
-                          <a:sym typeface="Zapf Dingbats"/>
-                        </a:rPr>
-                        <a:t>✓</a:t>
-                      </a:r>
-                      <a:endParaRPr lang="fr-FR" sz="1200">
-                        <a:solidFill>
-                          <a:srgbClr val="4A8B37"/>
-                        </a:solidFill>
-                      </a:endParaRPr>
-                    </a:p>
-                  </a:txBody>
-                  <a:tcPr marL="0" marR="0" marT="0" marB="0" anchor="ctr"/>
-                </a:tc>
-                <a:tc>
-                  <a:txBody>
-                    <a:bodyPr/>
-                    <a:lstStyle/>
-                    <a:p>
-                      <a:pPr algn="ctr"/>
-                      <a:r>
-                        <a:rPr lang="fr-FR" sz="1200">
-                          <a:solidFill>
-                            <a:srgbClr val="C0504D"/>
-                          </a:solidFill>
-                          <a:latin typeface="Zapf Dingbats"/>
-                          <a:ea typeface="Zapf Dingbats"/>
-                          <a:cs typeface="Zapf Dingbats"/>
-                          <a:sym typeface="Zapf Dingbats"/>
-                        </a:rPr>
-                        <a:t>✗</a:t>
-                      </a:r>
-                      <a:endParaRPr lang="fr-FR" sz="1200">
-                        <a:solidFill>
-                          <a:srgbClr val="C0504D"/>
-                        </a:solidFill>
-                      </a:endParaRPr>
-                    </a:p>
-                  </a:txBody>
-                  <a:tcPr marL="0" marR="0" marT="0" marB="0" anchor="ctr"/>
-                </a:tc>
-                <a:tc>
-                  <a:txBody>
-                    <a:bodyPr/>
-                    <a:lstStyle/>
-                    <a:p>
-                      <a:pPr algn="ctr"/>
-                      <a:endParaRPr lang="fr-FR" sz="1200"/>
-                    </a:p>
-                  </a:txBody>
-                  <a:tcPr marL="0" marR="0" marT="0" marB="0" anchor="ctr"/>
-                </a:tc>
-                <a:tc>
-                  <a:txBody>
-                    <a:bodyPr/>
-                    <a:lstStyle/>
-                    <a:p>
-                      <a:pPr algn="ctr"/>
-                      <a:endParaRPr lang="fr-FR" sz="1200"/>
-                    </a:p>
-                  </a:txBody>
-                  <a:tcPr marL="0" marR="0" marT="0" marB="0" anchor="ctr"/>
-                </a:tc>
-                <a:tc>
-                  <a:txBody>
-                    <a:bodyPr/>
-                    <a:lstStyle/>
-                    <a:p>
-                      <a:pPr algn="ctr"/>
-                      <a:endParaRPr lang="fr-FR" sz="1200"/>
-                    </a:p>
-                  </a:txBody>
-                  <a:tcPr marL="0" marR="0" marT="0" marB="0" anchor="ctr"/>
-                </a:tc>
-                <a:tc>
-                  <a:txBody>
-                    <a:bodyPr/>
-                    <a:lstStyle/>
-                    <a:p>
-                      <a:pPr algn="ctr"/>
-                      <a:endParaRPr lang="fr-FR" sz="1200"/>
-                    </a:p>
-                  </a:txBody>
-                  <a:tcPr marL="0" marR="0" marT="0" marB="0" anchor="ctr"/>
-                </a:tc>
-                <a:tc>
-                  <a:txBody>
-                    <a:bodyPr/>
-                    <a:lstStyle/>
-                    <a:p>
-                      <a:pPr algn="ctr"/>
-                      <a:endParaRPr lang="fr-FR" sz="1200"/>
-                    </a:p>
-                  </a:txBody>
-                  <a:tcPr marL="0" marR="0" marT="0" marB="0" anchor="ctr"/>
-                </a:tc>
-                <a:tc>
-                  <a:txBody>
-                    <a:bodyPr/>
-                    <a:lstStyle/>
-                    <a:p>
-                      <a:pPr algn="ctr"/>
-                      <a:endParaRPr lang="fr-FR" sz="1200"/>
-                    </a:p>
-                  </a:txBody>
-                  <a:tcPr marL="0" marR="0" marT="0" marB="0" anchor="ctr"/>
-                </a:tc>
-                <a:tc>
-                  <a:txBody>
-                    <a:bodyPr/>
-                    <a:lstStyle/>
-                    <a:p>
-                      <a:pPr algn="ctr"/>
-                      <a:endParaRPr lang="fr-FR" sz="1200"/>
-                    </a:p>
-                  </a:txBody>
-                  <a:tcPr marL="0" marR="0" marT="0" marB="0" anchor="ctr"/>
-                </a:tc>
-                <a:tc>
-                  <a:txBody>
-                    <a:bodyPr/>
-                    <a:lstStyle/>
-                    <a:p>
-                      <a:pPr algn="ctr"/>
-                      <a:endParaRPr lang="fr-FR" sz="1200"/>
-                    </a:p>
-                  </a:txBody>
-                  <a:tcPr marL="0" marR="0" marT="0" marB="0" anchor="ctr"/>
-                </a:tc>
-              </a:tr>
-              <a:tr h="329248">
-                <a:tc>
-                  <a:txBody>
-                    <a:bodyPr/>
-                    <a:lstStyle/>
-                    <a:p>
-                      <a:pPr algn="ctr"/>
-                      <a:r>
-                        <a:rPr lang="fr-FR" sz="1200"/>
                         <a:t>LBOP</a:t>
                       </a:r>
                     </a:p>
@@ -19089,7 +18906,105 @@
                     <a:bodyPr/>
                     <a:lstStyle/>
                     <a:p>
+                      <a:pPr marL="0" marR="0" indent="0" algn="ctr" defTabSz="457200" rtl="0" eaLnBrk="1" fontAlgn="auto" latinLnBrk="0" hangingPunct="1">
+                        <a:lnSpc>
+                          <a:spcPct val="100000"/>
+                        </a:lnSpc>
+                        <a:spcBef>
+                          <a:spcPts val="0"/>
+                        </a:spcBef>
+                        <a:spcAft>
+                          <a:spcPts val="0"/>
+                        </a:spcAft>
+                        <a:buClrTx/>
+                        <a:buSzTx/>
+                        <a:buFontTx/>
+                        <a:buNone/>
+                        <a:tabLst/>
+                        <a:defRPr/>
+                      </a:pPr>
+                      <a:r>
+                        <a:rPr lang="fr-FR" sz="1200">
+                          <a:solidFill>
+                            <a:srgbClr val="C0504D"/>
+                          </a:solidFill>
+                          <a:latin typeface="Zapf Dingbats"/>
+                          <a:ea typeface="Zapf Dingbats"/>
+                          <a:cs typeface="Zapf Dingbats"/>
+                          <a:sym typeface="Zapf Dingbats"/>
+                        </a:rPr>
+                        <a:t>✗</a:t>
+                      </a:r>
+                      <a:endParaRPr lang="fr-FR" sz="1200">
+                        <a:solidFill>
+                          <a:srgbClr val="C0504D"/>
+                        </a:solidFill>
+                      </a:endParaRPr>
+                    </a:p>
+                  </a:txBody>
+                  <a:tcPr marL="0" marR="0" marT="0" marB="0" anchor="ctr"/>
+                </a:tc>
+                <a:tc>
+                  <a:txBody>
+                    <a:bodyPr/>
+                    <a:lstStyle/>
+                    <a:p>
+                      <a:pPr marL="0" marR="0" indent="0" algn="ctr" defTabSz="457200" rtl="0" eaLnBrk="1" fontAlgn="auto" latinLnBrk="0" hangingPunct="1">
+                        <a:lnSpc>
+                          <a:spcPct val="100000"/>
+                        </a:lnSpc>
+                        <a:spcBef>
+                          <a:spcPts val="0"/>
+                        </a:spcBef>
+                        <a:spcAft>
+                          <a:spcPts val="0"/>
+                        </a:spcAft>
+                        <a:buClrTx/>
+                        <a:buSzTx/>
+                        <a:buFontTx/>
+                        <a:buNone/>
+                        <a:tabLst/>
+                        <a:defRPr/>
+                      </a:pPr>
+                      <a:r>
+                        <a:rPr lang="fr-FR" sz="1200">
+                          <a:solidFill>
+                            <a:srgbClr val="4A8B37"/>
+                          </a:solidFill>
+                          <a:latin typeface="Zapf Dingbats"/>
+                          <a:ea typeface="Zapf Dingbats"/>
+                          <a:cs typeface="Zapf Dingbats"/>
+                          <a:sym typeface="Zapf Dingbats"/>
+                        </a:rPr>
+                        <a:t>✓</a:t>
+                      </a:r>
+                      <a:endParaRPr lang="fr-FR" sz="1200">
+                        <a:solidFill>
+                          <a:srgbClr val="4A8B37"/>
+                        </a:solidFill>
+                      </a:endParaRPr>
+                    </a:p>
+                  </a:txBody>
+                  <a:tcPr marL="0" marR="0" marT="0" marB="0" anchor="ctr"/>
+                </a:tc>
+                <a:tc>
+                  <a:txBody>
+                    <a:bodyPr/>
+                    <a:lstStyle/>
+                    <a:p>
                       <a:pPr algn="ctr"/>
+                      <a:r>
+                        <a:rPr lang="fr-FR" sz="1200">
+                          <a:solidFill>
+                            <a:srgbClr val="C0504D"/>
+                          </a:solidFill>
+                          <a:latin typeface="Zapf Dingbats"/>
+                          <a:ea typeface="Zapf Dingbats"/>
+                          <a:cs typeface="Zapf Dingbats"/>
+                          <a:sym typeface="Zapf Dingbats"/>
+                        </a:rPr>
+                        <a:t>✗</a:t>
+                      </a:r>
                       <a:endParaRPr lang="fr-FR" sz="1200"/>
                     </a:p>
                   </a:txBody>
@@ -19101,6 +19016,18 @@
                     <a:lstStyle/>
                     <a:p>
                       <a:pPr algn="ctr"/>
+                      <a:r>
+                        <a:rPr lang="fr-FR" sz="1200">
+                          <a:solidFill>
+                            <a:srgbClr val="4A8B37"/>
+                          </a:solidFill>
+                          <a:latin typeface="Zapf Dingbats"/>
+                          <a:ea typeface="Zapf Dingbats"/>
+                          <a:cs typeface="Zapf Dingbats"/>
+                          <a:sym typeface="Zapf Dingbats"/>
+                        </a:rPr>
+                        <a:t>✓</a:t>
+                      </a:r>
                       <a:endParaRPr lang="fr-FR" sz="1200"/>
                     </a:p>
                   </a:txBody>
@@ -19112,6 +19039,18 @@
                     <a:lstStyle/>
                     <a:p>
                       <a:pPr algn="ctr"/>
+                      <a:r>
+                        <a:rPr lang="fr-FR" sz="1200">
+                          <a:solidFill>
+                            <a:srgbClr val="4A8B37"/>
+                          </a:solidFill>
+                          <a:latin typeface="Zapf Dingbats"/>
+                          <a:ea typeface="Zapf Dingbats"/>
+                          <a:cs typeface="Zapf Dingbats"/>
+                          <a:sym typeface="Zapf Dingbats"/>
+                        </a:rPr>
+                        <a:t>✓</a:t>
+                      </a:r>
                       <a:endParaRPr lang="fr-FR" sz="1200"/>
                     </a:p>
                   </a:txBody>
@@ -19123,6 +19062,18 @@
                     <a:lstStyle/>
                     <a:p>
                       <a:pPr algn="ctr"/>
+                      <a:r>
+                        <a:rPr lang="fr-FR" sz="1200">
+                          <a:solidFill>
+                            <a:srgbClr val="C0504D"/>
+                          </a:solidFill>
+                          <a:latin typeface="Zapf Dingbats"/>
+                          <a:ea typeface="Zapf Dingbats"/>
+                          <a:cs typeface="Zapf Dingbats"/>
+                          <a:sym typeface="Zapf Dingbats"/>
+                        </a:rPr>
+                        <a:t>✗</a:t>
+                      </a:r>
                       <a:endParaRPr lang="fr-FR" sz="1200"/>
                     </a:p>
                   </a:txBody>
@@ -19134,6 +19085,18 @@
                     <a:lstStyle/>
                     <a:p>
                       <a:pPr algn="ctr"/>
+                      <a:r>
+                        <a:rPr lang="fr-FR" sz="1200">
+                          <a:solidFill>
+                            <a:srgbClr val="4A8B37"/>
+                          </a:solidFill>
+                          <a:latin typeface="Zapf Dingbats"/>
+                          <a:ea typeface="Zapf Dingbats"/>
+                          <a:cs typeface="Zapf Dingbats"/>
+                          <a:sym typeface="Zapf Dingbats"/>
+                        </a:rPr>
+                        <a:t>✓</a:t>
+                      </a:r>
                       <a:endParaRPr lang="fr-FR" sz="1200"/>
                     </a:p>
                   </a:txBody>
@@ -19145,28 +19108,18 @@
                     <a:lstStyle/>
                     <a:p>
                       <a:pPr algn="ctr"/>
-                      <a:endParaRPr lang="fr-FR" sz="1200"/>
-                    </a:p>
-                  </a:txBody>
-                  <a:tcPr marL="0" marR="0" marT="0" marB="0" anchor="ctr"/>
-                </a:tc>
-                <a:tc>
-                  <a:txBody>
-                    <a:bodyPr/>
-                    <a:lstStyle/>
-                    <a:p>
-                      <a:pPr algn="ctr"/>
-                      <a:endParaRPr lang="fr-FR" sz="1200"/>
-                    </a:p>
-                  </a:txBody>
-                  <a:tcPr marL="0" marR="0" marT="0" marB="0" anchor="ctr"/>
-                </a:tc>
-                <a:tc>
-                  <a:txBody>
-                    <a:bodyPr/>
-                    <a:lstStyle/>
-                    <a:p>
-                      <a:pPr algn="ctr"/>
+                      <a:r>
+                        <a:rPr lang="fr-FR" sz="1200">
+                          <a:solidFill>
+                            <a:srgbClr val="C0504D"/>
+                          </a:solidFill>
+                          <a:latin typeface="Zapf Dingbats"/>
+                          <a:ea typeface="Zapf Dingbats"/>
+                          <a:cs typeface="Zapf Dingbats"/>
+                          <a:sym typeface="Zapf Dingbats"/>
+                        </a:rPr>
+                        <a:t>✗</a:t>
+                      </a:r>
                       <a:endParaRPr lang="fr-FR" sz="1200"/>
                     </a:p>
                   </a:txBody>
@@ -19247,7 +19200,105 @@
                     <a:bodyPr/>
                     <a:lstStyle/>
                     <a:p>
+                      <a:pPr marL="0" marR="0" indent="0" algn="ctr" defTabSz="457200" rtl="0" eaLnBrk="1" fontAlgn="auto" latinLnBrk="0" hangingPunct="1">
+                        <a:lnSpc>
+                          <a:spcPct val="100000"/>
+                        </a:lnSpc>
+                        <a:spcBef>
+                          <a:spcPts val="0"/>
+                        </a:spcBef>
+                        <a:spcAft>
+                          <a:spcPts val="0"/>
+                        </a:spcAft>
+                        <a:buClrTx/>
+                        <a:buSzTx/>
+                        <a:buFontTx/>
+                        <a:buNone/>
+                        <a:tabLst/>
+                        <a:defRPr/>
+                      </a:pPr>
+                      <a:r>
+                        <a:rPr lang="fr-FR" sz="1200">
+                          <a:solidFill>
+                            <a:srgbClr val="C0504D"/>
+                          </a:solidFill>
+                          <a:latin typeface="Zapf Dingbats"/>
+                          <a:ea typeface="Zapf Dingbats"/>
+                          <a:cs typeface="Zapf Dingbats"/>
+                          <a:sym typeface="Zapf Dingbats"/>
+                        </a:rPr>
+                        <a:t>✗</a:t>
+                      </a:r>
+                      <a:endParaRPr lang="fr-FR" sz="1200">
+                        <a:solidFill>
+                          <a:srgbClr val="C0504D"/>
+                        </a:solidFill>
+                      </a:endParaRPr>
+                    </a:p>
+                  </a:txBody>
+                  <a:tcPr marL="0" marR="0" marT="0" marB="0" anchor="ctr"/>
+                </a:tc>
+                <a:tc>
+                  <a:txBody>
+                    <a:bodyPr/>
+                    <a:lstStyle/>
+                    <a:p>
+                      <a:pPr marL="0" marR="0" indent="0" algn="ctr" defTabSz="457200" rtl="0" eaLnBrk="1" fontAlgn="auto" latinLnBrk="0" hangingPunct="1">
+                        <a:lnSpc>
+                          <a:spcPct val="100000"/>
+                        </a:lnSpc>
+                        <a:spcBef>
+                          <a:spcPts val="0"/>
+                        </a:spcBef>
+                        <a:spcAft>
+                          <a:spcPts val="0"/>
+                        </a:spcAft>
+                        <a:buClrTx/>
+                        <a:buSzTx/>
+                        <a:buFontTx/>
+                        <a:buNone/>
+                        <a:tabLst/>
+                        <a:defRPr/>
+                      </a:pPr>
+                      <a:r>
+                        <a:rPr lang="fr-FR" sz="1200">
+                          <a:solidFill>
+                            <a:srgbClr val="4A8B37"/>
+                          </a:solidFill>
+                          <a:latin typeface="Zapf Dingbats"/>
+                          <a:ea typeface="Zapf Dingbats"/>
+                          <a:cs typeface="Zapf Dingbats"/>
+                          <a:sym typeface="Zapf Dingbats"/>
+                        </a:rPr>
+                        <a:t>✓</a:t>
+                      </a:r>
+                      <a:endParaRPr lang="fr-FR" sz="1200">
+                        <a:solidFill>
+                          <a:srgbClr val="4A8B37"/>
+                        </a:solidFill>
+                      </a:endParaRPr>
+                    </a:p>
+                  </a:txBody>
+                  <a:tcPr marL="0" marR="0" marT="0" marB="0" anchor="ctr"/>
+                </a:tc>
+                <a:tc>
+                  <a:txBody>
+                    <a:bodyPr/>
+                    <a:lstStyle/>
+                    <a:p>
                       <a:pPr algn="ctr"/>
+                      <a:r>
+                        <a:rPr lang="fr-FR" sz="1200">
+                          <a:solidFill>
+                            <a:srgbClr val="C0504D"/>
+                          </a:solidFill>
+                          <a:latin typeface="Zapf Dingbats"/>
+                          <a:ea typeface="Zapf Dingbats"/>
+                          <a:cs typeface="Zapf Dingbats"/>
+                          <a:sym typeface="Zapf Dingbats"/>
+                        </a:rPr>
+                        <a:t>✗</a:t>
+                      </a:r>
                       <a:endParaRPr lang="fr-FR" sz="1200"/>
                     </a:p>
                   </a:txBody>
@@ -19259,6 +19310,18 @@
                     <a:lstStyle/>
                     <a:p>
                       <a:pPr algn="ctr"/>
+                      <a:r>
+                        <a:rPr lang="fr-FR" sz="1200">
+                          <a:solidFill>
+                            <a:srgbClr val="4A8B37"/>
+                          </a:solidFill>
+                          <a:latin typeface="Zapf Dingbats"/>
+                          <a:ea typeface="Zapf Dingbats"/>
+                          <a:cs typeface="Zapf Dingbats"/>
+                          <a:sym typeface="Zapf Dingbats"/>
+                        </a:rPr>
+                        <a:t>✓</a:t>
+                      </a:r>
                       <a:endParaRPr lang="fr-FR" sz="1200"/>
                     </a:p>
                   </a:txBody>
@@ -19270,6 +19333,18 @@
                     <a:lstStyle/>
                     <a:p>
                       <a:pPr algn="ctr"/>
+                      <a:r>
+                        <a:rPr lang="fr-FR" sz="1200">
+                          <a:solidFill>
+                            <a:srgbClr val="4A8B37"/>
+                          </a:solidFill>
+                          <a:latin typeface="Zapf Dingbats"/>
+                          <a:ea typeface="Zapf Dingbats"/>
+                          <a:cs typeface="Zapf Dingbats"/>
+                          <a:sym typeface="Zapf Dingbats"/>
+                        </a:rPr>
+                        <a:t>✓</a:t>
+                      </a:r>
                       <a:endParaRPr lang="fr-FR" sz="1200"/>
                     </a:p>
                   </a:txBody>
@@ -19281,6 +19356,18 @@
                     <a:lstStyle/>
                     <a:p>
                       <a:pPr algn="ctr"/>
+                      <a:r>
+                        <a:rPr lang="fr-FR" sz="1200">
+                          <a:solidFill>
+                            <a:srgbClr val="C0504D"/>
+                          </a:solidFill>
+                          <a:latin typeface="Zapf Dingbats"/>
+                          <a:ea typeface="Zapf Dingbats"/>
+                          <a:cs typeface="Zapf Dingbats"/>
+                          <a:sym typeface="Zapf Dingbats"/>
+                        </a:rPr>
+                        <a:t>✗</a:t>
+                      </a:r>
                       <a:endParaRPr lang="fr-FR" sz="1200"/>
                     </a:p>
                   </a:txBody>
@@ -19292,6 +19379,18 @@
                     <a:lstStyle/>
                     <a:p>
                       <a:pPr algn="ctr"/>
+                      <a:r>
+                        <a:rPr lang="fr-FR" sz="1200">
+                          <a:solidFill>
+                            <a:srgbClr val="4A8B37"/>
+                          </a:solidFill>
+                          <a:latin typeface="Zapf Dingbats"/>
+                          <a:ea typeface="Zapf Dingbats"/>
+                          <a:cs typeface="Zapf Dingbats"/>
+                          <a:sym typeface="Zapf Dingbats"/>
+                        </a:rPr>
+                        <a:t>✓</a:t>
+                      </a:r>
                       <a:endParaRPr lang="fr-FR" sz="1200"/>
                     </a:p>
                   </a:txBody>
@@ -19303,28 +19402,18 @@
                     <a:lstStyle/>
                     <a:p>
                       <a:pPr algn="ctr"/>
-                      <a:endParaRPr lang="fr-FR" sz="1200"/>
-                    </a:p>
-                  </a:txBody>
-                  <a:tcPr marL="0" marR="0" marT="0" marB="0" anchor="ctr"/>
-                </a:tc>
-                <a:tc>
-                  <a:txBody>
-                    <a:bodyPr/>
-                    <a:lstStyle/>
-                    <a:p>
-                      <a:pPr algn="ctr"/>
-                      <a:endParaRPr lang="fr-FR" sz="1200"/>
-                    </a:p>
-                  </a:txBody>
-                  <a:tcPr marL="0" marR="0" marT="0" marB="0" anchor="ctr"/>
-                </a:tc>
-                <a:tc>
-                  <a:txBody>
-                    <a:bodyPr/>
-                    <a:lstStyle/>
-                    <a:p>
-                      <a:pPr algn="ctr"/>
+                      <a:r>
+                        <a:rPr lang="fr-FR" sz="1200">
+                          <a:solidFill>
+                            <a:srgbClr val="C0504D"/>
+                          </a:solidFill>
+                          <a:latin typeface="Zapf Dingbats"/>
+                          <a:ea typeface="Zapf Dingbats"/>
+                          <a:cs typeface="Zapf Dingbats"/>
+                          <a:sym typeface="Zapf Dingbats"/>
+                        </a:rPr>
+                        <a:t>✗</a:t>
+                      </a:r>
                       <a:endParaRPr lang="fr-FR" sz="1200"/>
                     </a:p>
                   </a:txBody>
@@ -19405,7 +19494,62 @@
                     <a:bodyPr/>
                     <a:lstStyle/>
                     <a:p>
+                      <a:pPr marL="0" marR="0" indent="0" algn="ctr" defTabSz="457200" rtl="0" eaLnBrk="1" fontAlgn="auto" latinLnBrk="0" hangingPunct="1">
+                        <a:lnSpc>
+                          <a:spcPct val="100000"/>
+                        </a:lnSpc>
+                        <a:spcBef>
+                          <a:spcPts val="0"/>
+                        </a:spcBef>
+                        <a:spcAft>
+                          <a:spcPts val="0"/>
+                        </a:spcAft>
+                        <a:buClrTx/>
+                        <a:buSzTx/>
+                        <a:buFontTx/>
+                        <a:buNone/>
+                        <a:tabLst/>
+                        <a:defRPr/>
+                      </a:pPr>
+                      <a:r>
+                        <a:rPr lang="fr-FR" sz="1200">
+                          <a:solidFill>
+                            <a:srgbClr val="C0504D"/>
+                          </a:solidFill>
+                          <a:latin typeface="Zapf Dingbats"/>
+                          <a:ea typeface="Zapf Dingbats"/>
+                          <a:cs typeface="Zapf Dingbats"/>
+                          <a:sym typeface="Zapf Dingbats"/>
+                        </a:rPr>
+                        <a:t>✗</a:t>
+                      </a:r>
+                      <a:endParaRPr lang="fr-FR" sz="1200">
+                        <a:solidFill>
+                          <a:srgbClr val="C0504D"/>
+                        </a:solidFill>
+                      </a:endParaRPr>
+                    </a:p>
+                  </a:txBody>
+                  <a:tcPr marL="0" marR="0" marT="0" marB="0" anchor="ctr"/>
+                </a:tc>
+                <a:tc>
+                  <a:txBody>
+                    <a:bodyPr/>
+                    <a:lstStyle/>
+                    <a:p>
                       <a:pPr algn="ctr"/>
+                      <a:r>
+                        <a:rPr lang="fr-FR" sz="1200">
+                          <a:solidFill>
+                            <a:srgbClr val="4A8B37"/>
+                          </a:solidFill>
+                          <a:latin typeface="Zapf Dingbats"/>
+                          <a:ea typeface="Zapf Dingbats"/>
+                          <a:cs typeface="Zapf Dingbats"/>
+                          <a:sym typeface="Zapf Dingbats"/>
+                        </a:rPr>
+                        <a:t>✓</a:t>
+                      </a:r>
                       <a:endParaRPr lang="fr-FR" sz="1200"/>
                     </a:p>
                   </a:txBody>
@@ -19417,6 +19561,18 @@
                     <a:lstStyle/>
                     <a:p>
                       <a:pPr algn="ctr"/>
+                      <a:r>
+                        <a:rPr lang="fr-FR" sz="1200">
+                          <a:solidFill>
+                            <a:srgbClr val="C0504D"/>
+                          </a:solidFill>
+                          <a:latin typeface="Zapf Dingbats"/>
+                          <a:ea typeface="Zapf Dingbats"/>
+                          <a:cs typeface="Zapf Dingbats"/>
+                          <a:sym typeface="Zapf Dingbats"/>
+                        </a:rPr>
+                        <a:t>✗</a:t>
+                      </a:r>
                       <a:endParaRPr lang="fr-FR" sz="1200"/>
                     </a:p>
                   </a:txBody>
@@ -19428,6 +19584,18 @@
                     <a:lstStyle/>
                     <a:p>
                       <a:pPr algn="ctr"/>
+                      <a:r>
+                        <a:rPr lang="fr-FR" sz="1200">
+                          <a:solidFill>
+                            <a:srgbClr val="4A8B37"/>
+                          </a:solidFill>
+                          <a:latin typeface="Zapf Dingbats"/>
+                          <a:ea typeface="Zapf Dingbats"/>
+                          <a:cs typeface="Zapf Dingbats"/>
+                          <a:sym typeface="Zapf Dingbats"/>
+                        </a:rPr>
+                        <a:t>✓</a:t>
+                      </a:r>
                       <a:endParaRPr lang="fr-FR" sz="1200"/>
                     </a:p>
                   </a:txBody>
@@ -19439,6 +19607,18 @@
                     <a:lstStyle/>
                     <a:p>
                       <a:pPr algn="ctr"/>
+                      <a:r>
+                        <a:rPr lang="fr-FR" sz="1200">
+                          <a:solidFill>
+                            <a:srgbClr val="4A8B37"/>
+                          </a:solidFill>
+                          <a:latin typeface="Zapf Dingbats"/>
+                          <a:ea typeface="Zapf Dingbats"/>
+                          <a:cs typeface="Zapf Dingbats"/>
+                          <a:sym typeface="Zapf Dingbats"/>
+                        </a:rPr>
+                        <a:t>✓</a:t>
+                      </a:r>
                       <a:endParaRPr lang="fr-FR" sz="1200"/>
                     </a:p>
                   </a:txBody>
@@ -19450,6 +19630,18 @@
                     <a:lstStyle/>
                     <a:p>
                       <a:pPr algn="ctr"/>
+                      <a:r>
+                        <a:rPr lang="fr-FR" sz="1200">
+                          <a:solidFill>
+                            <a:srgbClr val="C0504D"/>
+                          </a:solidFill>
+                          <a:latin typeface="Zapf Dingbats"/>
+                          <a:ea typeface="Zapf Dingbats"/>
+                          <a:cs typeface="Zapf Dingbats"/>
+                          <a:sym typeface="Zapf Dingbats"/>
+                        </a:rPr>
+                        <a:t>✗</a:t>
+                      </a:r>
                       <a:endParaRPr lang="fr-FR" sz="1200"/>
                     </a:p>
                   </a:txBody>
@@ -19461,6 +19653,18 @@
                     <a:lstStyle/>
                     <a:p>
                       <a:pPr algn="ctr"/>
+                      <a:r>
+                        <a:rPr lang="fr-FR" sz="1200">
+                          <a:solidFill>
+                            <a:srgbClr val="4A8B37"/>
+                          </a:solidFill>
+                          <a:latin typeface="Zapf Dingbats"/>
+                          <a:ea typeface="Zapf Dingbats"/>
+                          <a:cs typeface="Zapf Dingbats"/>
+                          <a:sym typeface="Zapf Dingbats"/>
+                        </a:rPr>
+                        <a:t>✓</a:t>
+                      </a:r>
                       <a:endParaRPr lang="fr-FR" sz="1200"/>
                     </a:p>
                   </a:txBody>
@@ -19472,17 +19676,18 @@
                     <a:lstStyle/>
                     <a:p>
                       <a:pPr algn="ctr"/>
-                      <a:endParaRPr lang="fr-FR" sz="1200"/>
-                    </a:p>
-                  </a:txBody>
-                  <a:tcPr marL="0" marR="0" marT="0" marB="0" anchor="ctr"/>
-                </a:tc>
-                <a:tc>
-                  <a:txBody>
-                    <a:bodyPr/>
-                    <a:lstStyle/>
-                    <a:p>
-                      <a:pPr algn="ctr"/>
+                      <a:r>
+                        <a:rPr lang="fr-FR" sz="1200">
+                          <a:solidFill>
+                            <a:srgbClr val="C0504D"/>
+                          </a:solidFill>
+                          <a:latin typeface="Zapf Dingbats"/>
+                          <a:ea typeface="Zapf Dingbats"/>
+                          <a:cs typeface="Zapf Dingbats"/>
+                          <a:sym typeface="Zapf Dingbats"/>
+                        </a:rPr>
+                        <a:t>✗</a:t>
+                      </a:r>
                       <a:endParaRPr lang="fr-FR" sz="1200"/>
                     </a:p>
                   </a:txBody>
@@ -19649,13 +19854,13 @@
   <p:clrMapOvr>
     <a:masterClrMapping/>
   </p:clrMapOvr>
-  <mc:AlternateContent xmlns:mc="http://schemas.openxmlformats.org/markup-compatibility/2006">
-    <mc:Choice xmlns:p14="http://schemas.microsoft.com/office/powerpoint/2010/main" Requires="p14">
+  <mc:AlternateContent xmlns:mc="http://schemas.openxmlformats.org/markup-compatibility/2006" xmlns:p14="http://schemas.microsoft.com/office/powerpoint/2010/main">
+    <mc:Choice Requires="p14">
       <p:transition spd="med" p14:dur="700">
         <p:fade/>
       </p:transition>
     </mc:Choice>
-    <mc:Fallback>
+    <mc:Fallback xmlns="">
       <p:transition xmlns:p14="http://schemas.microsoft.com/office/powerpoint/2010/main" spd="med">
         <p:fade/>
       </p:transition>
@@ -19771,7 +19976,6 @@
               <a:rPr lang="fr-FR"/>
               <a:t>Analyse et réflexion</a:t>
             </a:r>
-            <a:endParaRPr lang="fr-FR"/>
           </a:p>
         </p:txBody>
       </p:sp>
@@ -19895,7 +20099,6 @@
               <a:rPr lang="fr-FR"/>
               <a:t>Analyse et réflexion</a:t>
             </a:r>
-            <a:endParaRPr lang="fr-FR"/>
           </a:p>
         </p:txBody>
       </p:sp>
@@ -20019,7 +20222,6 @@
               <a:rPr lang="fr-FR"/>
               <a:t>Analyse et réflexion</a:t>
             </a:r>
-            <a:endParaRPr lang="fr-FR"/>
           </a:p>
         </p:txBody>
       </p:sp>
@@ -20134,13 +20336,13 @@
   <p:clrMapOvr>
     <a:masterClrMapping/>
   </p:clrMapOvr>
-  <mc:AlternateContent xmlns:mc="http://schemas.openxmlformats.org/markup-compatibility/2006">
-    <mc:Choice xmlns:p14="http://schemas.microsoft.com/office/powerpoint/2010/main" Requires="p14">
+  <mc:AlternateContent xmlns:mc="http://schemas.openxmlformats.org/markup-compatibility/2006" xmlns:p14="http://schemas.microsoft.com/office/powerpoint/2010/main">
+    <mc:Choice Requires="p14">
       <p:transition spd="med" p14:dur="700">
         <p:fade/>
       </p:transition>
     </mc:Choice>
-    <mc:Fallback>
+    <mc:Fallback xmlns="">
       <p:transition xmlns:p14="http://schemas.microsoft.com/office/powerpoint/2010/main" spd="med">
         <p:fade/>
       </p:transition>
@@ -20414,7 +20616,6 @@
               <a:rPr lang="fr-FR"/>
               <a:t>simulation et résulats</a:t>
             </a:r>
-            <a:endParaRPr lang="fr-FR"/>
           </a:p>
         </p:txBody>
       </p:sp>
@@ -20535,13 +20736,13 @@
   <p:clrMapOvr>
     <a:masterClrMapping/>
   </p:clrMapOvr>
-  <mc:AlternateContent xmlns:mc="http://schemas.openxmlformats.org/markup-compatibility/2006">
-    <mc:Choice xmlns:p14="http://schemas.microsoft.com/office/powerpoint/2010/main" Requires="p14">
+  <mc:AlternateContent xmlns:mc="http://schemas.openxmlformats.org/markup-compatibility/2006" xmlns:p14="http://schemas.microsoft.com/office/powerpoint/2010/main">
+    <mc:Choice Requires="p14">
       <p:transition spd="med" p14:dur="700">
         <p:fade/>
       </p:transition>
     </mc:Choice>
-    <mc:Fallback>
+    <mc:Fallback xmlns="">
       <p:transition xmlns:p14="http://schemas.microsoft.com/office/powerpoint/2010/main" spd="med">
         <p:fade/>
       </p:transition>

</xml_diff>

<commit_message>
Corrections etat de l'art
</commit_message>
<xml_diff>
--- a/Redaction/pres.pptx
+++ b/Redaction/pres.pptx
@@ -1302,21 +1302,21 @@
     </dgm:pt>
   </dgm:ptLst>
   <dgm:cxnLst>
-    <dgm:cxn modelId="{BD289E23-9AEB-1545-8121-FFED29DF8A76}" type="presOf" srcId="{EBD4001C-B961-5540-8C87-277869C67930}" destId="{D2B7ABDE-DC5D-CC43-A304-27801E8F3934}" srcOrd="1" destOrd="0" presId="urn:microsoft.com/office/officeart/2005/8/layout/radial5"/>
-    <dgm:cxn modelId="{5EF9709A-DAC0-EE4B-8557-4C53B4B56380}" type="presOf" srcId="{7DA216F7-B61A-644F-9E41-4844BDF2E1EB}" destId="{9AF44D55-8614-3B46-93BF-F278C02874B0}" srcOrd="0" destOrd="0" presId="urn:microsoft.com/office/officeart/2005/8/layout/radial5"/>
-    <dgm:cxn modelId="{20D7BF27-E99E-774C-A330-14F0528895CF}" type="presOf" srcId="{EC3D84DF-2E4A-914D-8008-A16D5583089F}" destId="{2D39C667-17DD-D243-BBEF-E694A5E11B6F}" srcOrd="0" destOrd="0" presId="urn:microsoft.com/office/officeart/2005/8/layout/radial5"/>
     <dgm:cxn modelId="{3CF9BB7A-5A06-2847-8A99-D91FA18D9AFA}" type="presOf" srcId="{5304632D-3534-014E-A773-191A91505663}" destId="{28E9526E-7B0C-9143-A850-585B8E0E2207}" srcOrd="0" destOrd="0" presId="urn:microsoft.com/office/officeart/2005/8/layout/radial5"/>
-    <dgm:cxn modelId="{981409B1-430A-F64D-A631-F9C5F731F273}" type="presOf" srcId="{EBD4001C-B961-5540-8C87-277869C67930}" destId="{443AD5A5-74EA-D84C-A21D-7D9663E3D147}" srcOrd="0" destOrd="0" presId="urn:microsoft.com/office/officeart/2005/8/layout/radial5"/>
-    <dgm:cxn modelId="{88714B9B-4491-1648-BFA5-9908FC612FF9}" type="presOf" srcId="{1A6F2230-7FF1-784D-8943-FAFBB5BD867E}" destId="{EFF2F8AC-1F1B-6D4D-8C29-AE41441F26F7}" srcOrd="0" destOrd="0" presId="urn:microsoft.com/office/officeart/2005/8/layout/radial5"/>
-    <dgm:cxn modelId="{1F426276-401F-6548-A04B-6E549D314F44}" srcId="{EC3D84DF-2E4A-914D-8008-A16D5583089F}" destId="{B7BB0103-7E47-DD47-A685-FB155C9A07EE}" srcOrd="0" destOrd="0" parTransId="{187E3820-FDBD-A14B-8D53-13DEEA190D85}" sibTransId="{07DE391C-36DC-2347-ACDE-6F70ECD1194A}"/>
-    <dgm:cxn modelId="{DA6D3E26-D7CA-AD40-9EAA-FB53CCDC295A}" srcId="{B7BB0103-7E47-DD47-A685-FB155C9A07EE}" destId="{7DA216F7-B61A-644F-9E41-4844BDF2E1EB}" srcOrd="1" destOrd="0" parTransId="{EE98EBD2-B01C-AC47-87D6-306A993857F7}" sibTransId="{40828377-F63C-7147-AD5C-8E259A94515F}"/>
     <dgm:cxn modelId="{D1A37C89-99F7-8646-9954-2A9040E91DE6}" type="presOf" srcId="{B7BB0103-7E47-DD47-A685-FB155C9A07EE}" destId="{5DD8E76F-190F-AE4D-8F4D-4BB2AADB5179}" srcOrd="0" destOrd="0" presId="urn:microsoft.com/office/officeart/2005/8/layout/radial5"/>
     <dgm:cxn modelId="{182F8A36-DF71-514D-A4DB-02C0E52C9E27}" srcId="{B7BB0103-7E47-DD47-A685-FB155C9A07EE}" destId="{80CDC2A9-E114-4E4E-97DA-E5A6E9106C0D}" srcOrd="2" destOrd="0" parTransId="{EBD4001C-B961-5540-8C87-277869C67930}" sibTransId="{23331D01-66FE-2F4E-9D58-79CD274B6161}"/>
-    <dgm:cxn modelId="{06BD377A-1813-9A43-8E47-E01E784BE70D}" type="presOf" srcId="{80CDC2A9-E114-4E4E-97DA-E5A6E9106C0D}" destId="{E6336081-3369-9448-A37D-3542AC02AA41}" srcOrd="0" destOrd="0" presId="urn:microsoft.com/office/officeart/2005/8/layout/radial5"/>
+    <dgm:cxn modelId="{1F426276-401F-6548-A04B-6E549D314F44}" srcId="{EC3D84DF-2E4A-914D-8008-A16D5583089F}" destId="{B7BB0103-7E47-DD47-A685-FB155C9A07EE}" srcOrd="0" destOrd="0" parTransId="{187E3820-FDBD-A14B-8D53-13DEEA190D85}" sibTransId="{07DE391C-36DC-2347-ACDE-6F70ECD1194A}"/>
+    <dgm:cxn modelId="{5EF9709A-DAC0-EE4B-8557-4C53B4B56380}" type="presOf" srcId="{7DA216F7-B61A-644F-9E41-4844BDF2E1EB}" destId="{9AF44D55-8614-3B46-93BF-F278C02874B0}" srcOrd="0" destOrd="0" presId="urn:microsoft.com/office/officeart/2005/8/layout/radial5"/>
+    <dgm:cxn modelId="{B42444B2-648E-4449-96AD-FC3B788CF0E4}" type="presOf" srcId="{EE98EBD2-B01C-AC47-87D6-306A993857F7}" destId="{54DC7B13-44EC-FF49-A46D-55A02B76FE87}" srcOrd="0" destOrd="0" presId="urn:microsoft.com/office/officeart/2005/8/layout/radial5"/>
+    <dgm:cxn modelId="{88714B9B-4491-1648-BFA5-9908FC612FF9}" type="presOf" srcId="{1A6F2230-7FF1-784D-8943-FAFBB5BD867E}" destId="{EFF2F8AC-1F1B-6D4D-8C29-AE41441F26F7}" srcOrd="0" destOrd="0" presId="urn:microsoft.com/office/officeart/2005/8/layout/radial5"/>
+    <dgm:cxn modelId="{981409B1-430A-F64D-A631-F9C5F731F273}" type="presOf" srcId="{EBD4001C-B961-5540-8C87-277869C67930}" destId="{443AD5A5-74EA-D84C-A21D-7D9663E3D147}" srcOrd="0" destOrd="0" presId="urn:microsoft.com/office/officeart/2005/8/layout/radial5"/>
     <dgm:cxn modelId="{41055DA1-11F4-F44D-8A2D-65078C273C86}" srcId="{B7BB0103-7E47-DD47-A685-FB155C9A07EE}" destId="{1A6F2230-7FF1-784D-8943-FAFBB5BD867E}" srcOrd="0" destOrd="0" parTransId="{5304632D-3534-014E-A773-191A91505663}" sibTransId="{18929EFA-1674-8D49-BFC2-4A2E5D4308B5}"/>
     <dgm:cxn modelId="{21A54FB8-9CA2-2343-945D-5B2902E5F5E8}" type="presOf" srcId="{5304632D-3534-014E-A773-191A91505663}" destId="{F6EB97ED-B6B4-4241-B774-3B7059FCFB8A}" srcOrd="1" destOrd="0" presId="urn:microsoft.com/office/officeart/2005/8/layout/radial5"/>
-    <dgm:cxn modelId="{B42444B2-648E-4449-96AD-FC3B788CF0E4}" type="presOf" srcId="{EE98EBD2-B01C-AC47-87D6-306A993857F7}" destId="{54DC7B13-44EC-FF49-A46D-55A02B76FE87}" srcOrd="0" destOrd="0" presId="urn:microsoft.com/office/officeart/2005/8/layout/radial5"/>
     <dgm:cxn modelId="{7ED21C30-811C-3644-A272-51AA029DED4E}" type="presOf" srcId="{EE98EBD2-B01C-AC47-87D6-306A993857F7}" destId="{F9C9631B-0A4E-8840-BB52-87B441B80EB5}" srcOrd="1" destOrd="0" presId="urn:microsoft.com/office/officeart/2005/8/layout/radial5"/>
+    <dgm:cxn modelId="{BD289E23-9AEB-1545-8121-FFED29DF8A76}" type="presOf" srcId="{EBD4001C-B961-5540-8C87-277869C67930}" destId="{D2B7ABDE-DC5D-CC43-A304-27801E8F3934}" srcOrd="1" destOrd="0" presId="urn:microsoft.com/office/officeart/2005/8/layout/radial5"/>
+    <dgm:cxn modelId="{06BD377A-1813-9A43-8E47-E01E784BE70D}" type="presOf" srcId="{80CDC2A9-E114-4E4E-97DA-E5A6E9106C0D}" destId="{E6336081-3369-9448-A37D-3542AC02AA41}" srcOrd="0" destOrd="0" presId="urn:microsoft.com/office/officeart/2005/8/layout/radial5"/>
+    <dgm:cxn modelId="{20D7BF27-E99E-774C-A330-14F0528895CF}" type="presOf" srcId="{EC3D84DF-2E4A-914D-8008-A16D5583089F}" destId="{2D39C667-17DD-D243-BBEF-E694A5E11B6F}" srcOrd="0" destOrd="0" presId="urn:microsoft.com/office/officeart/2005/8/layout/radial5"/>
+    <dgm:cxn modelId="{DA6D3E26-D7CA-AD40-9EAA-FB53CCDC295A}" srcId="{B7BB0103-7E47-DD47-A685-FB155C9A07EE}" destId="{7DA216F7-B61A-644F-9E41-4844BDF2E1EB}" srcOrd="1" destOrd="0" parTransId="{EE98EBD2-B01C-AC47-87D6-306A993857F7}" sibTransId="{40828377-F63C-7147-AD5C-8E259A94515F}"/>
     <dgm:cxn modelId="{D454D5EA-D415-0940-841D-9AF66E1C32C1}" type="presParOf" srcId="{2D39C667-17DD-D243-BBEF-E694A5E11B6F}" destId="{5DD8E76F-190F-AE4D-8F4D-4BB2AADB5179}" srcOrd="0" destOrd="0" presId="urn:microsoft.com/office/officeart/2005/8/layout/radial5"/>
     <dgm:cxn modelId="{758DD4F6-D5C5-1B47-AEAA-8A9B5ED271C1}" type="presParOf" srcId="{2D39C667-17DD-D243-BBEF-E694A5E11B6F}" destId="{28E9526E-7B0C-9143-A850-585B8E0E2207}" srcOrd="1" destOrd="0" presId="urn:microsoft.com/office/officeart/2005/8/layout/radial5"/>
     <dgm:cxn modelId="{0E9F40F2-2A10-F442-B672-458B50589287}" type="presParOf" srcId="{28E9526E-7B0C-9143-A850-585B8E0E2207}" destId="{F6EB97ED-B6B4-4241-B774-3B7059FCFB8A}" srcOrd="0" destOrd="0" presId="urn:microsoft.com/office/officeart/2005/8/layout/radial5"/>
@@ -3320,7 +3320,7 @@
           </a:lstStyle>
           <a:p>
             <a:fld id="{A403C439-8792-4E48-B980-226A62E380FA}" type="datetime1">
-              <a:t>22/04/12</a:t>
+              <a:t>23/04/12</a:t>
             </a:fld>
             <a:endParaRPr lang="fr-FR"/>
           </a:p>
@@ -3484,7 +3484,7 @@
           </a:lstStyle>
           <a:p>
             <a:fld id="{D72FB3A3-AF10-6843-BF9B-8AA1F700EDAB}" type="datetime1">
-              <a:t>22/04/12</a:t>
+              <a:t>23/04/12</a:t>
             </a:fld>
             <a:endParaRPr lang="fr-FR"/>
           </a:p>
@@ -4156,7 +4156,7 @@
           <a:lstStyle/>
           <a:p>
             <a:fld id="{EF8E0FF7-07C5-9A4B-B9E2-249745357892}" type="datetime1">
-              <a:t>22/04/12</a:t>
+              <a:t>23/04/12</a:t>
             </a:fld>
             <a:endParaRPr lang="fr-FR"/>
           </a:p>
@@ -4413,7 +4413,7 @@
           <a:lstStyle/>
           <a:p>
             <a:fld id="{1CF138A4-4CB9-4F43-A9A5-5E812734F798}" type="datetime1">
-              <a:t>22/04/12</a:t>
+              <a:t>23/04/12</a:t>
             </a:fld>
             <a:endParaRPr lang="fr-FR"/>
           </a:p>
@@ -4586,7 +4586,7 @@
           <a:lstStyle/>
           <a:p>
             <a:fld id="{AAD2A5F4-3CE0-E641-B869-DB0DBBD6BD4B}" type="datetime1">
-              <a:t>22/04/12</a:t>
+              <a:t>23/04/12</a:t>
             </a:fld>
             <a:endParaRPr lang="fr-FR"/>
           </a:p>
@@ -4769,7 +4769,7 @@
           <a:lstStyle/>
           <a:p>
             <a:fld id="{E88E79BD-A9A2-524D-A83A-844F4A79225F}" type="datetime1">
-              <a:t>22/04/12</a:t>
+              <a:t>23/04/12</a:t>
             </a:fld>
             <a:endParaRPr lang="fr-FR"/>
           </a:p>
@@ -5595,7 +5595,7 @@
           <a:lstStyle/>
           <a:p>
             <a:fld id="{D7406C6B-2A98-3F4A-8376-030E8D4E7748}" type="datetime1">
-              <a:t>22/04/12</a:t>
+              <a:t>23/04/12</a:t>
             </a:fld>
             <a:endParaRPr lang="fr-FR"/>
           </a:p>
@@ -5773,7 +5773,7 @@
           <a:lstStyle/>
           <a:p>
             <a:fld id="{63A6B9AC-03EB-404C-91E9-F1BAC402D744}" type="datetime1">
-              <a:t>22/04/12</a:t>
+              <a:t>23/04/12</a:t>
             </a:fld>
             <a:endParaRPr lang="fr-FR"/>
           </a:p>
@@ -6095,7 +6095,7 @@
           <a:lstStyle/>
           <a:p>
             <a:fld id="{FAEA84EA-A45B-A341-8AE9-ADAAC6B02B89}" type="datetime1">
-              <a:t>22/04/12</a:t>
+              <a:t>23/04/12</a:t>
             </a:fld>
             <a:endParaRPr lang="fr-FR"/>
           </a:p>
@@ -6385,7 +6385,7 @@
           <a:lstStyle/>
           <a:p>
             <a:fld id="{F59A7D60-8FBE-1944-8B44-499C1F06D97A}" type="datetime1">
-              <a:t>22/04/12</a:t>
+              <a:t>23/04/12</a:t>
             </a:fld>
             <a:endParaRPr lang="fr-FR"/>
           </a:p>
@@ -6814,7 +6814,7 @@
           <a:lstStyle/>
           <a:p>
             <a:fld id="{C69DB02C-4106-0343-8225-B58AAD2D629A}" type="datetime1">
-              <a:t>22/04/12</a:t>
+              <a:t>23/04/12</a:t>
             </a:fld>
             <a:endParaRPr lang="fr-FR"/>
           </a:p>
@@ -6936,7 +6936,7 @@
           <a:lstStyle/>
           <a:p>
             <a:fld id="{59AA06BD-BE72-7D49-9E53-083ABA7FC7D2}" type="datetime1">
-              <a:t>22/04/12</a:t>
+              <a:t>23/04/12</a:t>
             </a:fld>
             <a:endParaRPr lang="fr-FR"/>
           </a:p>
@@ -7036,7 +7036,7 @@
           <a:lstStyle/>
           <a:p>
             <a:fld id="{8F024E51-7B49-5D4A-86A0-E29FACC1A80A}" type="datetime1">
-              <a:t>22/04/12</a:t>
+              <a:t>23/04/12</a:t>
             </a:fld>
             <a:endParaRPr lang="fr-FR"/>
           </a:p>
@@ -7252,7 +7252,7 @@
           </a:lstStyle>
           <a:p>
             <a:fld id="{05B6F9A6-1CC6-4B49-B400-D379C806133A}" type="datetime1">
-              <a:t>22/04/12</a:t>
+              <a:t>23/04/12</a:t>
             </a:fld>
             <a:endParaRPr lang="fr-FR"/>
           </a:p>
@@ -10848,6 +10848,49 @@
           </a:p>
         </p:txBody>
       </p:sp>
+      <p:sp>
+        <p:nvSpPr>
+          <p:cNvPr id="22" name="Ellipse 21"/>
+          <p:cNvSpPr/>
+          <p:nvPr/>
+        </p:nvSpPr>
+        <p:spPr>
+          <a:xfrm>
+            <a:off x="7919544" y="5072295"/>
+            <a:ext cx="428293" cy="407558"/>
+          </a:xfrm>
+          <a:prstGeom prst="ellipse">
+            <a:avLst/>
+          </a:prstGeom>
+        </p:spPr>
+        <p:style>
+          <a:lnRef idx="1">
+            <a:schemeClr val="dk1"/>
+          </a:lnRef>
+          <a:fillRef idx="3">
+            <a:schemeClr val="dk1"/>
+          </a:fillRef>
+          <a:effectRef idx="2">
+            <a:schemeClr val="dk1"/>
+          </a:effectRef>
+          <a:fontRef idx="minor">
+            <a:schemeClr val="lt1"/>
+          </a:fontRef>
+        </p:style>
+        <p:txBody>
+          <a:bodyPr rtlCol="0" anchor="ctr">
+            <a:normAutofit fontScale="85000" lnSpcReduction="20000"/>
+          </a:bodyPr>
+          <a:lstStyle/>
+          <a:p>
+            <a:pPr algn="ctr"/>
+            <a:r>
+              <a:rPr lang="fr-FR"/>
+              <a:t>G</a:t>
+            </a:r>
+          </a:p>
+        </p:txBody>
+      </p:sp>
       <p:cxnSp>
         <p:nvCxnSpPr>
           <p:cNvPr id="15" name="Connecteur droit 14"/>
@@ -11084,114 +11127,6 @@
           </a:fontRef>
         </p:style>
       </p:cxnSp>
-      <p:sp>
-        <p:nvSpPr>
-          <p:cNvPr id="24" name="Espace réservé du contenu 6"/>
-          <p:cNvSpPr>
-            <a:spLocks noGrp="1"/>
-          </p:cNvSpPr>
-          <p:nvPr>
-            <p:ph idx="1"/>
-          </p:nvPr>
-        </p:nvSpPr>
-        <p:spPr>
-          <a:xfrm>
-            <a:off x="457200" y="1600201"/>
-            <a:ext cx="8229600" cy="4525963"/>
-          </a:xfrm>
-        </p:spPr>
-        <p:txBody>
-          <a:bodyPr>
-            <a:normAutofit/>
-          </a:bodyPr>
-          <a:lstStyle/>
-          <a:p>
-            <a:r>
-              <a:rPr lang="fr-FR"/>
-              <a:t>exemple : P = 0.5</a:t>
-            </a:r>
-          </a:p>
-          <a:p>
-            <a:endParaRPr lang="fr-FR"/>
-          </a:p>
-          <a:p>
-            <a:r>
-              <a:rPr lang="fr-FR"/>
-              <a:t>2 transmissions </a:t>
-            </a:r>
-          </a:p>
-          <a:p>
-            <a:pPr marL="0" indent="0">
-              <a:buNone/>
-            </a:pPr>
-            <a:r>
-              <a:rPr lang="fr-FR"/>
-              <a:t>superflues</a:t>
-            </a:r>
-          </a:p>
-          <a:p>
-            <a:endParaRPr lang="fr-FR"/>
-          </a:p>
-          <a:p>
-            <a:r>
-              <a:rPr lang="fr-FR"/>
-              <a:t>2 nœuds non </a:t>
-            </a:r>
-          </a:p>
-          <a:p>
-            <a:pPr marL="0" indent="0">
-              <a:buNone/>
-            </a:pPr>
-            <a:r>
-              <a:rPr lang="fr-FR"/>
-              <a:t>couverts</a:t>
-            </a:r>
-          </a:p>
-        </p:txBody>
-      </p:sp>
-      <p:sp>
-        <p:nvSpPr>
-          <p:cNvPr id="22" name="Ellipse 21"/>
-          <p:cNvSpPr/>
-          <p:nvPr/>
-        </p:nvSpPr>
-        <p:spPr>
-          <a:xfrm>
-            <a:off x="7919544" y="5072295"/>
-            <a:ext cx="428293" cy="407558"/>
-          </a:xfrm>
-          <a:prstGeom prst="ellipse">
-            <a:avLst/>
-          </a:prstGeom>
-        </p:spPr>
-        <p:style>
-          <a:lnRef idx="1">
-            <a:schemeClr val="dk1"/>
-          </a:lnRef>
-          <a:fillRef idx="3">
-            <a:schemeClr val="dk1"/>
-          </a:fillRef>
-          <a:effectRef idx="2">
-            <a:schemeClr val="dk1"/>
-          </a:effectRef>
-          <a:fontRef idx="minor">
-            <a:schemeClr val="lt1"/>
-          </a:fontRef>
-        </p:style>
-        <p:txBody>
-          <a:bodyPr rtlCol="0" anchor="ctr">
-            <a:normAutofit fontScale="85000" lnSpcReduction="20000"/>
-          </a:bodyPr>
-          <a:lstStyle/>
-          <a:p>
-            <a:pPr algn="ctr"/>
-            <a:r>
-              <a:rPr lang="fr-FR"/>
-              <a:t>G</a:t>
-            </a:r>
-          </a:p>
-        </p:txBody>
-      </p:sp>
       <p:cxnSp>
         <p:nvCxnSpPr>
           <p:cNvPr id="23" name="Connecteur droit 22"/>
@@ -11224,6 +11159,71 @@
           </a:fontRef>
         </p:style>
       </p:cxnSp>
+      <p:sp>
+        <p:nvSpPr>
+          <p:cNvPr id="24" name="Espace réservé du contenu 6"/>
+          <p:cNvSpPr>
+            <a:spLocks noGrp="1"/>
+          </p:cNvSpPr>
+          <p:nvPr>
+            <p:ph idx="1"/>
+          </p:nvPr>
+        </p:nvSpPr>
+        <p:spPr>
+          <a:xfrm>
+            <a:off x="457200" y="1600201"/>
+            <a:ext cx="8229600" cy="4525963"/>
+          </a:xfrm>
+        </p:spPr>
+        <p:txBody>
+          <a:bodyPr>
+            <a:normAutofit/>
+          </a:bodyPr>
+          <a:lstStyle/>
+          <a:p>
+            <a:r>
+              <a:rPr lang="fr-FR"/>
+              <a:t>exemple : P = 0.5</a:t>
+            </a:r>
+          </a:p>
+          <a:p>
+            <a:endParaRPr lang="fr-FR"/>
+          </a:p>
+          <a:p>
+            <a:r>
+              <a:rPr lang="fr-FR"/>
+              <a:t>2 transmissions </a:t>
+            </a:r>
+          </a:p>
+          <a:p>
+            <a:pPr marL="0" indent="0">
+              <a:buNone/>
+            </a:pPr>
+            <a:r>
+              <a:rPr lang="fr-FR"/>
+              <a:t>superflues</a:t>
+            </a:r>
+          </a:p>
+          <a:p>
+            <a:endParaRPr lang="fr-FR"/>
+          </a:p>
+          <a:p>
+            <a:r>
+              <a:rPr lang="fr-FR"/>
+              <a:t>2 nœuds non </a:t>
+            </a:r>
+          </a:p>
+          <a:p>
+            <a:pPr marL="0" indent="0">
+              <a:buNone/>
+            </a:pPr>
+            <a:r>
+              <a:rPr lang="fr-FR"/>
+              <a:t>couverts</a:t>
+            </a:r>
+          </a:p>
+        </p:txBody>
+      </p:sp>
     </p:spTree>
     <p:extLst>
       <p:ext uri="{BB962C8B-B14F-4D97-AF65-F5344CB8AC3E}">

</xml_diff>

<commit_message>
Ajout d'illustrations dans la presentation
</commit_message>
<xml_diff>
--- a/Redaction/pres.pptx
+++ b/Redaction/pres.pptx
@@ -1302,21 +1302,21 @@
     </dgm:pt>
   </dgm:ptLst>
   <dgm:cxnLst>
+    <dgm:cxn modelId="{BD289E23-9AEB-1545-8121-FFED29DF8A76}" type="presOf" srcId="{EBD4001C-B961-5540-8C87-277869C67930}" destId="{D2B7ABDE-DC5D-CC43-A304-27801E8F3934}" srcOrd="1" destOrd="0" presId="urn:microsoft.com/office/officeart/2005/8/layout/radial5"/>
+    <dgm:cxn modelId="{5EF9709A-DAC0-EE4B-8557-4C53B4B56380}" type="presOf" srcId="{7DA216F7-B61A-644F-9E41-4844BDF2E1EB}" destId="{9AF44D55-8614-3B46-93BF-F278C02874B0}" srcOrd="0" destOrd="0" presId="urn:microsoft.com/office/officeart/2005/8/layout/radial5"/>
+    <dgm:cxn modelId="{20D7BF27-E99E-774C-A330-14F0528895CF}" type="presOf" srcId="{EC3D84DF-2E4A-914D-8008-A16D5583089F}" destId="{2D39C667-17DD-D243-BBEF-E694A5E11B6F}" srcOrd="0" destOrd="0" presId="urn:microsoft.com/office/officeart/2005/8/layout/radial5"/>
     <dgm:cxn modelId="{3CF9BB7A-5A06-2847-8A99-D91FA18D9AFA}" type="presOf" srcId="{5304632D-3534-014E-A773-191A91505663}" destId="{28E9526E-7B0C-9143-A850-585B8E0E2207}" srcOrd="0" destOrd="0" presId="urn:microsoft.com/office/officeart/2005/8/layout/radial5"/>
+    <dgm:cxn modelId="{981409B1-430A-F64D-A631-F9C5F731F273}" type="presOf" srcId="{EBD4001C-B961-5540-8C87-277869C67930}" destId="{443AD5A5-74EA-D84C-A21D-7D9663E3D147}" srcOrd="0" destOrd="0" presId="urn:microsoft.com/office/officeart/2005/8/layout/radial5"/>
+    <dgm:cxn modelId="{88714B9B-4491-1648-BFA5-9908FC612FF9}" type="presOf" srcId="{1A6F2230-7FF1-784D-8943-FAFBB5BD867E}" destId="{EFF2F8AC-1F1B-6D4D-8C29-AE41441F26F7}" srcOrd="0" destOrd="0" presId="urn:microsoft.com/office/officeart/2005/8/layout/radial5"/>
+    <dgm:cxn modelId="{1F426276-401F-6548-A04B-6E549D314F44}" srcId="{EC3D84DF-2E4A-914D-8008-A16D5583089F}" destId="{B7BB0103-7E47-DD47-A685-FB155C9A07EE}" srcOrd="0" destOrd="0" parTransId="{187E3820-FDBD-A14B-8D53-13DEEA190D85}" sibTransId="{07DE391C-36DC-2347-ACDE-6F70ECD1194A}"/>
+    <dgm:cxn modelId="{DA6D3E26-D7CA-AD40-9EAA-FB53CCDC295A}" srcId="{B7BB0103-7E47-DD47-A685-FB155C9A07EE}" destId="{7DA216F7-B61A-644F-9E41-4844BDF2E1EB}" srcOrd="1" destOrd="0" parTransId="{EE98EBD2-B01C-AC47-87D6-306A993857F7}" sibTransId="{40828377-F63C-7147-AD5C-8E259A94515F}"/>
     <dgm:cxn modelId="{D1A37C89-99F7-8646-9954-2A9040E91DE6}" type="presOf" srcId="{B7BB0103-7E47-DD47-A685-FB155C9A07EE}" destId="{5DD8E76F-190F-AE4D-8F4D-4BB2AADB5179}" srcOrd="0" destOrd="0" presId="urn:microsoft.com/office/officeart/2005/8/layout/radial5"/>
     <dgm:cxn modelId="{182F8A36-DF71-514D-A4DB-02C0E52C9E27}" srcId="{B7BB0103-7E47-DD47-A685-FB155C9A07EE}" destId="{80CDC2A9-E114-4E4E-97DA-E5A6E9106C0D}" srcOrd="2" destOrd="0" parTransId="{EBD4001C-B961-5540-8C87-277869C67930}" sibTransId="{23331D01-66FE-2F4E-9D58-79CD274B6161}"/>
-    <dgm:cxn modelId="{1F426276-401F-6548-A04B-6E549D314F44}" srcId="{EC3D84DF-2E4A-914D-8008-A16D5583089F}" destId="{B7BB0103-7E47-DD47-A685-FB155C9A07EE}" srcOrd="0" destOrd="0" parTransId="{187E3820-FDBD-A14B-8D53-13DEEA190D85}" sibTransId="{07DE391C-36DC-2347-ACDE-6F70ECD1194A}"/>
-    <dgm:cxn modelId="{5EF9709A-DAC0-EE4B-8557-4C53B4B56380}" type="presOf" srcId="{7DA216F7-B61A-644F-9E41-4844BDF2E1EB}" destId="{9AF44D55-8614-3B46-93BF-F278C02874B0}" srcOrd="0" destOrd="0" presId="urn:microsoft.com/office/officeart/2005/8/layout/radial5"/>
-    <dgm:cxn modelId="{B42444B2-648E-4449-96AD-FC3B788CF0E4}" type="presOf" srcId="{EE98EBD2-B01C-AC47-87D6-306A993857F7}" destId="{54DC7B13-44EC-FF49-A46D-55A02B76FE87}" srcOrd="0" destOrd="0" presId="urn:microsoft.com/office/officeart/2005/8/layout/radial5"/>
-    <dgm:cxn modelId="{88714B9B-4491-1648-BFA5-9908FC612FF9}" type="presOf" srcId="{1A6F2230-7FF1-784D-8943-FAFBB5BD867E}" destId="{EFF2F8AC-1F1B-6D4D-8C29-AE41441F26F7}" srcOrd="0" destOrd="0" presId="urn:microsoft.com/office/officeart/2005/8/layout/radial5"/>
-    <dgm:cxn modelId="{981409B1-430A-F64D-A631-F9C5F731F273}" type="presOf" srcId="{EBD4001C-B961-5540-8C87-277869C67930}" destId="{443AD5A5-74EA-D84C-A21D-7D9663E3D147}" srcOrd="0" destOrd="0" presId="urn:microsoft.com/office/officeart/2005/8/layout/radial5"/>
+    <dgm:cxn modelId="{06BD377A-1813-9A43-8E47-E01E784BE70D}" type="presOf" srcId="{80CDC2A9-E114-4E4E-97DA-E5A6E9106C0D}" destId="{E6336081-3369-9448-A37D-3542AC02AA41}" srcOrd="0" destOrd="0" presId="urn:microsoft.com/office/officeart/2005/8/layout/radial5"/>
     <dgm:cxn modelId="{41055DA1-11F4-F44D-8A2D-65078C273C86}" srcId="{B7BB0103-7E47-DD47-A685-FB155C9A07EE}" destId="{1A6F2230-7FF1-784D-8943-FAFBB5BD867E}" srcOrd="0" destOrd="0" parTransId="{5304632D-3534-014E-A773-191A91505663}" sibTransId="{18929EFA-1674-8D49-BFC2-4A2E5D4308B5}"/>
     <dgm:cxn modelId="{21A54FB8-9CA2-2343-945D-5B2902E5F5E8}" type="presOf" srcId="{5304632D-3534-014E-A773-191A91505663}" destId="{F6EB97ED-B6B4-4241-B774-3B7059FCFB8A}" srcOrd="1" destOrd="0" presId="urn:microsoft.com/office/officeart/2005/8/layout/radial5"/>
+    <dgm:cxn modelId="{B42444B2-648E-4449-96AD-FC3B788CF0E4}" type="presOf" srcId="{EE98EBD2-B01C-AC47-87D6-306A993857F7}" destId="{54DC7B13-44EC-FF49-A46D-55A02B76FE87}" srcOrd="0" destOrd="0" presId="urn:microsoft.com/office/officeart/2005/8/layout/radial5"/>
     <dgm:cxn modelId="{7ED21C30-811C-3644-A272-51AA029DED4E}" type="presOf" srcId="{EE98EBD2-B01C-AC47-87D6-306A993857F7}" destId="{F9C9631B-0A4E-8840-BB52-87B441B80EB5}" srcOrd="1" destOrd="0" presId="urn:microsoft.com/office/officeart/2005/8/layout/radial5"/>
-    <dgm:cxn modelId="{BD289E23-9AEB-1545-8121-FFED29DF8A76}" type="presOf" srcId="{EBD4001C-B961-5540-8C87-277869C67930}" destId="{D2B7ABDE-DC5D-CC43-A304-27801E8F3934}" srcOrd="1" destOrd="0" presId="urn:microsoft.com/office/officeart/2005/8/layout/radial5"/>
-    <dgm:cxn modelId="{06BD377A-1813-9A43-8E47-E01E784BE70D}" type="presOf" srcId="{80CDC2A9-E114-4E4E-97DA-E5A6E9106C0D}" destId="{E6336081-3369-9448-A37D-3542AC02AA41}" srcOrd="0" destOrd="0" presId="urn:microsoft.com/office/officeart/2005/8/layout/radial5"/>
-    <dgm:cxn modelId="{20D7BF27-E99E-774C-A330-14F0528895CF}" type="presOf" srcId="{EC3D84DF-2E4A-914D-8008-A16D5583089F}" destId="{2D39C667-17DD-D243-BBEF-E694A5E11B6F}" srcOrd="0" destOrd="0" presId="urn:microsoft.com/office/officeart/2005/8/layout/radial5"/>
-    <dgm:cxn modelId="{DA6D3E26-D7CA-AD40-9EAA-FB53CCDC295A}" srcId="{B7BB0103-7E47-DD47-A685-FB155C9A07EE}" destId="{7DA216F7-B61A-644F-9E41-4844BDF2E1EB}" srcOrd="1" destOrd="0" parTransId="{EE98EBD2-B01C-AC47-87D6-306A993857F7}" sibTransId="{40828377-F63C-7147-AD5C-8E259A94515F}"/>
     <dgm:cxn modelId="{D454D5EA-D415-0940-841D-9AF66E1C32C1}" type="presParOf" srcId="{2D39C667-17DD-D243-BBEF-E694A5E11B6F}" destId="{5DD8E76F-190F-AE4D-8F4D-4BB2AADB5179}" srcOrd="0" destOrd="0" presId="urn:microsoft.com/office/officeart/2005/8/layout/radial5"/>
     <dgm:cxn modelId="{758DD4F6-D5C5-1B47-AEAA-8A9B5ED271C1}" type="presParOf" srcId="{2D39C667-17DD-D243-BBEF-E694A5E11B6F}" destId="{28E9526E-7B0C-9143-A850-585B8E0E2207}" srcOrd="1" destOrd="0" presId="urn:microsoft.com/office/officeart/2005/8/layout/radial5"/>
     <dgm:cxn modelId="{0E9F40F2-2A10-F442-B672-458B50589287}" type="presParOf" srcId="{28E9526E-7B0C-9143-A850-585B8E0E2207}" destId="{F6EB97ED-B6B4-4241-B774-3B7059FCFB8A}" srcOrd="0" destOrd="0" presId="urn:microsoft.com/office/officeart/2005/8/layout/radial5"/>
@@ -8111,28 +8111,12 @@
               </a:lnSpc>
             </a:pPr>
             <a:r>
-              <a:rPr lang="fr-FR"/>
-              <a:t>E </a:t>
-            </a:r>
-            <a:r>
               <a:rPr lang="el-GR"/>
-              <a:t>=</a:t>
-            </a:r>
-            <a:r>
-              <a:rPr lang="fr-FR"/>
-              <a:t> </a:t>
-            </a:r>
-            <a:r>
-              <a:rPr lang="el-GR"/>
-              <a:t>{(u,v)∈V</a:t>
-            </a:r>
-            <a:r>
-              <a:rPr lang="el-GR" baseline="30000"/>
-              <a:t>2</a:t>
-            </a:r>
-            <a:r>
-              <a:rPr lang="el-GR"/>
-              <a:t> |d(u,v)≤γ} </a:t>
+              <a:t>γ</a:t>
+            </a:r>
+            <a:r>
+              <a:rPr lang="fr-FR"/>
+              <a:t> rayon d’émission maximum</a:t>
             </a:r>
             <a:endParaRPr lang="fr-FR"/>
           </a:p>
@@ -8143,13 +8127,30 @@
               </a:lnSpc>
             </a:pPr>
             <a:r>
+              <a:rPr lang="fr-FR"/>
+              <a:t>E </a:t>
+            </a:r>
+            <a:r>
               <a:rPr lang="el-GR"/>
-              <a:t>γ</a:t>
-            </a:r>
-            <a:r>
-              <a:rPr lang="fr-FR"/>
-              <a:t> le rayon d’émission maximum</a:t>
-            </a:r>
+              <a:t>=</a:t>
+            </a:r>
+            <a:r>
+              <a:rPr lang="fr-FR"/>
+              <a:t> </a:t>
+            </a:r>
+            <a:r>
+              <a:rPr lang="el-GR"/>
+              <a:t>{(u,v)∈V</a:t>
+            </a:r>
+            <a:r>
+              <a:rPr lang="el-GR" baseline="30000"/>
+              <a:t>2</a:t>
+            </a:r>
+            <a:r>
+              <a:rPr lang="el-GR"/>
+              <a:t> |d(u,v)≤γ} </a:t>
+            </a:r>
+            <a:endParaRPr lang="fr-FR"/>
           </a:p>
           <a:p>
             <a:pPr>
@@ -8236,6 +8237,644 @@
               <a:rPr lang="fr-FR"/>
               <a:t>état de l’art</a:t>
             </a:r>
+          </a:p>
+        </p:txBody>
+      </p:sp>
+      <p:sp>
+        <p:nvSpPr>
+          <p:cNvPr id="7" name="Ellipse 6"/>
+          <p:cNvSpPr/>
+          <p:nvPr/>
+        </p:nvSpPr>
+        <p:spPr>
+          <a:xfrm>
+            <a:off x="6271198" y="3714064"/>
+            <a:ext cx="428293" cy="407558"/>
+          </a:xfrm>
+          <a:prstGeom prst="ellipse">
+            <a:avLst/>
+          </a:prstGeom>
+        </p:spPr>
+        <p:style>
+          <a:lnRef idx="1">
+            <a:schemeClr val="dk1"/>
+          </a:lnRef>
+          <a:fillRef idx="3">
+            <a:schemeClr val="dk1"/>
+          </a:fillRef>
+          <a:effectRef idx="2">
+            <a:schemeClr val="dk1"/>
+          </a:effectRef>
+          <a:fontRef idx="minor">
+            <a:schemeClr val="lt1"/>
+          </a:fontRef>
+        </p:style>
+        <p:txBody>
+          <a:bodyPr rtlCol="0" anchor="ctr">
+            <a:normAutofit fontScale="85000" lnSpcReduction="20000"/>
+          </a:bodyPr>
+          <a:lstStyle/>
+          <a:p>
+            <a:pPr algn="ctr"/>
+            <a:r>
+              <a:rPr lang="fr-FR"/>
+              <a:t>A</a:t>
+            </a:r>
+          </a:p>
+        </p:txBody>
+      </p:sp>
+      <p:sp>
+        <p:nvSpPr>
+          <p:cNvPr id="8" name="Ellipse 7"/>
+          <p:cNvSpPr/>
+          <p:nvPr/>
+        </p:nvSpPr>
+        <p:spPr>
+          <a:xfrm>
+            <a:off x="6734701" y="3211511"/>
+            <a:ext cx="428293" cy="407558"/>
+          </a:xfrm>
+          <a:prstGeom prst="ellipse">
+            <a:avLst/>
+          </a:prstGeom>
+        </p:spPr>
+        <p:style>
+          <a:lnRef idx="1">
+            <a:schemeClr val="dk1"/>
+          </a:lnRef>
+          <a:fillRef idx="3">
+            <a:schemeClr val="dk1"/>
+          </a:fillRef>
+          <a:effectRef idx="2">
+            <a:schemeClr val="dk1"/>
+          </a:effectRef>
+          <a:fontRef idx="minor">
+            <a:schemeClr val="lt1"/>
+          </a:fontRef>
+        </p:style>
+        <p:txBody>
+          <a:bodyPr rtlCol="0" anchor="ctr">
+            <a:normAutofit fontScale="85000" lnSpcReduction="20000"/>
+          </a:bodyPr>
+          <a:lstStyle/>
+          <a:p>
+            <a:pPr algn="ctr"/>
+            <a:r>
+              <a:rPr lang="fr-FR"/>
+              <a:t>B</a:t>
+            </a:r>
+          </a:p>
+        </p:txBody>
+      </p:sp>
+      <p:sp>
+        <p:nvSpPr>
+          <p:cNvPr id="9" name="Ellipse 8"/>
+          <p:cNvSpPr/>
+          <p:nvPr/>
+        </p:nvSpPr>
+        <p:spPr>
+          <a:xfrm>
+            <a:off x="5523813" y="2970586"/>
+            <a:ext cx="428293" cy="407558"/>
+          </a:xfrm>
+          <a:prstGeom prst="ellipse">
+            <a:avLst/>
+          </a:prstGeom>
+        </p:spPr>
+        <p:style>
+          <a:lnRef idx="1">
+            <a:schemeClr val="dk1"/>
+          </a:lnRef>
+          <a:fillRef idx="3">
+            <a:schemeClr val="dk1"/>
+          </a:fillRef>
+          <a:effectRef idx="2">
+            <a:schemeClr val="dk1"/>
+          </a:effectRef>
+          <a:fontRef idx="minor">
+            <a:schemeClr val="lt1"/>
+          </a:fontRef>
+        </p:style>
+        <p:txBody>
+          <a:bodyPr rtlCol="0" anchor="ctr">
+            <a:normAutofit fontScale="85000" lnSpcReduction="20000"/>
+          </a:bodyPr>
+          <a:lstStyle/>
+          <a:p>
+            <a:pPr algn="ctr"/>
+            <a:r>
+              <a:rPr lang="fr-FR"/>
+              <a:t>C</a:t>
+            </a:r>
+          </a:p>
+        </p:txBody>
+      </p:sp>
+      <p:sp>
+        <p:nvSpPr>
+          <p:cNvPr id="10" name="Ellipse 9"/>
+          <p:cNvSpPr/>
+          <p:nvPr/>
+        </p:nvSpPr>
+        <p:spPr>
+          <a:xfrm>
+            <a:off x="5845833" y="5050862"/>
+            <a:ext cx="428293" cy="407558"/>
+          </a:xfrm>
+          <a:prstGeom prst="ellipse">
+            <a:avLst/>
+          </a:prstGeom>
+        </p:spPr>
+        <p:style>
+          <a:lnRef idx="1">
+            <a:schemeClr val="dk1"/>
+          </a:lnRef>
+          <a:fillRef idx="3">
+            <a:schemeClr val="dk1"/>
+          </a:fillRef>
+          <a:effectRef idx="2">
+            <a:schemeClr val="dk1"/>
+          </a:effectRef>
+          <a:fontRef idx="minor">
+            <a:schemeClr val="lt1"/>
+          </a:fontRef>
+        </p:style>
+        <p:txBody>
+          <a:bodyPr rtlCol="0" anchor="ctr">
+            <a:normAutofit fontScale="85000" lnSpcReduction="20000"/>
+          </a:bodyPr>
+          <a:lstStyle/>
+          <a:p>
+            <a:pPr algn="ctr"/>
+            <a:r>
+              <a:rPr lang="fr-FR"/>
+              <a:t>D</a:t>
+            </a:r>
+          </a:p>
+        </p:txBody>
+      </p:sp>
+      <p:sp>
+        <p:nvSpPr>
+          <p:cNvPr id="11" name="Ellipse 10"/>
+          <p:cNvSpPr/>
+          <p:nvPr/>
+        </p:nvSpPr>
+        <p:spPr>
+          <a:xfrm>
+            <a:off x="6586392" y="4479673"/>
+            <a:ext cx="428293" cy="407558"/>
+          </a:xfrm>
+          <a:prstGeom prst="ellipse">
+            <a:avLst/>
+          </a:prstGeom>
+        </p:spPr>
+        <p:style>
+          <a:lnRef idx="1">
+            <a:schemeClr val="dk1"/>
+          </a:lnRef>
+          <a:fillRef idx="3">
+            <a:schemeClr val="dk1"/>
+          </a:fillRef>
+          <a:effectRef idx="2">
+            <a:schemeClr val="dk1"/>
+          </a:effectRef>
+          <a:fontRef idx="minor">
+            <a:schemeClr val="lt1"/>
+          </a:fontRef>
+        </p:style>
+        <p:txBody>
+          <a:bodyPr rtlCol="0" anchor="ctr">
+            <a:normAutofit fontScale="85000" lnSpcReduction="20000"/>
+          </a:bodyPr>
+          <a:lstStyle/>
+          <a:p>
+            <a:pPr algn="ctr"/>
+            <a:r>
+              <a:rPr lang="fr-FR"/>
+              <a:t>E</a:t>
+            </a:r>
+          </a:p>
+        </p:txBody>
+      </p:sp>
+      <p:sp>
+        <p:nvSpPr>
+          <p:cNvPr id="12" name="Ellipse 11"/>
+          <p:cNvSpPr/>
+          <p:nvPr/>
+        </p:nvSpPr>
+        <p:spPr>
+          <a:xfrm>
+            <a:off x="7675898" y="4774353"/>
+            <a:ext cx="428293" cy="407558"/>
+          </a:xfrm>
+          <a:prstGeom prst="ellipse">
+            <a:avLst/>
+          </a:prstGeom>
+        </p:spPr>
+        <p:style>
+          <a:lnRef idx="1">
+            <a:schemeClr val="dk1"/>
+          </a:lnRef>
+          <a:fillRef idx="3">
+            <a:schemeClr val="dk1"/>
+          </a:fillRef>
+          <a:effectRef idx="2">
+            <a:schemeClr val="dk1"/>
+          </a:effectRef>
+          <a:fontRef idx="minor">
+            <a:schemeClr val="lt1"/>
+          </a:fontRef>
+        </p:style>
+        <p:txBody>
+          <a:bodyPr rtlCol="0" anchor="ctr">
+            <a:normAutofit fontScale="85000" lnSpcReduction="20000"/>
+          </a:bodyPr>
+          <a:lstStyle/>
+          <a:p>
+            <a:pPr algn="ctr"/>
+            <a:r>
+              <a:rPr lang="fr-FR"/>
+              <a:t>F</a:t>
+            </a:r>
+          </a:p>
+        </p:txBody>
+      </p:sp>
+      <p:cxnSp>
+        <p:nvCxnSpPr>
+          <p:cNvPr id="13" name="Connecteur droit 12"/>
+          <p:cNvCxnSpPr>
+            <a:stCxn id="9" idx="5"/>
+            <a:endCxn id="7" idx="1"/>
+          </p:cNvCxnSpPr>
+          <p:nvPr/>
+        </p:nvCxnSpPr>
+        <p:spPr>
+          <a:xfrm>
+            <a:off x="5889384" y="3318459"/>
+            <a:ext cx="444536" cy="455290"/>
+          </a:xfrm>
+          <a:prstGeom prst="line">
+            <a:avLst/>
+          </a:prstGeom>
+          <a:ln>
+            <a:solidFill>
+              <a:srgbClr val="800A07"/>
+            </a:solidFill>
+          </a:ln>
+        </p:spPr>
+        <p:style>
+          <a:lnRef idx="2">
+            <a:schemeClr val="accent1"/>
+          </a:lnRef>
+          <a:fillRef idx="0">
+            <a:schemeClr val="accent1"/>
+          </a:fillRef>
+          <a:effectRef idx="1">
+            <a:schemeClr val="accent1"/>
+          </a:effectRef>
+          <a:fontRef idx="minor">
+            <a:schemeClr val="tx1"/>
+          </a:fontRef>
+        </p:style>
+      </p:cxnSp>
+      <p:cxnSp>
+        <p:nvCxnSpPr>
+          <p:cNvPr id="14" name="Connecteur droit 13"/>
+          <p:cNvCxnSpPr>
+            <a:stCxn id="7" idx="7"/>
+            <a:endCxn id="8" idx="3"/>
+          </p:cNvCxnSpPr>
+          <p:nvPr/>
+        </p:nvCxnSpPr>
+        <p:spPr>
+          <a:xfrm flipV="1">
+            <a:off x="6636769" y="3559384"/>
+            <a:ext cx="160654" cy="214365"/>
+          </a:xfrm>
+          <a:prstGeom prst="line">
+            <a:avLst/>
+          </a:prstGeom>
+        </p:spPr>
+        <p:style>
+          <a:lnRef idx="2">
+            <a:schemeClr val="accent1"/>
+          </a:lnRef>
+          <a:fillRef idx="0">
+            <a:schemeClr val="accent1"/>
+          </a:fillRef>
+          <a:effectRef idx="1">
+            <a:schemeClr val="accent1"/>
+          </a:effectRef>
+          <a:fontRef idx="minor">
+            <a:schemeClr val="tx1"/>
+          </a:fontRef>
+        </p:style>
+      </p:cxnSp>
+      <p:cxnSp>
+        <p:nvCxnSpPr>
+          <p:cNvPr id="15" name="Connecteur droit 14"/>
+          <p:cNvCxnSpPr>
+            <a:stCxn id="7" idx="5"/>
+            <a:endCxn id="11" idx="0"/>
+          </p:cNvCxnSpPr>
+          <p:nvPr/>
+        </p:nvCxnSpPr>
+        <p:spPr>
+          <a:xfrm>
+            <a:off x="6636769" y="4061937"/>
+            <a:ext cx="163770" cy="417736"/>
+          </a:xfrm>
+          <a:prstGeom prst="line">
+            <a:avLst/>
+          </a:prstGeom>
+        </p:spPr>
+        <p:style>
+          <a:lnRef idx="2">
+            <a:schemeClr val="accent1"/>
+          </a:lnRef>
+          <a:fillRef idx="0">
+            <a:schemeClr val="accent1"/>
+          </a:fillRef>
+          <a:effectRef idx="1">
+            <a:schemeClr val="accent1"/>
+          </a:effectRef>
+          <a:fontRef idx="minor">
+            <a:schemeClr val="tx1"/>
+          </a:fontRef>
+        </p:style>
+      </p:cxnSp>
+      <p:cxnSp>
+        <p:nvCxnSpPr>
+          <p:cNvPr id="16" name="Connecteur droit 15"/>
+          <p:cNvCxnSpPr>
+            <a:stCxn id="7" idx="3"/>
+            <a:endCxn id="10" idx="0"/>
+          </p:cNvCxnSpPr>
+          <p:nvPr/>
+        </p:nvCxnSpPr>
+        <p:spPr>
+          <a:xfrm flipH="1">
+            <a:off x="6059980" y="4061937"/>
+            <a:ext cx="273940" cy="988925"/>
+          </a:xfrm>
+          <a:prstGeom prst="line">
+            <a:avLst/>
+          </a:prstGeom>
+        </p:spPr>
+        <p:style>
+          <a:lnRef idx="2">
+            <a:schemeClr val="accent1"/>
+          </a:lnRef>
+          <a:fillRef idx="0">
+            <a:schemeClr val="accent1"/>
+          </a:fillRef>
+          <a:effectRef idx="1">
+            <a:schemeClr val="accent1"/>
+          </a:effectRef>
+          <a:fontRef idx="minor">
+            <a:schemeClr val="tx1"/>
+          </a:fontRef>
+        </p:style>
+      </p:cxnSp>
+      <p:cxnSp>
+        <p:nvCxnSpPr>
+          <p:cNvPr id="17" name="Connecteur droit 16"/>
+          <p:cNvCxnSpPr>
+            <a:stCxn id="10" idx="7"/>
+            <a:endCxn id="11" idx="3"/>
+          </p:cNvCxnSpPr>
+          <p:nvPr/>
+        </p:nvCxnSpPr>
+        <p:spPr>
+          <a:xfrm flipV="1">
+            <a:off x="6211404" y="4827546"/>
+            <a:ext cx="437710" cy="283001"/>
+          </a:xfrm>
+          <a:prstGeom prst="line">
+            <a:avLst/>
+          </a:prstGeom>
+        </p:spPr>
+        <p:style>
+          <a:lnRef idx="2">
+            <a:schemeClr val="accent1"/>
+          </a:lnRef>
+          <a:fillRef idx="0">
+            <a:schemeClr val="accent1"/>
+          </a:fillRef>
+          <a:effectRef idx="1">
+            <a:schemeClr val="accent1"/>
+          </a:effectRef>
+          <a:fontRef idx="minor">
+            <a:schemeClr val="tx1"/>
+          </a:fontRef>
+        </p:style>
+      </p:cxnSp>
+      <p:cxnSp>
+        <p:nvCxnSpPr>
+          <p:cNvPr id="18" name="Connecteur droit 17"/>
+          <p:cNvCxnSpPr>
+            <a:stCxn id="11" idx="6"/>
+            <a:endCxn id="12" idx="2"/>
+          </p:cNvCxnSpPr>
+          <p:nvPr/>
+        </p:nvCxnSpPr>
+        <p:spPr>
+          <a:xfrm>
+            <a:off x="7014685" y="4683452"/>
+            <a:ext cx="661213" cy="294680"/>
+          </a:xfrm>
+          <a:prstGeom prst="line">
+            <a:avLst/>
+          </a:prstGeom>
+        </p:spPr>
+        <p:style>
+          <a:lnRef idx="2">
+            <a:schemeClr val="accent1"/>
+          </a:lnRef>
+          <a:fillRef idx="0">
+            <a:schemeClr val="accent1"/>
+          </a:fillRef>
+          <a:effectRef idx="1">
+            <a:schemeClr val="accent1"/>
+          </a:effectRef>
+          <a:fontRef idx="minor">
+            <a:schemeClr val="tx1"/>
+          </a:fontRef>
+        </p:style>
+      </p:cxnSp>
+      <p:cxnSp>
+        <p:nvCxnSpPr>
+          <p:cNvPr id="19" name="Connecteur droit 18"/>
+          <p:cNvCxnSpPr>
+            <a:stCxn id="8" idx="2"/>
+            <a:endCxn id="9" idx="6"/>
+          </p:cNvCxnSpPr>
+          <p:nvPr/>
+        </p:nvCxnSpPr>
+        <p:spPr>
+          <a:xfrm flipH="1" flipV="1">
+            <a:off x="5952106" y="3174365"/>
+            <a:ext cx="782595" cy="240925"/>
+          </a:xfrm>
+          <a:prstGeom prst="line">
+            <a:avLst/>
+          </a:prstGeom>
+        </p:spPr>
+        <p:style>
+          <a:lnRef idx="2">
+            <a:schemeClr val="accent1"/>
+          </a:lnRef>
+          <a:fillRef idx="0">
+            <a:schemeClr val="accent1"/>
+          </a:fillRef>
+          <a:effectRef idx="1">
+            <a:schemeClr val="accent1"/>
+          </a:effectRef>
+          <a:fontRef idx="minor">
+            <a:schemeClr val="tx1"/>
+          </a:fontRef>
+        </p:style>
+      </p:cxnSp>
+      <p:sp>
+        <p:nvSpPr>
+          <p:cNvPr id="20" name="Ellipse 19"/>
+          <p:cNvSpPr/>
+          <p:nvPr/>
+        </p:nvSpPr>
+        <p:spPr>
+          <a:xfrm>
+            <a:off x="8367226" y="5458420"/>
+            <a:ext cx="428293" cy="407558"/>
+          </a:xfrm>
+          <a:prstGeom prst="ellipse">
+            <a:avLst/>
+          </a:prstGeom>
+        </p:spPr>
+        <p:style>
+          <a:lnRef idx="1">
+            <a:schemeClr val="dk1"/>
+          </a:lnRef>
+          <a:fillRef idx="3">
+            <a:schemeClr val="dk1"/>
+          </a:fillRef>
+          <a:effectRef idx="2">
+            <a:schemeClr val="dk1"/>
+          </a:effectRef>
+          <a:fontRef idx="minor">
+            <a:schemeClr val="lt1"/>
+          </a:fontRef>
+        </p:style>
+        <p:txBody>
+          <a:bodyPr rtlCol="0" anchor="ctr">
+            <a:normAutofit fontScale="85000" lnSpcReduction="20000"/>
+          </a:bodyPr>
+          <a:lstStyle/>
+          <a:p>
+            <a:pPr algn="ctr"/>
+            <a:r>
+              <a:rPr lang="fr-FR"/>
+              <a:t>G</a:t>
+            </a:r>
+          </a:p>
+        </p:txBody>
+      </p:sp>
+      <p:cxnSp>
+        <p:nvCxnSpPr>
+          <p:cNvPr id="21" name="Connecteur droit 20"/>
+          <p:cNvCxnSpPr>
+            <a:stCxn id="12" idx="5"/>
+            <a:endCxn id="20" idx="1"/>
+          </p:cNvCxnSpPr>
+          <p:nvPr/>
+        </p:nvCxnSpPr>
+        <p:spPr>
+          <a:xfrm>
+            <a:off x="8041469" y="5122226"/>
+            <a:ext cx="388479" cy="395879"/>
+          </a:xfrm>
+          <a:prstGeom prst="line">
+            <a:avLst/>
+          </a:prstGeom>
+        </p:spPr>
+        <p:style>
+          <a:lnRef idx="2">
+            <a:schemeClr val="accent1"/>
+          </a:lnRef>
+          <a:fillRef idx="0">
+            <a:schemeClr val="accent1"/>
+          </a:fillRef>
+          <a:effectRef idx="1">
+            <a:schemeClr val="accent1"/>
+          </a:effectRef>
+          <a:fontRef idx="minor">
+            <a:schemeClr val="tx1"/>
+          </a:fontRef>
+        </p:style>
+      </p:cxnSp>
+      <p:sp>
+        <p:nvSpPr>
+          <p:cNvPr id="22" name="Ellipse 21"/>
+          <p:cNvSpPr/>
+          <p:nvPr/>
+        </p:nvSpPr>
+        <p:spPr>
+          <a:xfrm>
+            <a:off x="5004048" y="2492896"/>
+            <a:ext cx="2880321" cy="2880321"/>
+          </a:xfrm>
+          <a:prstGeom prst="ellipse">
+            <a:avLst/>
+          </a:prstGeom>
+          <a:gradFill flip="none" rotWithShape="1">
+            <a:gsLst>
+              <a:gs pos="0">
+                <a:schemeClr val="accent5">
+                  <a:tint val="50000"/>
+                  <a:satMod val="300000"/>
+                  <a:alpha val="0"/>
+                </a:schemeClr>
+              </a:gs>
+              <a:gs pos="35000">
+                <a:schemeClr val="accent5">
+                  <a:tint val="37000"/>
+                  <a:satMod val="300000"/>
+                  <a:alpha val="0"/>
+                </a:schemeClr>
+              </a:gs>
+              <a:gs pos="100000">
+                <a:schemeClr val="accent5">
+                  <a:tint val="15000"/>
+                  <a:satMod val="350000"/>
+                  <a:alpha val="0"/>
+                </a:schemeClr>
+              </a:gs>
+            </a:gsLst>
+            <a:lin ang="16200000" scaled="1"/>
+            <a:tileRect/>
+          </a:gradFill>
+          <a:ln>
+            <a:prstDash val="dash"/>
+          </a:ln>
+        </p:spPr>
+        <p:style>
+          <a:lnRef idx="1">
+            <a:schemeClr val="accent5"/>
+          </a:lnRef>
+          <a:fillRef idx="2">
+            <a:schemeClr val="accent5"/>
+          </a:fillRef>
+          <a:effectRef idx="1">
+            <a:schemeClr val="accent5"/>
+          </a:effectRef>
+          <a:fontRef idx="minor">
+            <a:schemeClr val="dk1"/>
+          </a:fontRef>
+        </p:style>
+        <p:txBody>
+          <a:bodyPr rtlCol="0" anchor="ctr"/>
+          <a:lstStyle/>
+          <a:p>
+            <a:pPr algn="ctr"/>
+            <a:endParaRPr lang="fr-FR"/>
           </a:p>
         </p:txBody>
       </p:sp>
@@ -8260,9 +8899,821 @@
   <p:timing>
     <p:tnLst>
       <p:par>
-        <p:cTn xmlns:p14="http://schemas.microsoft.com/office/powerpoint/2010/main" id="1" dur="indefinite" restart="never" nodeType="tmRoot"/>
+        <p:cTn xmlns:p14="http://schemas.microsoft.com/office/powerpoint/2010/main" id="1" dur="indefinite" restart="never" nodeType="tmRoot">
+          <p:childTnLst>
+            <p:seq concurrent="1" nextAc="seek">
+              <p:cTn id="2" dur="indefinite" nodeType="mainSeq">
+                <p:childTnLst>
+                  <p:par>
+                    <p:cTn id="3" fill="hold">
+                      <p:stCondLst>
+                        <p:cond delay="indefinite"/>
+                        <p:cond evt="onBegin" delay="0">
+                          <p:tn val="2"/>
+                        </p:cond>
+                      </p:stCondLst>
+                      <p:childTnLst>
+                        <p:par>
+                          <p:cTn id="4" fill="hold">
+                            <p:stCondLst>
+                              <p:cond delay="0"/>
+                            </p:stCondLst>
+                            <p:childTnLst>
+                              <p:par>
+                                <p:cTn id="5" presetID="1" presetClass="entr" presetSubtype="0" fill="hold" grpId="0" nodeType="withEffect">
+                                  <p:stCondLst>
+                                    <p:cond delay="0"/>
+                                  </p:stCondLst>
+                                  <p:childTnLst>
+                                    <p:set>
+                                      <p:cBhvr>
+                                        <p:cTn id="6" dur="1" fill="hold">
+                                          <p:stCondLst>
+                                            <p:cond delay="0"/>
+                                          </p:stCondLst>
+                                        </p:cTn>
+                                        <p:tgtEl>
+                                          <p:spTgt spid="3">
+                                            <p:txEl>
+                                              <p:pRg st="0" end="0"/>
+                                            </p:txEl>
+                                          </p:spTgt>
+                                        </p:tgtEl>
+                                        <p:attrNameLst>
+                                          <p:attrName>style.visibility</p:attrName>
+                                        </p:attrNameLst>
+                                      </p:cBhvr>
+                                      <p:to>
+                                        <p:strVal val="visible"/>
+                                      </p:to>
+                                    </p:set>
+                                  </p:childTnLst>
+                                </p:cTn>
+                              </p:par>
+                            </p:childTnLst>
+                          </p:cTn>
+                        </p:par>
+                      </p:childTnLst>
+                    </p:cTn>
+                  </p:par>
+                  <p:par>
+                    <p:cTn id="7" fill="hold">
+                      <p:stCondLst>
+                        <p:cond delay="indefinite"/>
+                      </p:stCondLst>
+                      <p:childTnLst>
+                        <p:par>
+                          <p:cTn id="8" fill="hold">
+                            <p:stCondLst>
+                              <p:cond delay="0"/>
+                            </p:stCondLst>
+                            <p:childTnLst>
+                              <p:par>
+                                <p:cTn id="9" presetID="1" presetClass="entr" presetSubtype="0" fill="hold" grpId="0" nodeType="clickEffect">
+                                  <p:stCondLst>
+                                    <p:cond delay="0"/>
+                                  </p:stCondLst>
+                                  <p:childTnLst>
+                                    <p:set>
+                                      <p:cBhvr>
+                                        <p:cTn id="10" dur="1" fill="hold">
+                                          <p:stCondLst>
+                                            <p:cond delay="0"/>
+                                          </p:stCondLst>
+                                        </p:cTn>
+                                        <p:tgtEl>
+                                          <p:spTgt spid="3">
+                                            <p:txEl>
+                                              <p:pRg st="1" end="1"/>
+                                            </p:txEl>
+                                          </p:spTgt>
+                                        </p:tgtEl>
+                                        <p:attrNameLst>
+                                          <p:attrName>style.visibility</p:attrName>
+                                        </p:attrNameLst>
+                                      </p:cBhvr>
+                                      <p:to>
+                                        <p:strVal val="visible"/>
+                                      </p:to>
+                                    </p:set>
+                                  </p:childTnLst>
+                                </p:cTn>
+                              </p:par>
+                              <p:par>
+                                <p:cTn id="11" presetID="1" presetClass="entr" presetSubtype="0" fill="hold" grpId="0" nodeType="withEffect">
+                                  <p:stCondLst>
+                                    <p:cond delay="0"/>
+                                  </p:stCondLst>
+                                  <p:childTnLst>
+                                    <p:set>
+                                      <p:cBhvr>
+                                        <p:cTn id="12" dur="1" fill="hold">
+                                          <p:stCondLst>
+                                            <p:cond delay="0"/>
+                                          </p:stCondLst>
+                                        </p:cTn>
+                                        <p:tgtEl>
+                                          <p:spTgt spid="7"/>
+                                        </p:tgtEl>
+                                        <p:attrNameLst>
+                                          <p:attrName>style.visibility</p:attrName>
+                                        </p:attrNameLst>
+                                      </p:cBhvr>
+                                      <p:to>
+                                        <p:strVal val="visible"/>
+                                      </p:to>
+                                    </p:set>
+                                  </p:childTnLst>
+                                </p:cTn>
+                              </p:par>
+                              <p:par>
+                                <p:cTn id="13" presetID="1" presetClass="entr" presetSubtype="0" fill="hold" grpId="0" nodeType="withEffect">
+                                  <p:stCondLst>
+                                    <p:cond delay="0"/>
+                                  </p:stCondLst>
+                                  <p:childTnLst>
+                                    <p:set>
+                                      <p:cBhvr>
+                                        <p:cTn id="14" dur="1" fill="hold">
+                                          <p:stCondLst>
+                                            <p:cond delay="0"/>
+                                          </p:stCondLst>
+                                        </p:cTn>
+                                        <p:tgtEl>
+                                          <p:spTgt spid="9"/>
+                                        </p:tgtEl>
+                                        <p:attrNameLst>
+                                          <p:attrName>style.visibility</p:attrName>
+                                        </p:attrNameLst>
+                                      </p:cBhvr>
+                                      <p:to>
+                                        <p:strVal val="visible"/>
+                                      </p:to>
+                                    </p:set>
+                                  </p:childTnLst>
+                                </p:cTn>
+                              </p:par>
+                              <p:par>
+                                <p:cTn id="15" presetID="1" presetClass="entr" presetSubtype="0" fill="hold" grpId="0" nodeType="withEffect">
+                                  <p:stCondLst>
+                                    <p:cond delay="0"/>
+                                  </p:stCondLst>
+                                  <p:childTnLst>
+                                    <p:set>
+                                      <p:cBhvr>
+                                        <p:cTn id="16" dur="1" fill="hold">
+                                          <p:stCondLst>
+                                            <p:cond delay="0"/>
+                                          </p:stCondLst>
+                                        </p:cTn>
+                                        <p:tgtEl>
+                                          <p:spTgt spid="8"/>
+                                        </p:tgtEl>
+                                        <p:attrNameLst>
+                                          <p:attrName>style.visibility</p:attrName>
+                                        </p:attrNameLst>
+                                      </p:cBhvr>
+                                      <p:to>
+                                        <p:strVal val="visible"/>
+                                      </p:to>
+                                    </p:set>
+                                  </p:childTnLst>
+                                </p:cTn>
+                              </p:par>
+                              <p:par>
+                                <p:cTn id="17" presetID="1" presetClass="entr" presetSubtype="0" fill="hold" grpId="0" nodeType="withEffect">
+                                  <p:stCondLst>
+                                    <p:cond delay="0"/>
+                                  </p:stCondLst>
+                                  <p:childTnLst>
+                                    <p:set>
+                                      <p:cBhvr>
+                                        <p:cTn id="18" dur="1" fill="hold">
+                                          <p:stCondLst>
+                                            <p:cond delay="0"/>
+                                          </p:stCondLst>
+                                        </p:cTn>
+                                        <p:tgtEl>
+                                          <p:spTgt spid="10"/>
+                                        </p:tgtEl>
+                                        <p:attrNameLst>
+                                          <p:attrName>style.visibility</p:attrName>
+                                        </p:attrNameLst>
+                                      </p:cBhvr>
+                                      <p:to>
+                                        <p:strVal val="visible"/>
+                                      </p:to>
+                                    </p:set>
+                                  </p:childTnLst>
+                                </p:cTn>
+                              </p:par>
+                              <p:par>
+                                <p:cTn id="19" presetID="1" presetClass="entr" presetSubtype="0" fill="hold" grpId="0" nodeType="withEffect">
+                                  <p:stCondLst>
+                                    <p:cond delay="0"/>
+                                  </p:stCondLst>
+                                  <p:childTnLst>
+                                    <p:set>
+                                      <p:cBhvr>
+                                        <p:cTn id="20" dur="1" fill="hold">
+                                          <p:stCondLst>
+                                            <p:cond delay="0"/>
+                                          </p:stCondLst>
+                                        </p:cTn>
+                                        <p:tgtEl>
+                                          <p:spTgt spid="11"/>
+                                        </p:tgtEl>
+                                        <p:attrNameLst>
+                                          <p:attrName>style.visibility</p:attrName>
+                                        </p:attrNameLst>
+                                      </p:cBhvr>
+                                      <p:to>
+                                        <p:strVal val="visible"/>
+                                      </p:to>
+                                    </p:set>
+                                  </p:childTnLst>
+                                </p:cTn>
+                              </p:par>
+                              <p:par>
+                                <p:cTn id="21" presetID="1" presetClass="entr" presetSubtype="0" fill="hold" grpId="0" nodeType="withEffect">
+                                  <p:stCondLst>
+                                    <p:cond delay="0"/>
+                                  </p:stCondLst>
+                                  <p:childTnLst>
+                                    <p:set>
+                                      <p:cBhvr>
+                                        <p:cTn id="22" dur="1" fill="hold">
+                                          <p:stCondLst>
+                                            <p:cond delay="0"/>
+                                          </p:stCondLst>
+                                        </p:cTn>
+                                        <p:tgtEl>
+                                          <p:spTgt spid="12"/>
+                                        </p:tgtEl>
+                                        <p:attrNameLst>
+                                          <p:attrName>style.visibility</p:attrName>
+                                        </p:attrNameLst>
+                                      </p:cBhvr>
+                                      <p:to>
+                                        <p:strVal val="visible"/>
+                                      </p:to>
+                                    </p:set>
+                                  </p:childTnLst>
+                                </p:cTn>
+                              </p:par>
+                              <p:par>
+                                <p:cTn id="23" presetID="1" presetClass="entr" presetSubtype="0" fill="hold" grpId="0" nodeType="withEffect">
+                                  <p:stCondLst>
+                                    <p:cond delay="0"/>
+                                  </p:stCondLst>
+                                  <p:childTnLst>
+                                    <p:set>
+                                      <p:cBhvr>
+                                        <p:cTn id="24" dur="1" fill="hold">
+                                          <p:stCondLst>
+                                            <p:cond delay="0"/>
+                                          </p:stCondLst>
+                                        </p:cTn>
+                                        <p:tgtEl>
+                                          <p:spTgt spid="20"/>
+                                        </p:tgtEl>
+                                        <p:attrNameLst>
+                                          <p:attrName>style.visibility</p:attrName>
+                                        </p:attrNameLst>
+                                      </p:cBhvr>
+                                      <p:to>
+                                        <p:strVal val="visible"/>
+                                      </p:to>
+                                    </p:set>
+                                  </p:childTnLst>
+                                </p:cTn>
+                              </p:par>
+                            </p:childTnLst>
+                          </p:cTn>
+                        </p:par>
+                      </p:childTnLst>
+                    </p:cTn>
+                  </p:par>
+                  <p:par>
+                    <p:cTn id="25" fill="hold">
+                      <p:stCondLst>
+                        <p:cond delay="indefinite"/>
+                      </p:stCondLst>
+                      <p:childTnLst>
+                        <p:par>
+                          <p:cTn id="26" fill="hold">
+                            <p:stCondLst>
+                              <p:cond delay="0"/>
+                            </p:stCondLst>
+                            <p:childTnLst>
+                              <p:par>
+                                <p:cTn id="27" presetID="1" presetClass="entr" presetSubtype="0" fill="hold" grpId="0" nodeType="clickEffect">
+                                  <p:stCondLst>
+                                    <p:cond delay="0"/>
+                                  </p:stCondLst>
+                                  <p:childTnLst>
+                                    <p:set>
+                                      <p:cBhvr>
+                                        <p:cTn id="28" dur="1" fill="hold">
+                                          <p:stCondLst>
+                                            <p:cond delay="0"/>
+                                          </p:stCondLst>
+                                        </p:cTn>
+                                        <p:tgtEl>
+                                          <p:spTgt spid="3">
+                                            <p:txEl>
+                                              <p:pRg st="2" end="2"/>
+                                            </p:txEl>
+                                          </p:spTgt>
+                                        </p:tgtEl>
+                                        <p:attrNameLst>
+                                          <p:attrName>style.visibility</p:attrName>
+                                        </p:attrNameLst>
+                                      </p:cBhvr>
+                                      <p:to>
+                                        <p:strVal val="visible"/>
+                                      </p:to>
+                                    </p:set>
+                                  </p:childTnLst>
+                                </p:cTn>
+                              </p:par>
+                              <p:par>
+                                <p:cTn id="29" presetID="1" presetClass="entr" presetSubtype="0" fill="hold" grpId="0" nodeType="withEffect">
+                                  <p:stCondLst>
+                                    <p:cond delay="0"/>
+                                  </p:stCondLst>
+                                  <p:childTnLst>
+                                    <p:set>
+                                      <p:cBhvr>
+                                        <p:cTn id="30" dur="1" fill="hold">
+                                          <p:stCondLst>
+                                            <p:cond delay="0"/>
+                                          </p:stCondLst>
+                                        </p:cTn>
+                                        <p:tgtEl>
+                                          <p:spTgt spid="22"/>
+                                        </p:tgtEl>
+                                        <p:attrNameLst>
+                                          <p:attrName>style.visibility</p:attrName>
+                                        </p:attrNameLst>
+                                      </p:cBhvr>
+                                      <p:to>
+                                        <p:strVal val="visible"/>
+                                      </p:to>
+                                    </p:set>
+                                  </p:childTnLst>
+                                </p:cTn>
+                              </p:par>
+                            </p:childTnLst>
+                          </p:cTn>
+                        </p:par>
+                      </p:childTnLst>
+                    </p:cTn>
+                  </p:par>
+                  <p:par>
+                    <p:cTn id="31" fill="hold">
+                      <p:stCondLst>
+                        <p:cond delay="indefinite"/>
+                      </p:stCondLst>
+                      <p:childTnLst>
+                        <p:par>
+                          <p:cTn id="32" fill="hold">
+                            <p:stCondLst>
+                              <p:cond delay="0"/>
+                            </p:stCondLst>
+                            <p:childTnLst>
+                              <p:par>
+                                <p:cTn id="33" presetID="1" presetClass="entr" presetSubtype="0" fill="hold" grpId="0" nodeType="clickEffect">
+                                  <p:stCondLst>
+                                    <p:cond delay="0"/>
+                                  </p:stCondLst>
+                                  <p:childTnLst>
+                                    <p:set>
+                                      <p:cBhvr>
+                                        <p:cTn id="34" dur="1" fill="hold">
+                                          <p:stCondLst>
+                                            <p:cond delay="0"/>
+                                          </p:stCondLst>
+                                        </p:cTn>
+                                        <p:tgtEl>
+                                          <p:spTgt spid="3">
+                                            <p:txEl>
+                                              <p:pRg st="3" end="3"/>
+                                            </p:txEl>
+                                          </p:spTgt>
+                                        </p:tgtEl>
+                                        <p:attrNameLst>
+                                          <p:attrName>style.visibility</p:attrName>
+                                        </p:attrNameLst>
+                                      </p:cBhvr>
+                                      <p:to>
+                                        <p:strVal val="visible"/>
+                                      </p:to>
+                                    </p:set>
+                                  </p:childTnLst>
+                                </p:cTn>
+                              </p:par>
+                              <p:par>
+                                <p:cTn id="35" presetID="1" presetClass="entr" presetSubtype="0" fill="hold" nodeType="withEffect">
+                                  <p:stCondLst>
+                                    <p:cond delay="0"/>
+                                  </p:stCondLst>
+                                  <p:childTnLst>
+                                    <p:set>
+                                      <p:cBhvr>
+                                        <p:cTn id="36" dur="1" fill="hold">
+                                          <p:stCondLst>
+                                            <p:cond delay="0"/>
+                                          </p:stCondLst>
+                                        </p:cTn>
+                                        <p:tgtEl>
+                                          <p:spTgt spid="13"/>
+                                        </p:tgtEl>
+                                        <p:attrNameLst>
+                                          <p:attrName>style.visibility</p:attrName>
+                                        </p:attrNameLst>
+                                      </p:cBhvr>
+                                      <p:to>
+                                        <p:strVal val="visible"/>
+                                      </p:to>
+                                    </p:set>
+                                  </p:childTnLst>
+                                </p:cTn>
+                              </p:par>
+                              <p:par>
+                                <p:cTn id="37" presetID="1" presetClass="entr" presetSubtype="0" fill="hold" nodeType="withEffect">
+                                  <p:stCondLst>
+                                    <p:cond delay="0"/>
+                                  </p:stCondLst>
+                                  <p:childTnLst>
+                                    <p:set>
+                                      <p:cBhvr>
+                                        <p:cTn id="38" dur="1" fill="hold">
+                                          <p:stCondLst>
+                                            <p:cond delay="0"/>
+                                          </p:stCondLst>
+                                        </p:cTn>
+                                        <p:tgtEl>
+                                          <p:spTgt spid="19"/>
+                                        </p:tgtEl>
+                                        <p:attrNameLst>
+                                          <p:attrName>style.visibility</p:attrName>
+                                        </p:attrNameLst>
+                                      </p:cBhvr>
+                                      <p:to>
+                                        <p:strVal val="visible"/>
+                                      </p:to>
+                                    </p:set>
+                                  </p:childTnLst>
+                                </p:cTn>
+                              </p:par>
+                              <p:par>
+                                <p:cTn id="39" presetID="1" presetClass="entr" presetSubtype="0" fill="hold" nodeType="withEffect">
+                                  <p:stCondLst>
+                                    <p:cond delay="0"/>
+                                  </p:stCondLst>
+                                  <p:childTnLst>
+                                    <p:set>
+                                      <p:cBhvr>
+                                        <p:cTn id="40" dur="1" fill="hold">
+                                          <p:stCondLst>
+                                            <p:cond delay="0"/>
+                                          </p:stCondLst>
+                                        </p:cTn>
+                                        <p:tgtEl>
+                                          <p:spTgt spid="14"/>
+                                        </p:tgtEl>
+                                        <p:attrNameLst>
+                                          <p:attrName>style.visibility</p:attrName>
+                                        </p:attrNameLst>
+                                      </p:cBhvr>
+                                      <p:to>
+                                        <p:strVal val="visible"/>
+                                      </p:to>
+                                    </p:set>
+                                  </p:childTnLst>
+                                </p:cTn>
+                              </p:par>
+                              <p:par>
+                                <p:cTn id="41" presetID="1" presetClass="entr" presetSubtype="0" fill="hold" nodeType="withEffect">
+                                  <p:stCondLst>
+                                    <p:cond delay="0"/>
+                                  </p:stCondLst>
+                                  <p:childTnLst>
+                                    <p:set>
+                                      <p:cBhvr>
+                                        <p:cTn id="42" dur="1" fill="hold">
+                                          <p:stCondLst>
+                                            <p:cond delay="0"/>
+                                          </p:stCondLst>
+                                        </p:cTn>
+                                        <p:tgtEl>
+                                          <p:spTgt spid="16"/>
+                                        </p:tgtEl>
+                                        <p:attrNameLst>
+                                          <p:attrName>style.visibility</p:attrName>
+                                        </p:attrNameLst>
+                                      </p:cBhvr>
+                                      <p:to>
+                                        <p:strVal val="visible"/>
+                                      </p:to>
+                                    </p:set>
+                                  </p:childTnLst>
+                                </p:cTn>
+                              </p:par>
+                              <p:par>
+                                <p:cTn id="43" presetID="1" presetClass="entr" presetSubtype="0" fill="hold" nodeType="withEffect">
+                                  <p:stCondLst>
+                                    <p:cond delay="0"/>
+                                  </p:stCondLst>
+                                  <p:childTnLst>
+                                    <p:set>
+                                      <p:cBhvr>
+                                        <p:cTn id="44" dur="1" fill="hold">
+                                          <p:stCondLst>
+                                            <p:cond delay="0"/>
+                                          </p:stCondLst>
+                                        </p:cTn>
+                                        <p:tgtEl>
+                                          <p:spTgt spid="15"/>
+                                        </p:tgtEl>
+                                        <p:attrNameLst>
+                                          <p:attrName>style.visibility</p:attrName>
+                                        </p:attrNameLst>
+                                      </p:cBhvr>
+                                      <p:to>
+                                        <p:strVal val="visible"/>
+                                      </p:to>
+                                    </p:set>
+                                  </p:childTnLst>
+                                </p:cTn>
+                              </p:par>
+                              <p:par>
+                                <p:cTn id="45" presetID="1" presetClass="entr" presetSubtype="0" fill="hold" nodeType="withEffect">
+                                  <p:stCondLst>
+                                    <p:cond delay="0"/>
+                                  </p:stCondLst>
+                                  <p:childTnLst>
+                                    <p:set>
+                                      <p:cBhvr>
+                                        <p:cTn id="46" dur="1" fill="hold">
+                                          <p:stCondLst>
+                                            <p:cond delay="0"/>
+                                          </p:stCondLst>
+                                        </p:cTn>
+                                        <p:tgtEl>
+                                          <p:spTgt spid="17"/>
+                                        </p:tgtEl>
+                                        <p:attrNameLst>
+                                          <p:attrName>style.visibility</p:attrName>
+                                        </p:attrNameLst>
+                                      </p:cBhvr>
+                                      <p:to>
+                                        <p:strVal val="visible"/>
+                                      </p:to>
+                                    </p:set>
+                                  </p:childTnLst>
+                                </p:cTn>
+                              </p:par>
+                              <p:par>
+                                <p:cTn id="47" presetID="1" presetClass="entr" presetSubtype="0" fill="hold" nodeType="withEffect">
+                                  <p:stCondLst>
+                                    <p:cond delay="0"/>
+                                  </p:stCondLst>
+                                  <p:childTnLst>
+                                    <p:set>
+                                      <p:cBhvr>
+                                        <p:cTn id="48" dur="1" fill="hold">
+                                          <p:stCondLst>
+                                            <p:cond delay="0"/>
+                                          </p:stCondLst>
+                                        </p:cTn>
+                                        <p:tgtEl>
+                                          <p:spTgt spid="18"/>
+                                        </p:tgtEl>
+                                        <p:attrNameLst>
+                                          <p:attrName>style.visibility</p:attrName>
+                                        </p:attrNameLst>
+                                      </p:cBhvr>
+                                      <p:to>
+                                        <p:strVal val="visible"/>
+                                      </p:to>
+                                    </p:set>
+                                  </p:childTnLst>
+                                </p:cTn>
+                              </p:par>
+                              <p:par>
+                                <p:cTn id="49" presetID="1" presetClass="entr" presetSubtype="0" fill="hold" nodeType="withEffect">
+                                  <p:stCondLst>
+                                    <p:cond delay="0"/>
+                                  </p:stCondLst>
+                                  <p:childTnLst>
+                                    <p:set>
+                                      <p:cBhvr>
+                                        <p:cTn id="50" dur="1" fill="hold">
+                                          <p:stCondLst>
+                                            <p:cond delay="0"/>
+                                          </p:stCondLst>
+                                        </p:cTn>
+                                        <p:tgtEl>
+                                          <p:spTgt spid="21"/>
+                                        </p:tgtEl>
+                                        <p:attrNameLst>
+                                          <p:attrName>style.visibility</p:attrName>
+                                        </p:attrNameLst>
+                                      </p:cBhvr>
+                                      <p:to>
+                                        <p:strVal val="visible"/>
+                                      </p:to>
+                                    </p:set>
+                                  </p:childTnLst>
+                                </p:cTn>
+                              </p:par>
+                            </p:childTnLst>
+                          </p:cTn>
+                        </p:par>
+                      </p:childTnLst>
+                    </p:cTn>
+                  </p:par>
+                  <p:par>
+                    <p:cTn id="51" fill="hold">
+                      <p:stCondLst>
+                        <p:cond delay="indefinite"/>
+                      </p:stCondLst>
+                      <p:childTnLst>
+                        <p:par>
+                          <p:cTn id="52" fill="hold">
+                            <p:stCondLst>
+                              <p:cond delay="0"/>
+                            </p:stCondLst>
+                            <p:childTnLst>
+                              <p:par>
+                                <p:cTn id="53" presetID="1" presetClass="entr" presetSubtype="0" fill="hold" grpId="0" nodeType="clickEffect">
+                                  <p:stCondLst>
+                                    <p:cond delay="0"/>
+                                  </p:stCondLst>
+                                  <p:childTnLst>
+                                    <p:set>
+                                      <p:cBhvr>
+                                        <p:cTn id="54" dur="1" fill="hold">
+                                          <p:stCondLst>
+                                            <p:cond delay="0"/>
+                                          </p:stCondLst>
+                                        </p:cTn>
+                                        <p:tgtEl>
+                                          <p:spTgt spid="3">
+                                            <p:txEl>
+                                              <p:pRg st="4" end="4"/>
+                                            </p:txEl>
+                                          </p:spTgt>
+                                        </p:tgtEl>
+                                        <p:attrNameLst>
+                                          <p:attrName>style.visibility</p:attrName>
+                                        </p:attrNameLst>
+                                      </p:cBhvr>
+                                      <p:to>
+                                        <p:strVal val="visible"/>
+                                      </p:to>
+                                    </p:set>
+                                  </p:childTnLst>
+                                </p:cTn>
+                              </p:par>
+                            </p:childTnLst>
+                          </p:cTn>
+                        </p:par>
+                      </p:childTnLst>
+                    </p:cTn>
+                  </p:par>
+                  <p:par>
+                    <p:cTn id="55" fill="hold">
+                      <p:stCondLst>
+                        <p:cond delay="indefinite"/>
+                      </p:stCondLst>
+                      <p:childTnLst>
+                        <p:par>
+                          <p:cTn id="56" fill="hold">
+                            <p:stCondLst>
+                              <p:cond delay="0"/>
+                            </p:stCondLst>
+                            <p:childTnLst>
+                              <p:par>
+                                <p:cTn id="57" presetID="1" presetClass="entr" presetSubtype="0" fill="hold" grpId="0" nodeType="clickEffect">
+                                  <p:stCondLst>
+                                    <p:cond delay="0"/>
+                                  </p:stCondLst>
+                                  <p:childTnLst>
+                                    <p:set>
+                                      <p:cBhvr>
+                                        <p:cTn id="58" dur="1" fill="hold">
+                                          <p:stCondLst>
+                                            <p:cond delay="0"/>
+                                          </p:stCondLst>
+                                        </p:cTn>
+                                        <p:tgtEl>
+                                          <p:spTgt spid="3">
+                                            <p:txEl>
+                                              <p:pRg st="5" end="5"/>
+                                            </p:txEl>
+                                          </p:spTgt>
+                                        </p:tgtEl>
+                                        <p:attrNameLst>
+                                          <p:attrName>style.visibility</p:attrName>
+                                        </p:attrNameLst>
+                                      </p:cBhvr>
+                                      <p:to>
+                                        <p:strVal val="visible"/>
+                                      </p:to>
+                                    </p:set>
+                                  </p:childTnLst>
+                                </p:cTn>
+                              </p:par>
+                            </p:childTnLst>
+                          </p:cTn>
+                        </p:par>
+                      </p:childTnLst>
+                    </p:cTn>
+                  </p:par>
+                  <p:par>
+                    <p:cTn id="59" fill="hold">
+                      <p:stCondLst>
+                        <p:cond delay="indefinite"/>
+                      </p:stCondLst>
+                      <p:childTnLst>
+                        <p:par>
+                          <p:cTn id="60" fill="hold">
+                            <p:stCondLst>
+                              <p:cond delay="0"/>
+                            </p:stCondLst>
+                            <p:childTnLst>
+                              <p:par>
+                                <p:cTn id="61" presetID="1" presetClass="entr" presetSubtype="0" fill="hold" grpId="0" nodeType="clickEffect">
+                                  <p:stCondLst>
+                                    <p:cond delay="0"/>
+                                  </p:stCondLst>
+                                  <p:childTnLst>
+                                    <p:set>
+                                      <p:cBhvr>
+                                        <p:cTn id="62" dur="1" fill="hold">
+                                          <p:stCondLst>
+                                            <p:cond delay="0"/>
+                                          </p:stCondLst>
+                                        </p:cTn>
+                                        <p:tgtEl>
+                                          <p:spTgt spid="3">
+                                            <p:txEl>
+                                              <p:pRg st="6" end="6"/>
+                                            </p:txEl>
+                                          </p:spTgt>
+                                        </p:tgtEl>
+                                        <p:attrNameLst>
+                                          <p:attrName>style.visibility</p:attrName>
+                                        </p:attrNameLst>
+                                      </p:cBhvr>
+                                      <p:to>
+                                        <p:strVal val="visible"/>
+                                      </p:to>
+                                    </p:set>
+                                  </p:childTnLst>
+                                </p:cTn>
+                              </p:par>
+                            </p:childTnLst>
+                          </p:cTn>
+                        </p:par>
+                      </p:childTnLst>
+                    </p:cTn>
+                  </p:par>
+                </p:childTnLst>
+              </p:cTn>
+              <p:prevCondLst>
+                <p:cond evt="onPrev" delay="0">
+                  <p:tgtEl>
+                    <p:sldTgt/>
+                  </p:tgtEl>
+                </p:cond>
+              </p:prevCondLst>
+              <p:nextCondLst>
+                <p:cond evt="onNext" delay="0">
+                  <p:tgtEl>
+                    <p:sldTgt/>
+                  </p:tgtEl>
+                </p:cond>
+              </p:nextCondLst>
+            </p:seq>
+          </p:childTnLst>
+        </p:cTn>
       </p:par>
     </p:tnLst>
+    <p:bldLst>
+      <p:bldP spid="3" grpId="0" build="p"/>
+      <p:bldP spid="7" grpId="0" animBg="1"/>
+      <p:bldP spid="8" grpId="0" animBg="1"/>
+      <p:bldP spid="9" grpId="0" animBg="1"/>
+      <p:bldP spid="10" grpId="0" animBg="1"/>
+      <p:bldP spid="11" grpId="0" animBg="1"/>
+      <p:bldP spid="12" grpId="0" animBg="1"/>
+      <p:bldP spid="20" grpId="0" animBg="1"/>
+      <p:bldP spid="22" grpId="0" animBg="1"/>
+    </p:bldLst>
   </p:timing>
 </p:sld>
 </file>
@@ -8284,6 +9735,802 @@
           <a:chExt cx="0" cy="0"/>
         </a:xfrm>
       </p:grpSpPr>
+      <p:grpSp>
+        <p:nvGrpSpPr>
+          <p:cNvPr id="73" name="Grouper 72"/>
+          <p:cNvGrpSpPr/>
+          <p:nvPr/>
+        </p:nvGrpSpPr>
+        <p:grpSpPr>
+          <a:xfrm>
+            <a:off x="5540201" y="3361905"/>
+            <a:ext cx="2453780" cy="2296519"/>
+            <a:chOff x="5540201" y="3361905"/>
+            <a:chExt cx="2453780" cy="2296519"/>
+          </a:xfrm>
+        </p:grpSpPr>
+        <p:grpSp>
+          <p:nvGrpSpPr>
+            <p:cNvPr id="22" name="Grouper 21"/>
+            <p:cNvGrpSpPr>
+              <a:grpSpLocks noChangeAspect="1"/>
+            </p:cNvGrpSpPr>
+            <p:nvPr/>
+          </p:nvGrpSpPr>
+          <p:grpSpPr>
+            <a:xfrm>
+              <a:off x="5540201" y="3486880"/>
+              <a:ext cx="2453780" cy="2171544"/>
+              <a:chOff x="5070704" y="2562860"/>
+              <a:chExt cx="3271706" cy="2895392"/>
+            </a:xfrm>
+          </p:grpSpPr>
+          <p:sp>
+            <p:nvSpPr>
+              <p:cNvPr id="7" name="Ellipse 6"/>
+              <p:cNvSpPr/>
+              <p:nvPr/>
+            </p:nvSpPr>
+            <p:spPr>
+              <a:xfrm>
+                <a:off x="5818089" y="3306338"/>
+                <a:ext cx="428293" cy="407558"/>
+              </a:xfrm>
+              <a:prstGeom prst="ellipse">
+                <a:avLst/>
+              </a:prstGeom>
+            </p:spPr>
+            <p:style>
+              <a:lnRef idx="1">
+                <a:schemeClr val="accent5"/>
+              </a:lnRef>
+              <a:fillRef idx="3">
+                <a:schemeClr val="accent5"/>
+              </a:fillRef>
+              <a:effectRef idx="2">
+                <a:schemeClr val="accent5"/>
+              </a:effectRef>
+              <a:fontRef idx="minor">
+                <a:schemeClr val="lt1"/>
+              </a:fontRef>
+            </p:style>
+            <p:txBody>
+              <a:bodyPr lIns="72000" rtlCol="0" anchor="ctr">
+                <a:normAutofit fontScale="55000" lnSpcReduction="20000"/>
+              </a:bodyPr>
+              <a:lstStyle/>
+              <a:p>
+                <a:pPr algn="ctr"/>
+                <a:r>
+                  <a:rPr lang="fr-FR">
+                    <a:solidFill>
+                      <a:schemeClr val="tx1"/>
+                    </a:solidFill>
+                  </a:rPr>
+                  <a:t>A</a:t>
+                </a:r>
+              </a:p>
+            </p:txBody>
+          </p:sp>
+          <p:sp>
+            <p:nvSpPr>
+              <p:cNvPr id="8" name="Ellipse 7"/>
+              <p:cNvSpPr/>
+              <p:nvPr/>
+            </p:nvSpPr>
+            <p:spPr>
+              <a:xfrm>
+                <a:off x="6281592" y="2803785"/>
+                <a:ext cx="428293" cy="407558"/>
+              </a:xfrm>
+              <a:prstGeom prst="ellipse">
+                <a:avLst/>
+              </a:prstGeom>
+            </p:spPr>
+            <p:style>
+              <a:lnRef idx="1">
+                <a:schemeClr val="accent5"/>
+              </a:lnRef>
+              <a:fillRef idx="3">
+                <a:schemeClr val="accent5"/>
+              </a:fillRef>
+              <a:effectRef idx="2">
+                <a:schemeClr val="accent5"/>
+              </a:effectRef>
+              <a:fontRef idx="minor">
+                <a:schemeClr val="lt1"/>
+              </a:fontRef>
+            </p:style>
+            <p:txBody>
+              <a:bodyPr lIns="72000" rtlCol="0" anchor="ctr">
+                <a:normAutofit fontScale="55000" lnSpcReduction="20000"/>
+              </a:bodyPr>
+              <a:lstStyle/>
+              <a:p>
+                <a:pPr algn="ctr"/>
+                <a:r>
+                  <a:rPr lang="fr-FR">
+                    <a:solidFill>
+                      <a:schemeClr val="tx1"/>
+                    </a:solidFill>
+                  </a:rPr>
+                  <a:t>B</a:t>
+                </a:r>
+              </a:p>
+            </p:txBody>
+          </p:sp>
+          <p:sp>
+            <p:nvSpPr>
+              <p:cNvPr id="9" name="Ellipse 8"/>
+              <p:cNvSpPr/>
+              <p:nvPr/>
+            </p:nvSpPr>
+            <p:spPr>
+              <a:xfrm>
+                <a:off x="5070704" y="2562860"/>
+                <a:ext cx="428293" cy="407558"/>
+              </a:xfrm>
+              <a:prstGeom prst="ellipse">
+                <a:avLst/>
+              </a:prstGeom>
+            </p:spPr>
+            <p:style>
+              <a:lnRef idx="1">
+                <a:schemeClr val="accent5"/>
+              </a:lnRef>
+              <a:fillRef idx="3">
+                <a:schemeClr val="accent5"/>
+              </a:fillRef>
+              <a:effectRef idx="2">
+                <a:schemeClr val="accent5"/>
+              </a:effectRef>
+              <a:fontRef idx="minor">
+                <a:schemeClr val="lt1"/>
+              </a:fontRef>
+            </p:style>
+            <p:txBody>
+              <a:bodyPr lIns="72000" rtlCol="0" anchor="ctr">
+                <a:normAutofit fontScale="55000" lnSpcReduction="20000"/>
+              </a:bodyPr>
+              <a:lstStyle/>
+              <a:p>
+                <a:pPr algn="ctr"/>
+                <a:r>
+                  <a:rPr lang="fr-FR">
+                    <a:solidFill>
+                      <a:schemeClr val="tx1"/>
+                    </a:solidFill>
+                  </a:rPr>
+                  <a:t>C</a:t>
+                </a:r>
+              </a:p>
+            </p:txBody>
+          </p:sp>
+          <p:sp>
+            <p:nvSpPr>
+              <p:cNvPr id="10" name="Ellipse 9"/>
+              <p:cNvSpPr/>
+              <p:nvPr/>
+            </p:nvSpPr>
+            <p:spPr>
+              <a:xfrm>
+                <a:off x="5392724" y="4643136"/>
+                <a:ext cx="428293" cy="407558"/>
+              </a:xfrm>
+              <a:prstGeom prst="ellipse">
+                <a:avLst/>
+              </a:prstGeom>
+            </p:spPr>
+            <p:style>
+              <a:lnRef idx="1">
+                <a:schemeClr val="accent5"/>
+              </a:lnRef>
+              <a:fillRef idx="3">
+                <a:schemeClr val="accent5"/>
+              </a:fillRef>
+              <a:effectRef idx="2">
+                <a:schemeClr val="accent5"/>
+              </a:effectRef>
+              <a:fontRef idx="minor">
+                <a:schemeClr val="lt1"/>
+              </a:fontRef>
+            </p:style>
+            <p:txBody>
+              <a:bodyPr lIns="72000" rtlCol="0" anchor="ctr">
+                <a:normAutofit fontScale="55000" lnSpcReduction="20000"/>
+              </a:bodyPr>
+              <a:lstStyle/>
+              <a:p>
+                <a:pPr algn="ctr"/>
+                <a:r>
+                  <a:rPr lang="fr-FR">
+                    <a:solidFill>
+                      <a:schemeClr val="tx1"/>
+                    </a:solidFill>
+                  </a:rPr>
+                  <a:t>D</a:t>
+                </a:r>
+              </a:p>
+            </p:txBody>
+          </p:sp>
+          <p:sp>
+            <p:nvSpPr>
+              <p:cNvPr id="11" name="Ellipse 10"/>
+              <p:cNvSpPr/>
+              <p:nvPr/>
+            </p:nvSpPr>
+            <p:spPr>
+              <a:xfrm>
+                <a:off x="6133283" y="4071947"/>
+                <a:ext cx="428293" cy="407558"/>
+              </a:xfrm>
+              <a:prstGeom prst="ellipse">
+                <a:avLst/>
+              </a:prstGeom>
+            </p:spPr>
+            <p:style>
+              <a:lnRef idx="1">
+                <a:schemeClr val="accent5"/>
+              </a:lnRef>
+              <a:fillRef idx="3">
+                <a:schemeClr val="accent5"/>
+              </a:fillRef>
+              <a:effectRef idx="2">
+                <a:schemeClr val="accent5"/>
+              </a:effectRef>
+              <a:fontRef idx="minor">
+                <a:schemeClr val="lt1"/>
+              </a:fontRef>
+            </p:style>
+            <p:txBody>
+              <a:bodyPr lIns="72000" rtlCol="0" anchor="ctr">
+                <a:normAutofit fontScale="55000" lnSpcReduction="20000"/>
+              </a:bodyPr>
+              <a:lstStyle/>
+              <a:p>
+                <a:pPr algn="ctr"/>
+                <a:r>
+                  <a:rPr lang="fr-FR">
+                    <a:solidFill>
+                      <a:schemeClr val="tx1"/>
+                    </a:solidFill>
+                  </a:rPr>
+                  <a:t>E</a:t>
+                </a:r>
+              </a:p>
+            </p:txBody>
+          </p:sp>
+          <p:sp>
+            <p:nvSpPr>
+              <p:cNvPr id="12" name="Ellipse 11"/>
+              <p:cNvSpPr/>
+              <p:nvPr/>
+            </p:nvSpPr>
+            <p:spPr>
+              <a:xfrm>
+                <a:off x="7222789" y="4366627"/>
+                <a:ext cx="428293" cy="407558"/>
+              </a:xfrm>
+              <a:prstGeom prst="ellipse">
+                <a:avLst/>
+              </a:prstGeom>
+            </p:spPr>
+            <p:style>
+              <a:lnRef idx="1">
+                <a:schemeClr val="accent5"/>
+              </a:lnRef>
+              <a:fillRef idx="3">
+                <a:schemeClr val="accent5"/>
+              </a:fillRef>
+              <a:effectRef idx="2">
+                <a:schemeClr val="accent5"/>
+              </a:effectRef>
+              <a:fontRef idx="minor">
+                <a:schemeClr val="lt1"/>
+              </a:fontRef>
+            </p:style>
+            <p:txBody>
+              <a:bodyPr lIns="72000" rtlCol="0" anchor="ctr">
+                <a:normAutofit fontScale="55000" lnSpcReduction="20000"/>
+              </a:bodyPr>
+              <a:lstStyle/>
+              <a:p>
+                <a:pPr algn="ctr"/>
+                <a:r>
+                  <a:rPr lang="fr-FR">
+                    <a:solidFill>
+                      <a:schemeClr val="tx1"/>
+                    </a:solidFill>
+                  </a:rPr>
+                  <a:t>F</a:t>
+                </a:r>
+              </a:p>
+            </p:txBody>
+          </p:sp>
+          <p:cxnSp>
+            <p:nvCxnSpPr>
+              <p:cNvPr id="13" name="Connecteur droit 12"/>
+              <p:cNvCxnSpPr>
+                <a:stCxn id="9" idx="5"/>
+                <a:endCxn id="7" idx="1"/>
+              </p:cNvCxnSpPr>
+              <p:nvPr/>
+            </p:nvCxnSpPr>
+            <p:spPr>
+              <a:xfrm>
+                <a:off x="5436275" y="2910733"/>
+                <a:ext cx="444536" cy="455290"/>
+              </a:xfrm>
+              <a:prstGeom prst="line">
+                <a:avLst/>
+              </a:prstGeom>
+              <a:ln/>
+            </p:spPr>
+            <p:style>
+              <a:lnRef idx="1">
+                <a:schemeClr val="accent5"/>
+              </a:lnRef>
+              <a:fillRef idx="3">
+                <a:schemeClr val="accent5"/>
+              </a:fillRef>
+              <a:effectRef idx="2">
+                <a:schemeClr val="accent5"/>
+              </a:effectRef>
+              <a:fontRef idx="minor">
+                <a:schemeClr val="lt1"/>
+              </a:fontRef>
+            </p:style>
+          </p:cxnSp>
+          <p:cxnSp>
+            <p:nvCxnSpPr>
+              <p:cNvPr id="14" name="Connecteur droit 13"/>
+              <p:cNvCxnSpPr>
+                <a:stCxn id="7" idx="7"/>
+                <a:endCxn id="8" idx="3"/>
+              </p:cNvCxnSpPr>
+              <p:nvPr/>
+            </p:nvCxnSpPr>
+            <p:spPr>
+              <a:xfrm flipV="1">
+                <a:off x="6183660" y="3151658"/>
+                <a:ext cx="160654" cy="214365"/>
+              </a:xfrm>
+              <a:prstGeom prst="line">
+                <a:avLst/>
+              </a:prstGeom>
+            </p:spPr>
+            <p:style>
+              <a:lnRef idx="1">
+                <a:schemeClr val="accent5"/>
+              </a:lnRef>
+              <a:fillRef idx="3">
+                <a:schemeClr val="accent5"/>
+              </a:fillRef>
+              <a:effectRef idx="2">
+                <a:schemeClr val="accent5"/>
+              </a:effectRef>
+              <a:fontRef idx="minor">
+                <a:schemeClr val="lt1"/>
+              </a:fontRef>
+            </p:style>
+          </p:cxnSp>
+          <p:cxnSp>
+            <p:nvCxnSpPr>
+              <p:cNvPr id="15" name="Connecteur droit 14"/>
+              <p:cNvCxnSpPr>
+                <a:stCxn id="7" idx="5"/>
+                <a:endCxn id="11" idx="0"/>
+              </p:cNvCxnSpPr>
+              <p:nvPr/>
+            </p:nvCxnSpPr>
+            <p:spPr>
+              <a:xfrm>
+                <a:off x="6183660" y="3654211"/>
+                <a:ext cx="163770" cy="417736"/>
+              </a:xfrm>
+              <a:prstGeom prst="line">
+                <a:avLst/>
+              </a:prstGeom>
+            </p:spPr>
+            <p:style>
+              <a:lnRef idx="1">
+                <a:schemeClr val="accent5"/>
+              </a:lnRef>
+              <a:fillRef idx="3">
+                <a:schemeClr val="accent5"/>
+              </a:fillRef>
+              <a:effectRef idx="2">
+                <a:schemeClr val="accent5"/>
+              </a:effectRef>
+              <a:fontRef idx="minor">
+                <a:schemeClr val="lt1"/>
+              </a:fontRef>
+            </p:style>
+          </p:cxnSp>
+          <p:cxnSp>
+            <p:nvCxnSpPr>
+              <p:cNvPr id="16" name="Connecteur droit 15"/>
+              <p:cNvCxnSpPr>
+                <a:stCxn id="7" idx="3"/>
+                <a:endCxn id="10" idx="0"/>
+              </p:cNvCxnSpPr>
+              <p:nvPr/>
+            </p:nvCxnSpPr>
+            <p:spPr>
+              <a:xfrm flipH="1">
+                <a:off x="5606871" y="3654211"/>
+                <a:ext cx="273940" cy="988925"/>
+              </a:xfrm>
+              <a:prstGeom prst="line">
+                <a:avLst/>
+              </a:prstGeom>
+            </p:spPr>
+            <p:style>
+              <a:lnRef idx="1">
+                <a:schemeClr val="accent5"/>
+              </a:lnRef>
+              <a:fillRef idx="3">
+                <a:schemeClr val="accent5"/>
+              </a:fillRef>
+              <a:effectRef idx="2">
+                <a:schemeClr val="accent5"/>
+              </a:effectRef>
+              <a:fontRef idx="minor">
+                <a:schemeClr val="lt1"/>
+              </a:fontRef>
+            </p:style>
+          </p:cxnSp>
+          <p:cxnSp>
+            <p:nvCxnSpPr>
+              <p:cNvPr id="17" name="Connecteur droit 16"/>
+              <p:cNvCxnSpPr>
+                <a:stCxn id="10" idx="7"/>
+                <a:endCxn id="11" idx="3"/>
+              </p:cNvCxnSpPr>
+              <p:nvPr/>
+            </p:nvCxnSpPr>
+            <p:spPr>
+              <a:xfrm flipV="1">
+                <a:off x="5758295" y="4419820"/>
+                <a:ext cx="437710" cy="283001"/>
+              </a:xfrm>
+              <a:prstGeom prst="line">
+                <a:avLst/>
+              </a:prstGeom>
+            </p:spPr>
+            <p:style>
+              <a:lnRef idx="1">
+                <a:schemeClr val="accent5"/>
+              </a:lnRef>
+              <a:fillRef idx="3">
+                <a:schemeClr val="accent5"/>
+              </a:fillRef>
+              <a:effectRef idx="2">
+                <a:schemeClr val="accent5"/>
+              </a:effectRef>
+              <a:fontRef idx="minor">
+                <a:schemeClr val="lt1"/>
+              </a:fontRef>
+            </p:style>
+          </p:cxnSp>
+          <p:cxnSp>
+            <p:nvCxnSpPr>
+              <p:cNvPr id="18" name="Connecteur droit 17"/>
+              <p:cNvCxnSpPr>
+                <a:stCxn id="11" idx="6"/>
+                <a:endCxn id="12" idx="2"/>
+              </p:cNvCxnSpPr>
+              <p:nvPr/>
+            </p:nvCxnSpPr>
+            <p:spPr>
+              <a:xfrm>
+                <a:off x="6561576" y="4275726"/>
+                <a:ext cx="661213" cy="294680"/>
+              </a:xfrm>
+              <a:prstGeom prst="line">
+                <a:avLst/>
+              </a:prstGeom>
+            </p:spPr>
+            <p:style>
+              <a:lnRef idx="1">
+                <a:schemeClr val="accent5"/>
+              </a:lnRef>
+              <a:fillRef idx="3">
+                <a:schemeClr val="accent5"/>
+              </a:fillRef>
+              <a:effectRef idx="2">
+                <a:schemeClr val="accent5"/>
+              </a:effectRef>
+              <a:fontRef idx="minor">
+                <a:schemeClr val="lt1"/>
+              </a:fontRef>
+            </p:style>
+          </p:cxnSp>
+          <p:cxnSp>
+            <p:nvCxnSpPr>
+              <p:cNvPr id="19" name="Connecteur droit 18"/>
+              <p:cNvCxnSpPr>
+                <a:stCxn id="8" idx="2"/>
+                <a:endCxn id="9" idx="6"/>
+              </p:cNvCxnSpPr>
+              <p:nvPr/>
+            </p:nvCxnSpPr>
+            <p:spPr>
+              <a:xfrm flipH="1" flipV="1">
+                <a:off x="5498997" y="2766639"/>
+                <a:ext cx="782595" cy="240925"/>
+              </a:xfrm>
+              <a:prstGeom prst="line">
+                <a:avLst/>
+              </a:prstGeom>
+            </p:spPr>
+            <p:style>
+              <a:lnRef idx="1">
+                <a:schemeClr val="accent5"/>
+              </a:lnRef>
+              <a:fillRef idx="3">
+                <a:schemeClr val="accent5"/>
+              </a:fillRef>
+              <a:effectRef idx="2">
+                <a:schemeClr val="accent5"/>
+              </a:effectRef>
+              <a:fontRef idx="minor">
+                <a:schemeClr val="lt1"/>
+              </a:fontRef>
+            </p:style>
+          </p:cxnSp>
+          <p:sp>
+            <p:nvSpPr>
+              <p:cNvPr id="20" name="Ellipse 19"/>
+              <p:cNvSpPr/>
+              <p:nvPr/>
+            </p:nvSpPr>
+            <p:spPr>
+              <a:xfrm>
+                <a:off x="7914117" y="5050694"/>
+                <a:ext cx="428293" cy="407558"/>
+              </a:xfrm>
+              <a:prstGeom prst="ellipse">
+                <a:avLst/>
+              </a:prstGeom>
+            </p:spPr>
+            <p:style>
+              <a:lnRef idx="1">
+                <a:schemeClr val="accent5"/>
+              </a:lnRef>
+              <a:fillRef idx="3">
+                <a:schemeClr val="accent5"/>
+              </a:fillRef>
+              <a:effectRef idx="2">
+                <a:schemeClr val="accent5"/>
+              </a:effectRef>
+              <a:fontRef idx="minor">
+                <a:schemeClr val="lt1"/>
+              </a:fontRef>
+            </p:style>
+            <p:txBody>
+              <a:bodyPr lIns="72000" rtlCol="0" anchor="ctr">
+                <a:normAutofit fontScale="55000" lnSpcReduction="20000"/>
+              </a:bodyPr>
+              <a:lstStyle/>
+              <a:p>
+                <a:pPr algn="ctr"/>
+                <a:r>
+                  <a:rPr lang="fr-FR">
+                    <a:solidFill>
+                      <a:schemeClr val="tx1"/>
+                    </a:solidFill>
+                  </a:rPr>
+                  <a:t>G</a:t>
+                </a:r>
+              </a:p>
+            </p:txBody>
+          </p:sp>
+          <p:cxnSp>
+            <p:nvCxnSpPr>
+              <p:cNvPr id="21" name="Connecteur droit 20"/>
+              <p:cNvCxnSpPr>
+                <a:stCxn id="12" idx="5"/>
+                <a:endCxn id="20" idx="1"/>
+              </p:cNvCxnSpPr>
+              <p:nvPr/>
+            </p:nvCxnSpPr>
+            <p:spPr>
+              <a:xfrm>
+                <a:off x="7588360" y="4714500"/>
+                <a:ext cx="388479" cy="395879"/>
+              </a:xfrm>
+              <a:prstGeom prst="line">
+                <a:avLst/>
+              </a:prstGeom>
+            </p:spPr>
+            <p:style>
+              <a:lnRef idx="1">
+                <a:schemeClr val="accent5"/>
+              </a:lnRef>
+              <a:fillRef idx="3">
+                <a:schemeClr val="accent5"/>
+              </a:fillRef>
+              <a:effectRef idx="2">
+                <a:schemeClr val="accent5"/>
+              </a:effectRef>
+              <a:fontRef idx="minor">
+                <a:schemeClr val="lt1"/>
+              </a:fontRef>
+            </p:style>
+          </p:cxnSp>
+        </p:grpSp>
+        <p:sp>
+          <p:nvSpPr>
+            <p:cNvPr id="62" name="Ellipse 61"/>
+            <p:cNvSpPr/>
+            <p:nvPr/>
+          </p:nvSpPr>
+          <p:spPr>
+            <a:xfrm>
+              <a:off x="7614188" y="4465861"/>
+              <a:ext cx="321220" cy="305669"/>
+            </a:xfrm>
+            <a:prstGeom prst="ellipse">
+              <a:avLst/>
+            </a:prstGeom>
+          </p:spPr>
+          <p:style>
+            <a:lnRef idx="1">
+              <a:schemeClr val="accent5"/>
+            </a:lnRef>
+            <a:fillRef idx="3">
+              <a:schemeClr val="accent5"/>
+            </a:fillRef>
+            <a:effectRef idx="2">
+              <a:schemeClr val="accent5"/>
+            </a:effectRef>
+            <a:fontRef idx="minor">
+              <a:schemeClr val="lt1"/>
+            </a:fontRef>
+          </p:style>
+          <p:txBody>
+            <a:bodyPr lIns="72000" rtlCol="0" anchor="ctr">
+              <a:normAutofit fontScale="55000" lnSpcReduction="20000"/>
+            </a:bodyPr>
+            <a:lstStyle/>
+            <a:p>
+              <a:pPr algn="ctr"/>
+              <a:r>
+                <a:rPr lang="fr-FR">
+                  <a:solidFill>
+                    <a:schemeClr val="tx1"/>
+                  </a:solidFill>
+                </a:rPr>
+                <a:t>H</a:t>
+              </a:r>
+              <a:endParaRPr lang="fr-FR">
+                <a:solidFill>
+                  <a:schemeClr val="tx1"/>
+                </a:solidFill>
+              </a:endParaRPr>
+            </a:p>
+          </p:txBody>
+        </p:sp>
+        <p:cxnSp>
+          <p:nvCxnSpPr>
+            <p:cNvPr id="63" name="Connecteur droit 62"/>
+            <p:cNvCxnSpPr>
+              <a:stCxn id="12" idx="7"/>
+              <a:endCxn id="62" idx="3"/>
+            </p:cNvCxnSpPr>
+            <p:nvPr/>
+          </p:nvCxnSpPr>
+          <p:spPr>
+            <a:xfrm flipV="1">
+              <a:off x="7428443" y="4726766"/>
+              <a:ext cx="232787" cy="157703"/>
+            </a:xfrm>
+            <a:prstGeom prst="line">
+              <a:avLst/>
+            </a:prstGeom>
+          </p:spPr>
+          <p:style>
+            <a:lnRef idx="1">
+              <a:schemeClr val="accent5"/>
+            </a:lnRef>
+            <a:fillRef idx="3">
+              <a:schemeClr val="accent5"/>
+            </a:fillRef>
+            <a:effectRef idx="2">
+              <a:schemeClr val="accent5"/>
+            </a:effectRef>
+            <a:fontRef idx="minor">
+              <a:schemeClr val="lt1"/>
+            </a:fontRef>
+          </p:style>
+        </p:cxnSp>
+        <p:sp>
+          <p:nvSpPr>
+            <p:cNvPr id="67" name="Ellipse 66"/>
+            <p:cNvSpPr/>
+            <p:nvPr/>
+          </p:nvSpPr>
+          <p:spPr>
+            <a:xfrm>
+              <a:off x="7062851" y="3361905"/>
+              <a:ext cx="321220" cy="305669"/>
+            </a:xfrm>
+            <a:prstGeom prst="ellipse">
+              <a:avLst/>
+            </a:prstGeom>
+          </p:spPr>
+          <p:style>
+            <a:lnRef idx="1">
+              <a:schemeClr val="accent5"/>
+            </a:lnRef>
+            <a:fillRef idx="3">
+              <a:schemeClr val="accent5"/>
+            </a:fillRef>
+            <a:effectRef idx="2">
+              <a:schemeClr val="accent5"/>
+            </a:effectRef>
+            <a:fontRef idx="minor">
+              <a:schemeClr val="lt1"/>
+            </a:fontRef>
+          </p:style>
+          <p:txBody>
+            <a:bodyPr lIns="72000" rtlCol="0" anchor="ctr">
+              <a:normAutofit fontScale="55000" lnSpcReduction="20000"/>
+            </a:bodyPr>
+            <a:lstStyle/>
+            <a:p>
+              <a:pPr algn="ctr"/>
+              <a:r>
+                <a:rPr lang="fr-FR">
+                  <a:solidFill>
+                    <a:schemeClr val="tx1"/>
+                  </a:solidFill>
+                </a:rPr>
+                <a:t>I</a:t>
+              </a:r>
+              <a:endParaRPr lang="fr-FR">
+                <a:solidFill>
+                  <a:schemeClr val="tx1"/>
+                </a:solidFill>
+              </a:endParaRPr>
+            </a:p>
+          </p:txBody>
+        </p:sp>
+        <p:cxnSp>
+          <p:nvCxnSpPr>
+            <p:cNvPr id="68" name="Connecteur droit 67"/>
+            <p:cNvCxnSpPr>
+              <a:stCxn id="8" idx="6"/>
+              <a:endCxn id="67" idx="3"/>
+            </p:cNvCxnSpPr>
+            <p:nvPr/>
+          </p:nvCxnSpPr>
+          <p:spPr>
+            <a:xfrm flipV="1">
+              <a:off x="6769587" y="3622810"/>
+              <a:ext cx="340306" cy="197599"/>
+            </a:xfrm>
+            <a:prstGeom prst="line">
+              <a:avLst/>
+            </a:prstGeom>
+          </p:spPr>
+          <p:style>
+            <a:lnRef idx="1">
+              <a:schemeClr val="accent5"/>
+            </a:lnRef>
+            <a:fillRef idx="3">
+              <a:schemeClr val="accent5"/>
+            </a:fillRef>
+            <a:effectRef idx="2">
+              <a:schemeClr val="accent5"/>
+            </a:effectRef>
+            <a:fontRef idx="minor">
+              <a:schemeClr val="lt1"/>
+            </a:fontRef>
+          </p:style>
+        </p:cxnSp>
+      </p:grpSp>
       <p:sp>
         <p:nvSpPr>
           <p:cNvPr id="2" name="Titre 1"/>
@@ -8487,6 +10734,166 @@
           </a:p>
         </p:txBody>
       </p:sp>
+      <p:sp>
+        <p:nvSpPr>
+          <p:cNvPr id="55" name="Multiplication 54"/>
+          <p:cNvSpPr>
+            <a:spLocks noChangeAspect="1"/>
+          </p:cNvSpPr>
+          <p:nvPr/>
+        </p:nvSpPr>
+        <p:spPr>
+          <a:xfrm>
+            <a:off x="6030447" y="3966339"/>
+            <a:ext cx="469463" cy="488957"/>
+          </a:xfrm>
+          <a:prstGeom prst="mathMultiply">
+            <a:avLst/>
+          </a:prstGeom>
+        </p:spPr>
+        <p:style>
+          <a:lnRef idx="1">
+            <a:schemeClr val="accent1"/>
+          </a:lnRef>
+          <a:fillRef idx="3">
+            <a:schemeClr val="accent1"/>
+          </a:fillRef>
+          <a:effectRef idx="2">
+            <a:schemeClr val="accent1"/>
+          </a:effectRef>
+          <a:fontRef idx="minor">
+            <a:schemeClr val="lt1"/>
+          </a:fontRef>
+        </p:style>
+        <p:txBody>
+          <a:bodyPr rtlCol="0" anchor="ctr"/>
+          <a:lstStyle/>
+          <a:p>
+            <a:pPr algn="ctr"/>
+            <a:endParaRPr lang="fr-FR"/>
+          </a:p>
+        </p:txBody>
+      </p:sp>
+      <p:sp>
+        <p:nvSpPr>
+          <p:cNvPr id="59" name="Multiplication 58"/>
+          <p:cNvSpPr>
+            <a:spLocks noChangeAspect="1"/>
+          </p:cNvSpPr>
+          <p:nvPr/>
+        </p:nvSpPr>
+        <p:spPr>
+          <a:xfrm>
+            <a:off x="6263014" y="4527051"/>
+            <a:ext cx="469463" cy="488957"/>
+          </a:xfrm>
+          <a:prstGeom prst="mathMultiply">
+            <a:avLst/>
+          </a:prstGeom>
+        </p:spPr>
+        <p:style>
+          <a:lnRef idx="1">
+            <a:schemeClr val="accent1"/>
+          </a:lnRef>
+          <a:fillRef idx="3">
+            <a:schemeClr val="accent1"/>
+          </a:fillRef>
+          <a:effectRef idx="2">
+            <a:schemeClr val="accent1"/>
+          </a:effectRef>
+          <a:fontRef idx="minor">
+            <a:schemeClr val="lt1"/>
+          </a:fontRef>
+        </p:style>
+        <p:txBody>
+          <a:bodyPr rtlCol="0" anchor="ctr"/>
+          <a:lstStyle/>
+          <a:p>
+            <a:pPr algn="ctr"/>
+            <a:endParaRPr lang="fr-FR"/>
+          </a:p>
+        </p:txBody>
+      </p:sp>
+      <p:sp>
+        <p:nvSpPr>
+          <p:cNvPr id="60" name="Multiplication 59"/>
+          <p:cNvSpPr>
+            <a:spLocks noChangeAspect="1"/>
+          </p:cNvSpPr>
+          <p:nvPr/>
+        </p:nvSpPr>
+        <p:spPr>
+          <a:xfrm>
+            <a:off x="6374918" y="3575930"/>
+            <a:ext cx="469463" cy="488957"/>
+          </a:xfrm>
+          <a:prstGeom prst="mathMultiply">
+            <a:avLst/>
+          </a:prstGeom>
+        </p:spPr>
+        <p:style>
+          <a:lnRef idx="1">
+            <a:schemeClr val="accent1"/>
+          </a:lnRef>
+          <a:fillRef idx="3">
+            <a:schemeClr val="accent1"/>
+          </a:fillRef>
+          <a:effectRef idx="2">
+            <a:schemeClr val="accent1"/>
+          </a:effectRef>
+          <a:fontRef idx="minor">
+            <a:schemeClr val="lt1"/>
+          </a:fontRef>
+        </p:style>
+        <p:txBody>
+          <a:bodyPr rtlCol="0" anchor="ctr"/>
+          <a:lstStyle/>
+          <a:p>
+            <a:pPr algn="ctr"/>
+            <a:endParaRPr lang="fr-FR"/>
+          </a:p>
+        </p:txBody>
+      </p:sp>
+      <p:sp>
+        <p:nvSpPr>
+          <p:cNvPr id="74" name="Multiplication 73"/>
+          <p:cNvSpPr>
+            <a:spLocks noChangeAspect="1"/>
+          </p:cNvSpPr>
+          <p:nvPr/>
+        </p:nvSpPr>
+        <p:spPr>
+          <a:xfrm>
+            <a:off x="5703333" y="4982989"/>
+            <a:ext cx="452844" cy="471648"/>
+          </a:xfrm>
+          <a:prstGeom prst="mathMultiply">
+            <a:avLst/>
+          </a:prstGeom>
+        </p:spPr>
+        <p:style>
+          <a:lnRef idx="1">
+            <a:schemeClr val="accent1"/>
+          </a:lnRef>
+          <a:fillRef idx="3">
+            <a:schemeClr val="accent1"/>
+          </a:fillRef>
+          <a:effectRef idx="2">
+            <a:schemeClr val="accent1"/>
+          </a:effectRef>
+          <a:fontRef idx="minor">
+            <a:schemeClr val="lt1"/>
+          </a:fontRef>
+        </p:style>
+        <p:txBody>
+          <a:bodyPr rtlCol="0" anchor="ctr"/>
+          <a:lstStyle/>
+          <a:p>
+            <a:pPr algn="ctr"/>
+            <a:endParaRPr lang="fr-FR"/>
+          </a:p>
+        </p:txBody>
+      </p:sp>
     </p:spTree>
     <p:extLst>
       <p:ext uri="{BB962C8B-B14F-4D97-AF65-F5344CB8AC3E}">
@@ -8508,9 +10915,540 @@
   <p:timing>
     <p:tnLst>
       <p:par>
-        <p:cTn xmlns:p14="http://schemas.microsoft.com/office/powerpoint/2010/main" id="1" dur="indefinite" restart="never" nodeType="tmRoot"/>
+        <p:cTn xmlns:p14="http://schemas.microsoft.com/office/powerpoint/2010/main" id="1" dur="indefinite" restart="never" nodeType="tmRoot">
+          <p:childTnLst>
+            <p:seq concurrent="1" nextAc="seek">
+              <p:cTn id="2" dur="indefinite" nodeType="mainSeq">
+                <p:childTnLst>
+                  <p:par>
+                    <p:cTn id="3" fill="hold">
+                      <p:stCondLst>
+                        <p:cond delay="indefinite"/>
+                        <p:cond evt="onBegin" delay="0">
+                          <p:tn val="2"/>
+                        </p:cond>
+                      </p:stCondLst>
+                      <p:childTnLst>
+                        <p:par>
+                          <p:cTn id="4" fill="hold">
+                            <p:stCondLst>
+                              <p:cond delay="0"/>
+                            </p:stCondLst>
+                            <p:childTnLst>
+                              <p:par>
+                                <p:cTn id="5" presetID="1" presetClass="entr" presetSubtype="0" fill="hold" grpId="0" nodeType="withEffect">
+                                  <p:stCondLst>
+                                    <p:cond delay="0"/>
+                                  </p:stCondLst>
+                                  <p:childTnLst>
+                                    <p:set>
+                                      <p:cBhvr>
+                                        <p:cTn id="6" dur="1" fill="hold">
+                                          <p:stCondLst>
+                                            <p:cond delay="0"/>
+                                          </p:stCondLst>
+                                        </p:cTn>
+                                        <p:tgtEl>
+                                          <p:spTgt spid="3">
+                                            <p:txEl>
+                                              <p:pRg st="0" end="0"/>
+                                            </p:txEl>
+                                          </p:spTgt>
+                                        </p:tgtEl>
+                                        <p:attrNameLst>
+                                          <p:attrName>style.visibility</p:attrName>
+                                        </p:attrNameLst>
+                                      </p:cBhvr>
+                                      <p:to>
+                                        <p:strVal val="visible"/>
+                                      </p:to>
+                                    </p:set>
+                                  </p:childTnLst>
+                                </p:cTn>
+                              </p:par>
+                              <p:par>
+                                <p:cTn id="7" presetID="1" presetClass="entr" presetSubtype="0" fill="hold" grpId="0" nodeType="withEffect">
+                                  <p:stCondLst>
+                                    <p:cond delay="0"/>
+                                  </p:stCondLst>
+                                  <p:childTnLst>
+                                    <p:set>
+                                      <p:cBhvr>
+                                        <p:cTn id="8" dur="1" fill="hold">
+                                          <p:stCondLst>
+                                            <p:cond delay="0"/>
+                                          </p:stCondLst>
+                                        </p:cTn>
+                                        <p:tgtEl>
+                                          <p:spTgt spid="3">
+                                            <p:txEl>
+                                              <p:pRg st="1" end="1"/>
+                                            </p:txEl>
+                                          </p:spTgt>
+                                        </p:tgtEl>
+                                        <p:attrNameLst>
+                                          <p:attrName>style.visibility</p:attrName>
+                                        </p:attrNameLst>
+                                      </p:cBhvr>
+                                      <p:to>
+                                        <p:strVal val="visible"/>
+                                      </p:to>
+                                    </p:set>
+                                  </p:childTnLst>
+                                </p:cTn>
+                              </p:par>
+                              <p:par>
+                                <p:cTn id="9" presetID="1" presetClass="entr" presetSubtype="0" fill="hold" grpId="0" nodeType="withEffect">
+                                  <p:stCondLst>
+                                    <p:cond delay="0"/>
+                                  </p:stCondLst>
+                                  <p:childTnLst>
+                                    <p:set>
+                                      <p:cBhvr>
+                                        <p:cTn id="10" dur="1" fill="hold">
+                                          <p:stCondLst>
+                                            <p:cond delay="0"/>
+                                          </p:stCondLst>
+                                        </p:cTn>
+                                        <p:tgtEl>
+                                          <p:spTgt spid="3">
+                                            <p:txEl>
+                                              <p:pRg st="2" end="2"/>
+                                            </p:txEl>
+                                          </p:spTgt>
+                                        </p:tgtEl>
+                                        <p:attrNameLst>
+                                          <p:attrName>style.visibility</p:attrName>
+                                        </p:attrNameLst>
+                                      </p:cBhvr>
+                                      <p:to>
+                                        <p:strVal val="visible"/>
+                                      </p:to>
+                                    </p:set>
+                                  </p:childTnLst>
+                                </p:cTn>
+                              </p:par>
+                            </p:childTnLst>
+                          </p:cTn>
+                        </p:par>
+                      </p:childTnLst>
+                    </p:cTn>
+                  </p:par>
+                  <p:par>
+                    <p:cTn id="11" fill="hold">
+                      <p:stCondLst>
+                        <p:cond delay="indefinite"/>
+                      </p:stCondLst>
+                      <p:childTnLst>
+                        <p:par>
+                          <p:cTn id="12" fill="hold">
+                            <p:stCondLst>
+                              <p:cond delay="0"/>
+                            </p:stCondLst>
+                            <p:childTnLst>
+                              <p:par>
+                                <p:cTn id="13" presetID="1" presetClass="entr" presetSubtype="0" fill="hold" grpId="0" nodeType="clickEffect">
+                                  <p:stCondLst>
+                                    <p:cond delay="0"/>
+                                  </p:stCondLst>
+                                  <p:childTnLst>
+                                    <p:set>
+                                      <p:cBhvr>
+                                        <p:cTn id="14" dur="1" fill="hold">
+                                          <p:stCondLst>
+                                            <p:cond delay="0"/>
+                                          </p:stCondLst>
+                                        </p:cTn>
+                                        <p:tgtEl>
+                                          <p:spTgt spid="3">
+                                            <p:txEl>
+                                              <p:pRg st="4" end="4"/>
+                                            </p:txEl>
+                                          </p:spTgt>
+                                        </p:tgtEl>
+                                        <p:attrNameLst>
+                                          <p:attrName>style.visibility</p:attrName>
+                                        </p:attrNameLst>
+                                      </p:cBhvr>
+                                      <p:to>
+                                        <p:strVal val="visible"/>
+                                      </p:to>
+                                    </p:set>
+                                  </p:childTnLst>
+                                </p:cTn>
+                              </p:par>
+                              <p:par>
+                                <p:cTn id="15" presetID="1" presetClass="entr" presetSubtype="0" fill="hold" nodeType="withEffect">
+                                  <p:stCondLst>
+                                    <p:cond delay="0"/>
+                                  </p:stCondLst>
+                                  <p:childTnLst>
+                                    <p:set>
+                                      <p:cBhvr>
+                                        <p:cTn id="16" dur="1" fill="hold">
+                                          <p:stCondLst>
+                                            <p:cond delay="0"/>
+                                          </p:stCondLst>
+                                        </p:cTn>
+                                        <p:tgtEl>
+                                          <p:spTgt spid="73"/>
+                                        </p:tgtEl>
+                                        <p:attrNameLst>
+                                          <p:attrName>style.visibility</p:attrName>
+                                        </p:attrNameLst>
+                                      </p:cBhvr>
+                                      <p:to>
+                                        <p:strVal val="visible"/>
+                                      </p:to>
+                                    </p:set>
+                                  </p:childTnLst>
+                                </p:cTn>
+                              </p:par>
+                            </p:childTnLst>
+                          </p:cTn>
+                        </p:par>
+                      </p:childTnLst>
+                    </p:cTn>
+                  </p:par>
+                  <p:par>
+                    <p:cTn id="17" fill="hold">
+                      <p:stCondLst>
+                        <p:cond delay="indefinite"/>
+                      </p:stCondLst>
+                      <p:childTnLst>
+                        <p:par>
+                          <p:cTn id="18" fill="hold">
+                            <p:stCondLst>
+                              <p:cond delay="0"/>
+                            </p:stCondLst>
+                            <p:childTnLst>
+                              <p:par>
+                                <p:cTn id="19" presetID="1" presetClass="entr" presetSubtype="0" fill="hold" grpId="0" nodeType="clickEffect">
+                                  <p:stCondLst>
+                                    <p:cond delay="0"/>
+                                  </p:stCondLst>
+                                  <p:childTnLst>
+                                    <p:set>
+                                      <p:cBhvr>
+                                        <p:cTn id="20" dur="1" fill="hold">
+                                          <p:stCondLst>
+                                            <p:cond delay="0"/>
+                                          </p:stCondLst>
+                                        </p:cTn>
+                                        <p:tgtEl>
+                                          <p:spTgt spid="3">
+                                            <p:txEl>
+                                              <p:pRg st="5" end="5"/>
+                                            </p:txEl>
+                                          </p:spTgt>
+                                        </p:tgtEl>
+                                        <p:attrNameLst>
+                                          <p:attrName>style.visibility</p:attrName>
+                                        </p:attrNameLst>
+                                      </p:cBhvr>
+                                      <p:to>
+                                        <p:strVal val="visible"/>
+                                      </p:to>
+                                    </p:set>
+                                  </p:childTnLst>
+                                </p:cTn>
+                              </p:par>
+                              <p:par>
+                                <p:cTn id="21" presetID="1" presetClass="entr" presetSubtype="0" fill="hold" grpId="0" nodeType="withEffect">
+                                  <p:stCondLst>
+                                    <p:cond delay="0"/>
+                                  </p:stCondLst>
+                                  <p:childTnLst>
+                                    <p:set>
+                                      <p:cBhvr>
+                                        <p:cTn id="22" dur="1" fill="hold">
+                                          <p:stCondLst>
+                                            <p:cond delay="0"/>
+                                          </p:stCondLst>
+                                        </p:cTn>
+                                        <p:tgtEl>
+                                          <p:spTgt spid="55"/>
+                                        </p:tgtEl>
+                                        <p:attrNameLst>
+                                          <p:attrName>style.visibility</p:attrName>
+                                        </p:attrNameLst>
+                                      </p:cBhvr>
+                                      <p:to>
+                                        <p:strVal val="visible"/>
+                                      </p:to>
+                                    </p:set>
+                                  </p:childTnLst>
+                                </p:cTn>
+                              </p:par>
+                            </p:childTnLst>
+                          </p:cTn>
+                        </p:par>
+                      </p:childTnLst>
+                    </p:cTn>
+                  </p:par>
+                  <p:par>
+                    <p:cTn id="23" fill="hold">
+                      <p:stCondLst>
+                        <p:cond delay="indefinite"/>
+                      </p:stCondLst>
+                      <p:childTnLst>
+                        <p:par>
+                          <p:cTn id="24" fill="hold">
+                            <p:stCondLst>
+                              <p:cond delay="0"/>
+                            </p:stCondLst>
+                            <p:childTnLst>
+                              <p:par>
+                                <p:cTn id="25" presetID="1" presetClass="entr" presetSubtype="0" fill="hold" grpId="0" nodeType="clickEffect">
+                                  <p:stCondLst>
+                                    <p:cond delay="0"/>
+                                  </p:stCondLst>
+                                  <p:childTnLst>
+                                    <p:set>
+                                      <p:cBhvr>
+                                        <p:cTn id="26" dur="1" fill="hold">
+                                          <p:stCondLst>
+                                            <p:cond delay="0"/>
+                                          </p:stCondLst>
+                                        </p:cTn>
+                                        <p:tgtEl>
+                                          <p:spTgt spid="3">
+                                            <p:txEl>
+                                              <p:pRg st="6" end="6"/>
+                                            </p:txEl>
+                                          </p:spTgt>
+                                        </p:tgtEl>
+                                        <p:attrNameLst>
+                                          <p:attrName>style.visibility</p:attrName>
+                                        </p:attrNameLst>
+                                      </p:cBhvr>
+                                      <p:to>
+                                        <p:strVal val="visible"/>
+                                      </p:to>
+                                    </p:set>
+                                  </p:childTnLst>
+                                </p:cTn>
+                              </p:par>
+                              <p:par>
+                                <p:cTn id="27" presetID="1" presetClass="exit" presetSubtype="0" fill="hold" grpId="1" nodeType="withEffect">
+                                  <p:stCondLst>
+                                    <p:cond delay="0"/>
+                                  </p:stCondLst>
+                                  <p:childTnLst>
+                                    <p:set>
+                                      <p:cBhvr>
+                                        <p:cTn id="28" dur="1" fill="hold">
+                                          <p:stCondLst>
+                                            <p:cond delay="0"/>
+                                          </p:stCondLst>
+                                        </p:cTn>
+                                        <p:tgtEl>
+                                          <p:spTgt spid="55"/>
+                                        </p:tgtEl>
+                                        <p:attrNameLst>
+                                          <p:attrName>style.visibility</p:attrName>
+                                        </p:attrNameLst>
+                                      </p:cBhvr>
+                                      <p:to>
+                                        <p:strVal val="hidden"/>
+                                      </p:to>
+                                    </p:set>
+                                  </p:childTnLst>
+                                </p:cTn>
+                              </p:par>
+                              <p:par>
+                                <p:cTn id="29" presetID="1" presetClass="entr" presetSubtype="0" fill="hold" grpId="2" nodeType="withEffect">
+                                  <p:stCondLst>
+                                    <p:cond delay="0"/>
+                                  </p:stCondLst>
+                                  <p:childTnLst>
+                                    <p:set>
+                                      <p:cBhvr>
+                                        <p:cTn id="30" dur="1" fill="hold">
+                                          <p:stCondLst>
+                                            <p:cond delay="0"/>
+                                          </p:stCondLst>
+                                        </p:cTn>
+                                        <p:tgtEl>
+                                          <p:spTgt spid="59"/>
+                                        </p:tgtEl>
+                                        <p:attrNameLst>
+                                          <p:attrName>style.visibility</p:attrName>
+                                        </p:attrNameLst>
+                                      </p:cBhvr>
+                                      <p:to>
+                                        <p:strVal val="visible"/>
+                                      </p:to>
+                                    </p:set>
+                                  </p:childTnLst>
+                                </p:cTn>
+                              </p:par>
+                            </p:childTnLst>
+                          </p:cTn>
+                        </p:par>
+                      </p:childTnLst>
+                    </p:cTn>
+                  </p:par>
+                  <p:par>
+                    <p:cTn id="31" fill="hold">
+                      <p:stCondLst>
+                        <p:cond delay="indefinite"/>
+                      </p:stCondLst>
+                      <p:childTnLst>
+                        <p:par>
+                          <p:cTn id="32" fill="hold">
+                            <p:stCondLst>
+                              <p:cond delay="0"/>
+                            </p:stCondLst>
+                            <p:childTnLst>
+                              <p:par>
+                                <p:cTn id="33" presetID="1" presetClass="entr" presetSubtype="0" fill="hold" grpId="0" nodeType="clickEffect">
+                                  <p:stCondLst>
+                                    <p:cond delay="0"/>
+                                  </p:stCondLst>
+                                  <p:childTnLst>
+                                    <p:set>
+                                      <p:cBhvr>
+                                        <p:cTn id="34" dur="1" fill="hold">
+                                          <p:stCondLst>
+                                            <p:cond delay="0"/>
+                                          </p:stCondLst>
+                                        </p:cTn>
+                                        <p:tgtEl>
+                                          <p:spTgt spid="3">
+                                            <p:txEl>
+                                              <p:pRg st="7" end="7"/>
+                                            </p:txEl>
+                                          </p:spTgt>
+                                        </p:tgtEl>
+                                        <p:attrNameLst>
+                                          <p:attrName>style.visibility</p:attrName>
+                                        </p:attrNameLst>
+                                      </p:cBhvr>
+                                      <p:to>
+                                        <p:strVal val="visible"/>
+                                      </p:to>
+                                    </p:set>
+                                  </p:childTnLst>
+                                </p:cTn>
+                              </p:par>
+                              <p:par>
+                                <p:cTn id="35" presetID="1" presetClass="exit" presetSubtype="0" fill="hold" grpId="1" nodeType="withEffect">
+                                  <p:stCondLst>
+                                    <p:cond delay="0"/>
+                                  </p:stCondLst>
+                                  <p:childTnLst>
+                                    <p:set>
+                                      <p:cBhvr>
+                                        <p:cTn id="36" dur="1" fill="hold">
+                                          <p:stCondLst>
+                                            <p:cond delay="0"/>
+                                          </p:stCondLst>
+                                        </p:cTn>
+                                        <p:tgtEl>
+                                          <p:spTgt spid="59"/>
+                                        </p:tgtEl>
+                                        <p:attrNameLst>
+                                          <p:attrName>style.visibility</p:attrName>
+                                        </p:attrNameLst>
+                                      </p:cBhvr>
+                                      <p:to>
+                                        <p:strVal val="hidden"/>
+                                      </p:to>
+                                    </p:set>
+                                  </p:childTnLst>
+                                </p:cTn>
+                              </p:par>
+                              <p:par>
+                                <p:cTn id="37" presetID="1" presetClass="entr" presetSubtype="0" fill="hold" grpId="0" nodeType="withEffect">
+                                  <p:stCondLst>
+                                    <p:cond delay="0"/>
+                                  </p:stCondLst>
+                                  <p:childTnLst>
+                                    <p:set>
+                                      <p:cBhvr>
+                                        <p:cTn id="38" dur="1" fill="hold">
+                                          <p:stCondLst>
+                                            <p:cond delay="0"/>
+                                          </p:stCondLst>
+                                        </p:cTn>
+                                        <p:tgtEl>
+                                          <p:spTgt spid="60"/>
+                                        </p:tgtEl>
+                                        <p:attrNameLst>
+                                          <p:attrName>style.visibility</p:attrName>
+                                        </p:attrNameLst>
+                                      </p:cBhvr>
+                                      <p:to>
+                                        <p:strVal val="visible"/>
+                                      </p:to>
+                                    </p:set>
+                                  </p:childTnLst>
+                                </p:cTn>
+                              </p:par>
+                              <p:par>
+                                <p:cTn id="39" presetID="1" presetClass="entr" presetSubtype="0" fill="hold" grpId="0" nodeType="withEffect">
+                                  <p:stCondLst>
+                                    <p:cond delay="0"/>
+                                  </p:stCondLst>
+                                  <p:childTnLst>
+                                    <p:set>
+                                      <p:cBhvr>
+                                        <p:cTn id="40" dur="1" fill="hold">
+                                          <p:stCondLst>
+                                            <p:cond delay="0"/>
+                                          </p:stCondLst>
+                                        </p:cTn>
+                                        <p:tgtEl>
+                                          <p:spTgt spid="74"/>
+                                        </p:tgtEl>
+                                        <p:attrNameLst>
+                                          <p:attrName>style.visibility</p:attrName>
+                                        </p:attrNameLst>
+                                      </p:cBhvr>
+                                      <p:to>
+                                        <p:strVal val="visible"/>
+                                      </p:to>
+                                    </p:set>
+                                  </p:childTnLst>
+                                </p:cTn>
+                              </p:par>
+                            </p:childTnLst>
+                          </p:cTn>
+                        </p:par>
+                      </p:childTnLst>
+                    </p:cTn>
+                  </p:par>
+                </p:childTnLst>
+              </p:cTn>
+              <p:prevCondLst>
+                <p:cond evt="onPrev" delay="0">
+                  <p:tgtEl>
+                    <p:sldTgt/>
+                  </p:tgtEl>
+                </p:cond>
+              </p:prevCondLst>
+              <p:nextCondLst>
+                <p:cond evt="onNext" delay="0">
+                  <p:tgtEl>
+                    <p:sldTgt/>
+                  </p:tgtEl>
+                </p:cond>
+              </p:nextCondLst>
+            </p:seq>
+          </p:childTnLst>
+        </p:cTn>
       </p:par>
     </p:tnLst>
+    <p:bldLst>
+      <p:bldP spid="3" grpId="0" build="p"/>
+      <p:bldP spid="55" grpId="0" animBg="1"/>
+      <p:bldP spid="55" grpId="1" animBg="1"/>
+      <p:bldP spid="59" grpId="1" animBg="1"/>
+      <p:bldP spid="59" grpId="2" animBg="1"/>
+      <p:bldP spid="60" grpId="0" animBg="1"/>
+      <p:bldP spid="74" grpId="0" animBg="1"/>
+    </p:bldLst>
   </p:timing>
 </p:sld>
 </file>
@@ -15556,7 +18494,16 @@
           <a:p>
             <a:r>
               <a:rPr lang="fr-FR"/>
-              <a:t>Poids des arcs divisé par l’énergie restante</a:t>
+              <a:t>Poids des arcs divisé </a:t>
+            </a:r>
+          </a:p>
+          <a:p>
+            <a:pPr marL="0" indent="0">
+              <a:buNone/>
+            </a:pPr>
+            <a:r>
+              <a:rPr lang="fr-FR"/>
+              <a:t>par l’énergie restante</a:t>
             </a:r>
           </a:p>
           <a:p>
@@ -15582,6 +18529,505 @@
           </a:p>
         </p:txBody>
       </p:sp>
+      <p:sp>
+        <p:nvSpPr>
+          <p:cNvPr id="6" name="Ellipse 5"/>
+          <p:cNvSpPr/>
+          <p:nvPr/>
+        </p:nvSpPr>
+        <p:spPr>
+          <a:xfrm>
+            <a:off x="4988138" y="2402718"/>
+            <a:ext cx="299805" cy="285291"/>
+          </a:xfrm>
+          <a:prstGeom prst="ellipse">
+            <a:avLst/>
+          </a:prstGeom>
+        </p:spPr>
+        <p:style>
+          <a:lnRef idx="1">
+            <a:schemeClr val="dk1"/>
+          </a:lnRef>
+          <a:fillRef idx="3">
+            <a:schemeClr val="dk1"/>
+          </a:fillRef>
+          <a:effectRef idx="2">
+            <a:schemeClr val="dk1"/>
+          </a:effectRef>
+          <a:fontRef idx="minor">
+            <a:schemeClr val="lt1"/>
+          </a:fontRef>
+        </p:style>
+        <p:txBody>
+          <a:bodyPr lIns="72000" rtlCol="0" anchor="ctr">
+            <a:normAutofit fontScale="47500" lnSpcReduction="20000"/>
+          </a:bodyPr>
+          <a:lstStyle/>
+          <a:p>
+            <a:pPr algn="ctr"/>
+            <a:r>
+              <a:rPr lang="fr-FR"/>
+              <a:t>A</a:t>
+            </a:r>
+          </a:p>
+        </p:txBody>
+      </p:sp>
+      <p:sp>
+        <p:nvSpPr>
+          <p:cNvPr id="7" name="Ellipse 6"/>
+          <p:cNvSpPr/>
+          <p:nvPr/>
+        </p:nvSpPr>
+        <p:spPr>
+          <a:xfrm>
+            <a:off x="5429233" y="1996790"/>
+            <a:ext cx="299805" cy="285291"/>
+          </a:xfrm>
+          <a:prstGeom prst="ellipse">
+            <a:avLst/>
+          </a:prstGeom>
+        </p:spPr>
+        <p:style>
+          <a:lnRef idx="1">
+            <a:schemeClr val="dk1"/>
+          </a:lnRef>
+          <a:fillRef idx="3">
+            <a:schemeClr val="dk1"/>
+          </a:fillRef>
+          <a:effectRef idx="2">
+            <a:schemeClr val="dk1"/>
+          </a:effectRef>
+          <a:fontRef idx="minor">
+            <a:schemeClr val="lt1"/>
+          </a:fontRef>
+        </p:style>
+        <p:txBody>
+          <a:bodyPr lIns="72000" rtlCol="0" anchor="ctr">
+            <a:normAutofit fontScale="47500" lnSpcReduction="20000"/>
+          </a:bodyPr>
+          <a:lstStyle/>
+          <a:p>
+            <a:pPr algn="ctr"/>
+            <a:r>
+              <a:rPr lang="fr-FR"/>
+              <a:t>B</a:t>
+            </a:r>
+          </a:p>
+        </p:txBody>
+      </p:sp>
+      <p:sp>
+        <p:nvSpPr>
+          <p:cNvPr id="8" name="Ellipse 7"/>
+          <p:cNvSpPr/>
+          <p:nvPr/>
+        </p:nvSpPr>
+        <p:spPr>
+          <a:xfrm>
+            <a:off x="5645534" y="2866834"/>
+            <a:ext cx="299805" cy="285291"/>
+          </a:xfrm>
+          <a:prstGeom prst="ellipse">
+            <a:avLst/>
+          </a:prstGeom>
+        </p:spPr>
+        <p:style>
+          <a:lnRef idx="1">
+            <a:schemeClr val="dk1"/>
+          </a:lnRef>
+          <a:fillRef idx="3">
+            <a:schemeClr val="dk1"/>
+          </a:fillRef>
+          <a:effectRef idx="2">
+            <a:schemeClr val="dk1"/>
+          </a:effectRef>
+          <a:fontRef idx="minor">
+            <a:schemeClr val="lt1"/>
+          </a:fontRef>
+        </p:style>
+        <p:txBody>
+          <a:bodyPr lIns="72000" rtlCol="0" anchor="ctr">
+            <a:normAutofit fontScale="47500" lnSpcReduction="20000"/>
+          </a:bodyPr>
+          <a:lstStyle/>
+          <a:p>
+            <a:pPr algn="ctr"/>
+            <a:r>
+              <a:rPr lang="fr-FR"/>
+              <a:t>C</a:t>
+            </a:r>
+          </a:p>
+        </p:txBody>
+      </p:sp>
+      <p:sp>
+        <p:nvSpPr>
+          <p:cNvPr id="9" name="Ellipse 8"/>
+          <p:cNvSpPr/>
+          <p:nvPr/>
+        </p:nvSpPr>
+        <p:spPr>
+          <a:xfrm>
+            <a:off x="6581626" y="2805197"/>
+            <a:ext cx="299805" cy="285291"/>
+          </a:xfrm>
+          <a:prstGeom prst="ellipse">
+            <a:avLst/>
+          </a:prstGeom>
+        </p:spPr>
+        <p:style>
+          <a:lnRef idx="1">
+            <a:schemeClr val="dk1"/>
+          </a:lnRef>
+          <a:fillRef idx="3">
+            <a:schemeClr val="dk1"/>
+          </a:fillRef>
+          <a:effectRef idx="2">
+            <a:schemeClr val="dk1"/>
+          </a:effectRef>
+          <a:fontRef idx="minor">
+            <a:schemeClr val="lt1"/>
+          </a:fontRef>
+        </p:style>
+        <p:txBody>
+          <a:bodyPr lIns="72000" rtlCol="0" anchor="ctr">
+            <a:normAutofit fontScale="47500" lnSpcReduction="20000"/>
+          </a:bodyPr>
+          <a:lstStyle/>
+          <a:p>
+            <a:pPr algn="ctr"/>
+            <a:r>
+              <a:rPr lang="fr-FR"/>
+              <a:t>D</a:t>
+            </a:r>
+          </a:p>
+        </p:txBody>
+      </p:sp>
+      <p:sp>
+        <p:nvSpPr>
+          <p:cNvPr id="10" name="Ellipse 9"/>
+          <p:cNvSpPr/>
+          <p:nvPr/>
+        </p:nvSpPr>
+        <p:spPr>
+          <a:xfrm>
+            <a:off x="6500944" y="2216160"/>
+            <a:ext cx="299805" cy="285291"/>
+          </a:xfrm>
+          <a:prstGeom prst="ellipse">
+            <a:avLst/>
+          </a:prstGeom>
+        </p:spPr>
+        <p:style>
+          <a:lnRef idx="1">
+            <a:schemeClr val="dk1"/>
+          </a:lnRef>
+          <a:fillRef idx="3">
+            <a:schemeClr val="dk1"/>
+          </a:fillRef>
+          <a:effectRef idx="2">
+            <a:schemeClr val="dk1"/>
+          </a:effectRef>
+          <a:fontRef idx="minor">
+            <a:schemeClr val="lt1"/>
+          </a:fontRef>
+        </p:style>
+        <p:txBody>
+          <a:bodyPr lIns="72000" rtlCol="0" anchor="ctr">
+            <a:normAutofit fontScale="47500" lnSpcReduction="20000"/>
+          </a:bodyPr>
+          <a:lstStyle/>
+          <a:p>
+            <a:pPr algn="ctr"/>
+            <a:r>
+              <a:rPr lang="fr-FR"/>
+              <a:t>E</a:t>
+            </a:r>
+          </a:p>
+        </p:txBody>
+      </p:sp>
+      <p:sp>
+        <p:nvSpPr>
+          <p:cNvPr id="11" name="Ellipse 10"/>
+          <p:cNvSpPr/>
+          <p:nvPr/>
+        </p:nvSpPr>
+        <p:spPr>
+          <a:xfrm>
+            <a:off x="7180750" y="2343185"/>
+            <a:ext cx="299805" cy="285291"/>
+          </a:xfrm>
+          <a:prstGeom prst="ellipse">
+            <a:avLst/>
+          </a:prstGeom>
+        </p:spPr>
+        <p:style>
+          <a:lnRef idx="1">
+            <a:schemeClr val="dk1"/>
+          </a:lnRef>
+          <a:fillRef idx="3">
+            <a:schemeClr val="dk1"/>
+          </a:fillRef>
+          <a:effectRef idx="2">
+            <a:schemeClr val="dk1"/>
+          </a:effectRef>
+          <a:fontRef idx="minor">
+            <a:schemeClr val="lt1"/>
+          </a:fontRef>
+        </p:style>
+        <p:txBody>
+          <a:bodyPr lIns="72000" rtlCol="0" anchor="ctr">
+            <a:normAutofit fontScale="47500" lnSpcReduction="20000"/>
+          </a:bodyPr>
+          <a:lstStyle/>
+          <a:p>
+            <a:pPr algn="ctr"/>
+            <a:r>
+              <a:rPr lang="fr-FR"/>
+              <a:t>F</a:t>
+            </a:r>
+          </a:p>
+        </p:txBody>
+      </p:sp>
+      <p:sp>
+        <p:nvSpPr>
+          <p:cNvPr id="12" name="Ellipse 11"/>
+          <p:cNvSpPr/>
+          <p:nvPr/>
+        </p:nvSpPr>
+        <p:spPr>
+          <a:xfrm>
+            <a:off x="7665166" y="1743128"/>
+            <a:ext cx="299805" cy="285291"/>
+          </a:xfrm>
+          <a:prstGeom prst="ellipse">
+            <a:avLst/>
+          </a:prstGeom>
+        </p:spPr>
+        <p:style>
+          <a:lnRef idx="1">
+            <a:schemeClr val="dk1"/>
+          </a:lnRef>
+          <a:fillRef idx="3">
+            <a:schemeClr val="dk1"/>
+          </a:fillRef>
+          <a:effectRef idx="2">
+            <a:schemeClr val="dk1"/>
+          </a:effectRef>
+          <a:fontRef idx="minor">
+            <a:schemeClr val="lt1"/>
+          </a:fontRef>
+        </p:style>
+        <p:txBody>
+          <a:bodyPr lIns="72000" rtlCol="0" anchor="ctr">
+            <a:normAutofit fontScale="47500" lnSpcReduction="20000"/>
+          </a:bodyPr>
+          <a:lstStyle/>
+          <a:p>
+            <a:pPr algn="ctr"/>
+            <a:r>
+              <a:rPr lang="fr-FR"/>
+              <a:t>G</a:t>
+            </a:r>
+          </a:p>
+        </p:txBody>
+      </p:sp>
+      <p:cxnSp>
+        <p:nvCxnSpPr>
+          <p:cNvPr id="15" name="Connecteur droit 14"/>
+          <p:cNvCxnSpPr>
+            <a:stCxn id="8" idx="6"/>
+            <a:endCxn id="9" idx="2"/>
+          </p:cNvCxnSpPr>
+          <p:nvPr/>
+        </p:nvCxnSpPr>
+        <p:spPr>
+          <a:xfrm flipV="1">
+            <a:off x="5945339" y="2947843"/>
+            <a:ext cx="636287" cy="61637"/>
+          </a:xfrm>
+          <a:prstGeom prst="line">
+            <a:avLst/>
+          </a:prstGeom>
+        </p:spPr>
+        <p:style>
+          <a:lnRef idx="2">
+            <a:schemeClr val="accent1"/>
+          </a:lnRef>
+          <a:fillRef idx="0">
+            <a:schemeClr val="accent1"/>
+          </a:fillRef>
+          <a:effectRef idx="1">
+            <a:schemeClr val="accent1"/>
+          </a:effectRef>
+          <a:fontRef idx="minor">
+            <a:schemeClr val="tx1"/>
+          </a:fontRef>
+        </p:style>
+      </p:cxnSp>
+      <p:cxnSp>
+        <p:nvCxnSpPr>
+          <p:cNvPr id="16" name="Connecteur droit 15"/>
+          <p:cNvCxnSpPr>
+            <a:stCxn id="10" idx="4"/>
+            <a:endCxn id="9" idx="0"/>
+          </p:cNvCxnSpPr>
+          <p:nvPr/>
+        </p:nvCxnSpPr>
+        <p:spPr>
+          <a:xfrm>
+            <a:off x="6650847" y="2501451"/>
+            <a:ext cx="80682" cy="303746"/>
+          </a:xfrm>
+          <a:prstGeom prst="line">
+            <a:avLst/>
+          </a:prstGeom>
+        </p:spPr>
+        <p:style>
+          <a:lnRef idx="2">
+            <a:schemeClr val="accent1"/>
+          </a:lnRef>
+          <a:fillRef idx="0">
+            <a:schemeClr val="accent1"/>
+          </a:fillRef>
+          <a:effectRef idx="1">
+            <a:schemeClr val="accent1"/>
+          </a:effectRef>
+          <a:fontRef idx="minor">
+            <a:schemeClr val="tx1"/>
+          </a:fontRef>
+        </p:style>
+      </p:cxnSp>
+      <p:cxnSp>
+        <p:nvCxnSpPr>
+          <p:cNvPr id="18" name="Connecteur droit 17"/>
+          <p:cNvCxnSpPr>
+            <a:stCxn id="11" idx="3"/>
+            <a:endCxn id="9" idx="6"/>
+          </p:cNvCxnSpPr>
+          <p:nvPr/>
+        </p:nvCxnSpPr>
+        <p:spPr>
+          <a:xfrm flipH="1">
+            <a:off x="6881431" y="2586696"/>
+            <a:ext cx="343224" cy="361147"/>
+          </a:xfrm>
+          <a:prstGeom prst="line">
+            <a:avLst/>
+          </a:prstGeom>
+        </p:spPr>
+        <p:style>
+          <a:lnRef idx="2">
+            <a:schemeClr val="accent1"/>
+          </a:lnRef>
+          <a:fillRef idx="0">
+            <a:schemeClr val="accent1"/>
+          </a:fillRef>
+          <a:effectRef idx="1">
+            <a:schemeClr val="accent1"/>
+          </a:effectRef>
+          <a:fontRef idx="minor">
+            <a:schemeClr val="tx1"/>
+          </a:fontRef>
+        </p:style>
+      </p:cxnSp>
+      <p:cxnSp>
+        <p:nvCxnSpPr>
+          <p:cNvPr id="81" name="Connecteur droit 80"/>
+          <p:cNvCxnSpPr>
+            <a:stCxn id="6" idx="7"/>
+            <a:endCxn id="7" idx="3"/>
+          </p:cNvCxnSpPr>
+          <p:nvPr/>
+        </p:nvCxnSpPr>
+        <p:spPr>
+          <a:xfrm flipV="1">
+            <a:off x="5244038" y="2240301"/>
+            <a:ext cx="229100" cy="204197"/>
+          </a:xfrm>
+          <a:prstGeom prst="line">
+            <a:avLst/>
+          </a:prstGeom>
+        </p:spPr>
+        <p:style>
+          <a:lnRef idx="2">
+            <a:schemeClr val="accent1"/>
+          </a:lnRef>
+          <a:fillRef idx="0">
+            <a:schemeClr val="accent1"/>
+          </a:fillRef>
+          <a:effectRef idx="1">
+            <a:schemeClr val="accent1"/>
+          </a:effectRef>
+          <a:fontRef idx="minor">
+            <a:schemeClr val="tx1"/>
+          </a:fontRef>
+        </p:style>
+      </p:cxnSp>
+      <p:cxnSp>
+        <p:nvCxnSpPr>
+          <p:cNvPr id="84" name="Connecteur droit 83"/>
+          <p:cNvCxnSpPr>
+            <a:stCxn id="6" idx="5"/>
+            <a:endCxn id="8" idx="1"/>
+          </p:cNvCxnSpPr>
+          <p:nvPr/>
+        </p:nvCxnSpPr>
+        <p:spPr>
+          <a:xfrm>
+            <a:off x="5244038" y="2646229"/>
+            <a:ext cx="445401" cy="262385"/>
+          </a:xfrm>
+          <a:prstGeom prst="line">
+            <a:avLst/>
+          </a:prstGeom>
+        </p:spPr>
+        <p:style>
+          <a:lnRef idx="2">
+            <a:schemeClr val="accent1"/>
+          </a:lnRef>
+          <a:fillRef idx="0">
+            <a:schemeClr val="accent1"/>
+          </a:fillRef>
+          <a:effectRef idx="1">
+            <a:schemeClr val="accent1"/>
+          </a:effectRef>
+          <a:fontRef idx="minor">
+            <a:schemeClr val="tx1"/>
+          </a:fontRef>
+        </p:style>
+      </p:cxnSp>
+      <p:cxnSp>
+        <p:nvCxnSpPr>
+          <p:cNvPr id="108" name="Connecteur droit 107"/>
+          <p:cNvCxnSpPr>
+            <a:stCxn id="12" idx="3"/>
+            <a:endCxn id="11" idx="7"/>
+          </p:cNvCxnSpPr>
+          <p:nvPr/>
+        </p:nvCxnSpPr>
+        <p:spPr>
+          <a:xfrm flipH="1">
+            <a:off x="7436650" y="1986639"/>
+            <a:ext cx="272421" cy="398326"/>
+          </a:xfrm>
+          <a:prstGeom prst="line">
+            <a:avLst/>
+          </a:prstGeom>
+        </p:spPr>
+        <p:style>
+          <a:lnRef idx="2">
+            <a:schemeClr val="accent1"/>
+          </a:lnRef>
+          <a:fillRef idx="0">
+            <a:schemeClr val="accent1"/>
+          </a:fillRef>
+          <a:effectRef idx="1">
+            <a:schemeClr val="accent1"/>
+          </a:effectRef>
+          <a:fontRef idx="minor">
+            <a:schemeClr val="tx1"/>
+          </a:fontRef>
+        </p:style>
+      </p:cxnSp>
     </p:spTree>
     <p:extLst>
       <p:ext uri="{BB962C8B-B14F-4D97-AF65-F5344CB8AC3E}">

</xml_diff>